<commit_message>
continued work on the presentation updated the visual paradigm uml diagram for the current version of the software
</commit_message>
<xml_diff>
--- a/portfolio/PresentationInception.pptx
+++ b/portfolio/PresentationInception.pptx
@@ -6,7 +6,7 @@
     <p:sldMasterId id="2147483660" r:id="rId2"/>
   </p:sldMasterIdLst>
   <p:notesMasterIdLst>
-    <p:notesMasterId r:id="rId26"/>
+    <p:notesMasterId r:id="rId27"/>
   </p:notesMasterIdLst>
   <p:sldIdLst>
     <p:sldId id="256" r:id="rId3"/>
@@ -24,14 +24,15 @@
     <p:sldId id="277" r:id="rId15"/>
     <p:sldId id="278" r:id="rId16"/>
     <p:sldId id="259" r:id="rId17"/>
-    <p:sldId id="261" r:id="rId18"/>
+    <p:sldId id="263" r:id="rId18"/>
     <p:sldId id="264" r:id="rId19"/>
     <p:sldId id="265" r:id="rId20"/>
-    <p:sldId id="263" r:id="rId21"/>
-    <p:sldId id="271" r:id="rId22"/>
-    <p:sldId id="262" r:id="rId23"/>
-    <p:sldId id="267" r:id="rId24"/>
-    <p:sldId id="266" r:id="rId25"/>
+    <p:sldId id="271" r:id="rId21"/>
+    <p:sldId id="262" r:id="rId22"/>
+    <p:sldId id="261" r:id="rId23"/>
+    <p:sldId id="279" r:id="rId24"/>
+    <p:sldId id="267" r:id="rId25"/>
+    <p:sldId id="266" r:id="rId26"/>
   </p:sldIdLst>
   <p:sldSz cx="9144000" cy="6858000" type="letter"/>
   <p:notesSz cx="6858000" cy="9144000"/>
@@ -215,7 +216,7 @@
           <a:p>
             <a:fld id="{89A61C1C-259F-4962-A7D6-71E772769996}" type="datetimeFigureOut">
               <a:rPr lang="en-US" smtClean="0"/>
-              <a:t>2012-01-18</a:t>
+              <a:t>2012-01-19</a:t>
             </a:fld>
             <a:endParaRPr lang="en-US"/>
           </a:p>
@@ -1663,7 +1664,7 @@
             <a:fld id="{1D8BD707-D9CF-40AE-B4C6-C98DA3205C09}" type="datetimeFigureOut">
               <a:rPr lang="en-US" smtClean="0"/>
               <a:pPr/>
-              <a:t>2012-01-18</a:t>
+              <a:t>2012-01-19</a:t>
             </a:fld>
             <a:endParaRPr lang="en-US"/>
           </a:p>
@@ -1830,7 +1831,7 @@
             <a:fld id="{1D8BD707-D9CF-40AE-B4C6-C98DA3205C09}" type="datetimeFigureOut">
               <a:rPr lang="en-US" smtClean="0"/>
               <a:pPr/>
-              <a:t>2012-01-18</a:t>
+              <a:t>2012-01-19</a:t>
             </a:fld>
             <a:endParaRPr lang="en-US"/>
           </a:p>
@@ -2007,7 +2008,7 @@
             <a:fld id="{1D8BD707-D9CF-40AE-B4C6-C98DA3205C09}" type="datetimeFigureOut">
               <a:rPr lang="en-US" smtClean="0"/>
               <a:pPr/>
-              <a:t>2012-01-18</a:t>
+              <a:t>2012-01-19</a:t>
             </a:fld>
             <a:endParaRPr lang="en-US"/>
           </a:p>
@@ -4138,7 +4139,7 @@
             <a:fld id="{1D8BD707-D9CF-40AE-B4C6-C98DA3205C09}" type="datetimeFigureOut">
               <a:rPr lang="en-US" smtClean="0"/>
               <a:pPr/>
-              <a:t>2012-01-18</a:t>
+              <a:t>2012-01-19</a:t>
             </a:fld>
             <a:endParaRPr lang="en-US"/>
           </a:p>
@@ -5059,7 +5060,7 @@
             <a:fld id="{1D8BD707-D9CF-40AE-B4C6-C98DA3205C09}" type="datetimeFigureOut">
               <a:rPr lang="en-US" smtClean="0"/>
               <a:pPr/>
-              <a:t>2012-01-18</a:t>
+              <a:t>2012-01-19</a:t>
             </a:fld>
             <a:endParaRPr lang="en-US"/>
           </a:p>
@@ -5344,7 +5345,7 @@
             <a:fld id="{1D8BD707-D9CF-40AE-B4C6-C98DA3205C09}" type="datetimeFigureOut">
               <a:rPr lang="en-US" smtClean="0"/>
               <a:pPr/>
-              <a:t>2012-01-18</a:t>
+              <a:t>2012-01-19</a:t>
             </a:fld>
             <a:endParaRPr lang="en-US"/>
           </a:p>
@@ -5763,7 +5764,7 @@
             <a:fld id="{1D8BD707-D9CF-40AE-B4C6-C98DA3205C09}" type="datetimeFigureOut">
               <a:rPr lang="en-US" smtClean="0"/>
               <a:pPr/>
-              <a:t>2012-01-18</a:t>
+              <a:t>2012-01-19</a:t>
             </a:fld>
             <a:endParaRPr lang="en-US"/>
           </a:p>
@@ -5878,7 +5879,7 @@
             <a:fld id="{1D8BD707-D9CF-40AE-B4C6-C98DA3205C09}" type="datetimeFigureOut">
               <a:rPr lang="en-US" smtClean="0"/>
               <a:pPr/>
-              <a:t>2012-01-18</a:t>
+              <a:t>2012-01-19</a:t>
             </a:fld>
             <a:endParaRPr lang="en-US"/>
           </a:p>
@@ -5970,7 +5971,7 @@
             <a:fld id="{1D8BD707-D9CF-40AE-B4C6-C98DA3205C09}" type="datetimeFigureOut">
               <a:rPr lang="en-US" smtClean="0"/>
               <a:pPr/>
-              <a:t>2012-01-18</a:t>
+              <a:t>2012-01-19</a:t>
             </a:fld>
             <a:endParaRPr lang="en-US"/>
           </a:p>
@@ -6244,7 +6245,7 @@
             <a:fld id="{1D8BD707-D9CF-40AE-B4C6-C98DA3205C09}" type="datetimeFigureOut">
               <a:rPr lang="en-US" smtClean="0"/>
               <a:pPr/>
-              <a:t>2012-01-18</a:t>
+              <a:t>2012-01-19</a:t>
             </a:fld>
             <a:endParaRPr lang="en-US"/>
           </a:p>
@@ -6494,7 +6495,7 @@
             <a:fld id="{1D8BD707-D9CF-40AE-B4C6-C98DA3205C09}" type="datetimeFigureOut">
               <a:rPr lang="en-US" smtClean="0"/>
               <a:pPr/>
-              <a:t>2012-01-18</a:t>
+              <a:t>2012-01-19</a:t>
             </a:fld>
             <a:endParaRPr lang="en-US"/>
           </a:p>
@@ -6704,7 +6705,7 @@
             <a:fld id="{1D8BD707-D9CF-40AE-B4C6-C98DA3205C09}" type="datetimeFigureOut">
               <a:rPr lang="en-US" smtClean="0"/>
               <a:pPr/>
-              <a:t>2012-01-18</a:t>
+              <a:t>2012-01-19</a:t>
             </a:fld>
             <a:endParaRPr lang="en-US"/>
           </a:p>
@@ -8315,7 +8316,11 @@
           <a:p>
             <a:r>
               <a:rPr lang="en-US" dirty="0" smtClean="0"/>
-              <a:t>Cost Estimate</a:t>
+              <a:t>Cost </a:t>
+            </a:r>
+            <a:r>
+              <a:rPr lang="en-US" dirty="0" smtClean="0"/>
+              <a:t>Estimation</a:t>
             </a:r>
             <a:endParaRPr lang="en-US" dirty="0"/>
           </a:p>
@@ -8394,7 +8399,11 @@
           <a:p>
             <a:r>
               <a:rPr lang="en-US" dirty="0" smtClean="0"/>
-              <a:t>Cost Estimate</a:t>
+              <a:t>Cost </a:t>
+            </a:r>
+            <a:r>
+              <a:rPr lang="en-US" dirty="0" smtClean="0"/>
+              <a:t>Estimation</a:t>
             </a:r>
             <a:endParaRPr lang="en-US" dirty="0"/>
           </a:p>
@@ -8551,10 +8560,10 @@
           <a:lstStyle/>
           <a:p>
             <a:r>
-              <a:rPr lang="en-US" dirty="0" smtClean="0"/>
-              <a:t>Project Risks and Spikes</a:t>
-            </a:r>
-            <a:endParaRPr lang="en-US" dirty="0"/>
+              <a:rPr lang="en-US" sz="4000" dirty="0" smtClean="0"/>
+              <a:t>Candidate Architecture Overview</a:t>
+            </a:r>
+            <a:endParaRPr lang="en-US" sz="4000" dirty="0"/>
           </a:p>
         </p:txBody>
       </p:sp>
@@ -8580,7 +8589,7 @@
     </p:spTree>
     <p:extLst>
       <p:ext uri="{BB962C8B-B14F-4D97-AF65-F5344CB8AC3E}">
-        <p14:creationId xmlns:p14="http://schemas.microsoft.com/office/powerpoint/2010/main" val="810269815"/>
+        <p14:creationId xmlns:p14="http://schemas.microsoft.com/office/powerpoint/2010/main" val="415597845"/>
       </p:ext>
     </p:extLst>
   </p:cSld>
@@ -8817,10 +8826,10 @@
           <a:lstStyle/>
           <a:p>
             <a:r>
-              <a:rPr lang="en-US" sz="4000" dirty="0" smtClean="0"/>
-              <a:t>Candidate Architecture Overview</a:t>
-            </a:r>
-            <a:endParaRPr lang="en-US" sz="4000" dirty="0"/>
+              <a:rPr lang="en-US" dirty="0" smtClean="0"/>
+              <a:t>Phase II Deliverables</a:t>
+            </a:r>
+            <a:endParaRPr lang="en-US" dirty="0"/>
           </a:p>
         </p:txBody>
       </p:sp>
@@ -8846,7 +8855,7 @@
     </p:spTree>
     <p:extLst>
       <p:ext uri="{BB962C8B-B14F-4D97-AF65-F5344CB8AC3E}">
-        <p14:creationId xmlns:p14="http://schemas.microsoft.com/office/powerpoint/2010/main" val="415597845"/>
+        <p14:creationId xmlns:p14="http://schemas.microsoft.com/office/powerpoint/2010/main" val="722826162"/>
       </p:ext>
     </p:extLst>
   </p:cSld>
@@ -8924,100 +8933,109 @@
           <a:lstStyle/>
           <a:p>
             <a:r>
-              <a:rPr lang="en-US" sz="2000" dirty="0" smtClean="0"/>
+              <a:rPr lang="en-US" sz="2100" dirty="0" smtClean="0"/>
               <a:t>Project Overview</a:t>
             </a:r>
           </a:p>
           <a:p>
             <a:r>
-              <a:rPr lang="en-US" sz="2000" dirty="0" smtClean="0"/>
+              <a:rPr lang="en-US" sz="2100" dirty="0" smtClean="0"/>
               <a:t>Project Vision</a:t>
             </a:r>
-            <a:endParaRPr lang="en-US" sz="2000" dirty="0" smtClean="0"/>
-          </a:p>
-          <a:p>
-            <a:r>
-              <a:rPr lang="en-US" sz="2000" dirty="0" smtClean="0"/>
+          </a:p>
+          <a:p>
+            <a:r>
+              <a:rPr lang="en-US" sz="2100" dirty="0" smtClean="0"/>
               <a:t>System Context</a:t>
             </a:r>
-            <a:endParaRPr lang="en-US" sz="2000" dirty="0"/>
-          </a:p>
-          <a:p>
-            <a:r>
-              <a:rPr lang="en-US" sz="2000" dirty="0" smtClean="0"/>
+            <a:endParaRPr lang="en-US" sz="2100" dirty="0"/>
+          </a:p>
+          <a:p>
+            <a:r>
+              <a:rPr lang="en-US" sz="2100" dirty="0" smtClean="0"/>
               <a:t>Project Requirements and Plan</a:t>
             </a:r>
           </a:p>
           <a:p>
             <a:r>
-              <a:rPr lang="en-US" sz="2000" dirty="0" smtClean="0"/>
+              <a:rPr lang="en-US" sz="2100" dirty="0" smtClean="0"/>
               <a:t>Cost Estimation</a:t>
             </a:r>
-            <a:endParaRPr lang="en-US" sz="2000" dirty="0" smtClean="0"/>
-          </a:p>
-          <a:p>
-            <a:r>
-              <a:rPr lang="en-US" sz="2000" dirty="0" smtClean="0"/>
-              <a:t>Project Software Quality Assurance </a:t>
-            </a:r>
-            <a:r>
-              <a:rPr lang="en-US" sz="2000" dirty="0" smtClean="0"/>
-              <a:t>Plan</a:t>
-            </a:r>
-            <a:endParaRPr lang="en-US" sz="2000" dirty="0" smtClean="0"/>
-          </a:p>
-          <a:p>
-            <a:r>
-              <a:rPr lang="en-US" sz="2000" dirty="0" smtClean="0"/>
-              <a:t>Project Risks &amp; Spikes</a:t>
-            </a:r>
-          </a:p>
-          <a:p>
-            <a:r>
-              <a:rPr lang="en-US" sz="2000" dirty="0" smtClean="0"/>
-              <a:t>Project Log</a:t>
-            </a:r>
-          </a:p>
-          <a:p>
-            <a:r>
-              <a:rPr lang="en-US" sz="2000" dirty="0" smtClean="0"/>
-              <a:t>Candidate Architecture Overview</a:t>
-            </a:r>
-          </a:p>
-          <a:p>
-            <a:r>
-              <a:rPr lang="en-US" sz="2000" dirty="0" smtClean="0"/>
+          </a:p>
+          <a:p>
+            <a:r>
+              <a:rPr lang="en-US" sz="2100" dirty="0" smtClean="0"/>
+              <a:t>Project Software Quality Assurance Plan</a:t>
+            </a:r>
+          </a:p>
+          <a:p>
+            <a:r>
+              <a:rPr lang="en-US" sz="2100" dirty="0" smtClean="0"/>
+              <a:t>Candidate </a:t>
+            </a:r>
+            <a:r>
+              <a:rPr lang="en-US" sz="2100" dirty="0" smtClean="0"/>
+              <a:t>Architecture Overview</a:t>
+            </a:r>
+          </a:p>
+          <a:p>
+            <a:r>
+              <a:rPr lang="en-US" sz="2100" dirty="0" smtClean="0"/>
               <a:t>Demonstration Agent Communication</a:t>
             </a:r>
           </a:p>
           <a:p>
             <a:r>
-              <a:rPr lang="en-US" sz="2000" dirty="0" smtClean="0"/>
+              <a:rPr lang="en-US" sz="2100" dirty="0" smtClean="0"/>
               <a:t>Demonstration Interaction with </a:t>
             </a:r>
             <a:r>
-              <a:rPr lang="en-US" sz="2000" dirty="0" smtClean="0"/>
+              <a:rPr lang="en-US" sz="2100" dirty="0" smtClean="0"/>
               <a:t>Simulator</a:t>
             </a:r>
           </a:p>
           <a:p>
             <a:r>
-              <a:rPr lang="en-US" sz="2000" dirty="0" smtClean="0"/>
+              <a:rPr lang="en-US" sz="2100" dirty="0"/>
+              <a:t>Phase II </a:t>
+            </a:r>
+            <a:r>
+              <a:rPr lang="en-US" sz="2100" dirty="0" smtClean="0"/>
+              <a:t>Deliverables</a:t>
+            </a:r>
+            <a:endParaRPr lang="en-US" sz="2100" dirty="0" smtClean="0"/>
+          </a:p>
+          <a:p>
+            <a:r>
+              <a:rPr lang="en-US" sz="2100" dirty="0"/>
+              <a:t>Project </a:t>
+            </a:r>
+            <a:r>
+              <a:rPr lang="en-US" sz="2100" dirty="0" smtClean="0"/>
+              <a:t>Log, Risks</a:t>
+            </a:r>
+            <a:r>
+              <a:rPr lang="en-US" sz="2100" dirty="0"/>
+              <a:t>, Spikes and </a:t>
+            </a:r>
+            <a:r>
+              <a:rPr lang="en-US" sz="2100" dirty="0" smtClean="0"/>
+              <a:t>Concerns</a:t>
+            </a:r>
+            <a:endParaRPr lang="en-US" sz="2100" dirty="0" smtClean="0"/>
+          </a:p>
+          <a:p>
+            <a:r>
+              <a:rPr lang="en-US" sz="2100" dirty="0" smtClean="0"/>
+              <a:t>Questions/Comments</a:t>
+            </a:r>
+          </a:p>
+          <a:p>
+            <a:r>
+              <a:rPr lang="en-US" sz="2100" dirty="0" smtClean="0"/>
               <a:t>References</a:t>
             </a:r>
-          </a:p>
-          <a:p>
-            <a:r>
-              <a:rPr lang="en-US" sz="2000" dirty="0" smtClean="0"/>
-              <a:t>Phase II Deliverables</a:t>
-            </a:r>
-          </a:p>
-          <a:p>
-            <a:r>
-              <a:rPr lang="en-US" sz="2000" dirty="0" smtClean="0"/>
-              <a:t>Questions/Comments</a:t>
-            </a:r>
-            <a:endParaRPr lang="en-US" sz="2000" dirty="0" smtClean="0"/>
+            <a:endParaRPr lang="en-US" sz="2100" dirty="0"/>
           </a:p>
         </p:txBody>
       </p:sp>
@@ -9075,7 +9093,7 @@
           <a:p>
             <a:r>
               <a:rPr lang="en-US" dirty="0" smtClean="0"/>
-              <a:t>Phase II Deliverables</a:t>
+              <a:t>Project Log</a:t>
             </a:r>
             <a:endParaRPr lang="en-US" dirty="0"/>
           </a:p>
@@ -9103,7 +9121,7 @@
     </p:spTree>
     <p:extLst>
       <p:ext uri="{BB962C8B-B14F-4D97-AF65-F5344CB8AC3E}">
-        <p14:creationId xmlns:p14="http://schemas.microsoft.com/office/powerpoint/2010/main" val="722826162"/>
+        <p14:creationId xmlns:p14="http://schemas.microsoft.com/office/powerpoint/2010/main" val="4154735931"/>
       </p:ext>
     </p:extLst>
   </p:cSld>
@@ -9154,7 +9172,7 @@
           <a:p>
             <a:r>
               <a:rPr lang="en-US" dirty="0" smtClean="0"/>
-              <a:t>Project Log</a:t>
+              <a:t>Project Risks and Spikes</a:t>
             </a:r>
             <a:endParaRPr lang="en-US" dirty="0"/>
           </a:p>
@@ -9182,7 +9200,7 @@
     </p:spTree>
     <p:extLst>
       <p:ext uri="{BB962C8B-B14F-4D97-AF65-F5344CB8AC3E}">
-        <p14:creationId xmlns:p14="http://schemas.microsoft.com/office/powerpoint/2010/main" val="4154735931"/>
+        <p14:creationId xmlns:p14="http://schemas.microsoft.com/office/powerpoint/2010/main" val="810269815"/>
       </p:ext>
     </p:extLst>
   </p:cSld>
@@ -9233,6 +9251,82 @@
           <a:p>
             <a:r>
               <a:rPr lang="en-US" dirty="0" smtClean="0"/>
+              <a:t>Project Concerns</a:t>
+            </a:r>
+            <a:endParaRPr lang="en-US" dirty="0"/>
+          </a:p>
+        </p:txBody>
+      </p:sp>
+      <p:sp>
+        <p:nvSpPr>
+          <p:cNvPr id="3" name="Content Placeholder 2"/>
+          <p:cNvSpPr>
+            <a:spLocks noGrp="1"/>
+          </p:cNvSpPr>
+          <p:nvPr>
+            <p:ph idx="1"/>
+          </p:nvPr>
+        </p:nvSpPr>
+        <p:spPr/>
+        <p:txBody>
+          <a:bodyPr/>
+          <a:lstStyle/>
+          <a:p>
+            <a:r>
+              <a:rPr lang="en-US" dirty="0" smtClean="0"/>
+              <a:t>Am I trying to do too much?</a:t>
+            </a:r>
+            <a:endParaRPr lang="en-US" dirty="0"/>
+          </a:p>
+        </p:txBody>
+      </p:sp>
+    </p:spTree>
+    <p:extLst>
+      <p:ext uri="{BB962C8B-B14F-4D97-AF65-F5344CB8AC3E}">
+        <p14:creationId xmlns:p14="http://schemas.microsoft.com/office/powerpoint/2010/main" val="600425415"/>
+      </p:ext>
+    </p:extLst>
+  </p:cSld>
+  <p:clrMapOvr>
+    <a:masterClrMapping/>
+  </p:clrMapOvr>
+</p:sld>
+</file>
+
+<file path=ppt/slides/slide23.xml><?xml version="1.0" encoding="utf-8"?>
+<p:sld xmlns:a="http://schemas.openxmlformats.org/drawingml/2006/main" xmlns:r="http://schemas.openxmlformats.org/officeDocument/2006/relationships" xmlns:p="http://schemas.openxmlformats.org/presentationml/2006/main">
+  <p:cSld>
+    <p:spTree>
+      <p:nvGrpSpPr>
+        <p:cNvPr id="1" name=""/>
+        <p:cNvGrpSpPr/>
+        <p:nvPr/>
+      </p:nvGrpSpPr>
+      <p:grpSpPr>
+        <a:xfrm>
+          <a:off x="0" y="0"/>
+          <a:ext cx="0" cy="0"/>
+          <a:chOff x="0" y="0"/>
+          <a:chExt cx="0" cy="0"/>
+        </a:xfrm>
+      </p:grpSpPr>
+      <p:sp>
+        <p:nvSpPr>
+          <p:cNvPr id="2" name="Title 1"/>
+          <p:cNvSpPr>
+            <a:spLocks noGrp="1"/>
+          </p:cNvSpPr>
+          <p:nvPr>
+            <p:ph type="title"/>
+          </p:nvPr>
+        </p:nvSpPr>
+        <p:spPr/>
+        <p:txBody>
+          <a:bodyPr/>
+          <a:lstStyle/>
+          <a:p>
+            <a:r>
+              <a:rPr lang="en-US" dirty="0" smtClean="0"/>
               <a:t>Questions and Comments</a:t>
             </a:r>
             <a:endParaRPr lang="en-US" dirty="0"/>
@@ -9278,7 +9372,7 @@
 </p:sld>
 </file>
 
-<file path=ppt/slides/slide23.xml><?xml version="1.0" encoding="utf-8"?>
+<file path=ppt/slides/slide24.xml><?xml version="1.0" encoding="utf-8"?>
 <p:sld xmlns:a="http://schemas.openxmlformats.org/drawingml/2006/main" xmlns:r="http://schemas.openxmlformats.org/officeDocument/2006/relationships" xmlns:p="http://schemas.openxmlformats.org/presentationml/2006/main">
   <p:cSld>
     <p:spTree>
@@ -9418,10 +9512,55 @@
             </a:r>
           </a:p>
           <a:p>
+            <a:pPr marL="0" indent="0">
+              <a:buNone/>
+            </a:pPr>
+            <a:r>
+              <a:rPr lang="en-US" sz="2400" dirty="0">
+                <a:latin typeface="Garamond" pitchFamily="18" charset="0"/>
+              </a:rPr>
+              <a:t>The goal of this project is to create a </a:t>
+            </a:r>
+            <a:r>
+              <a:rPr lang="en-US" sz="2400" dirty="0" err="1">
+                <a:latin typeface="Garamond" pitchFamily="18" charset="0"/>
+              </a:rPr>
+              <a:t>multiagent</a:t>
+            </a:r>
+            <a:r>
+              <a:rPr lang="en-US" sz="2400" dirty="0">
+                <a:latin typeface="Garamond" pitchFamily="18" charset="0"/>
+              </a:rPr>
+              <a:t> system that is capable of traffic light signal control which results in an improved travel experience.</a:t>
+            </a:r>
+          </a:p>
+          <a:p>
+            <a:pPr marL="0" indent="0">
+              <a:buNone/>
+            </a:pPr>
+            <a:endParaRPr lang="en-US" dirty="0" smtClean="0"/>
+          </a:p>
+          <a:p>
             <a:r>
               <a:rPr lang="en-US" dirty="0" smtClean="0"/>
               <a:t>Motivation</a:t>
             </a:r>
+          </a:p>
+          <a:p>
+            <a:pPr marL="0" indent="0">
+              <a:buNone/>
+            </a:pPr>
+            <a:r>
+              <a:rPr lang="en-US" sz="2400" dirty="0">
+                <a:latin typeface="Garamond" pitchFamily="18" charset="0"/>
+              </a:rPr>
+              <a:t>Most traffic light systems today are strictly timing based.  Traffic flow studies are required to create timing plans and atypical conditions cause problems.  It is also very frustrating to have to stop for a red light when there is no opposing traffic.</a:t>
+            </a:r>
+          </a:p>
+          <a:p>
+            <a:pPr marL="0" indent="0">
+              <a:buNone/>
+            </a:pPr>
             <a:endParaRPr lang="en-US" dirty="0"/>
           </a:p>
         </p:txBody>
@@ -9638,11 +9777,7 @@
           <a:p>
             <a:r>
               <a:rPr lang="en-US" dirty="0" smtClean="0"/>
-              <a:t>Project </a:t>
-            </a:r>
-            <a:r>
-              <a:rPr lang="en-US" dirty="0" smtClean="0"/>
-              <a:t>Requirements</a:t>
+              <a:t>Project Requirements</a:t>
             </a:r>
             <a:endParaRPr lang="en-US" dirty="0"/>
           </a:p>

</xml_diff>

<commit_message>
worked on component diagram for Aggregation Spike
</commit_message>
<xml_diff>
--- a/portfolio/PresentationInception.pptx
+++ b/portfolio/PresentationInception.pptx
@@ -6,7 +6,7 @@
     <p:sldMasterId id="2147483660" r:id="rId2"/>
   </p:sldMasterIdLst>
   <p:notesMasterIdLst>
-    <p:notesMasterId r:id="rId27"/>
+    <p:notesMasterId r:id="rId28"/>
   </p:notesMasterIdLst>
   <p:sldIdLst>
     <p:sldId id="256" r:id="rId3"/>
@@ -25,14 +25,15 @@
     <p:sldId id="278" r:id="rId16"/>
     <p:sldId id="259" r:id="rId17"/>
     <p:sldId id="263" r:id="rId18"/>
-    <p:sldId id="264" r:id="rId19"/>
-    <p:sldId id="265" r:id="rId20"/>
-    <p:sldId id="271" r:id="rId21"/>
-    <p:sldId id="262" r:id="rId22"/>
-    <p:sldId id="261" r:id="rId23"/>
-    <p:sldId id="279" r:id="rId24"/>
-    <p:sldId id="267" r:id="rId25"/>
-    <p:sldId id="266" r:id="rId26"/>
+    <p:sldId id="280" r:id="rId19"/>
+    <p:sldId id="264" r:id="rId20"/>
+    <p:sldId id="265" r:id="rId21"/>
+    <p:sldId id="271" r:id="rId22"/>
+    <p:sldId id="262" r:id="rId23"/>
+    <p:sldId id="261" r:id="rId24"/>
+    <p:sldId id="279" r:id="rId25"/>
+    <p:sldId id="267" r:id="rId26"/>
+    <p:sldId id="266" r:id="rId27"/>
   </p:sldIdLst>
   <p:sldSz cx="9144000" cy="6858000" type="letter"/>
   <p:notesSz cx="6858000" cy="9144000"/>
@@ -216,7 +217,7 @@
           <a:p>
             <a:fld id="{89A61C1C-259F-4962-A7D6-71E772769996}" type="datetimeFigureOut">
               <a:rPr lang="en-US" smtClean="0"/>
-              <a:t>2012-01-19</a:t>
+              <a:t>2012-01-25</a:t>
             </a:fld>
             <a:endParaRPr lang="en-US"/>
           </a:p>
@@ -705,18 +706,10 @@
           <a:lstStyle/>
           <a:p>
             <a:r>
-              <a:rPr lang="en-US" dirty="0" smtClean="0"/>
-              <a:t>Include/show Control Flow and</a:t>
-            </a:r>
-            <a:r>
               <a:rPr lang="en-US" baseline="0" dirty="0" smtClean="0"/>
-              <a:t> </a:t>
-            </a:r>
-            <a:r>
-              <a:rPr lang="en-US" baseline="0" smtClean="0"/>
-              <a:t>Sequence Diagrams</a:t>
-            </a:r>
-            <a:endParaRPr lang="en-US"/>
+              <a:t>Sequence Diagram?</a:t>
+            </a:r>
+            <a:endParaRPr lang="en-US" dirty="0"/>
           </a:p>
         </p:txBody>
       </p:sp>
@@ -737,7 +730,7 @@
           <a:p>
             <a:fld id="{2711E407-3140-410D-B1AB-3643DD24E9EF}" type="slidenum">
               <a:rPr lang="en-US" smtClean="0"/>
-              <a:t>17</a:t>
+              <a:t>18</a:t>
             </a:fld>
             <a:endParaRPr lang="en-US"/>
           </a:p>
@@ -1664,7 +1657,7 @@
             <a:fld id="{1D8BD707-D9CF-40AE-B4C6-C98DA3205C09}" type="datetimeFigureOut">
               <a:rPr lang="en-US" smtClean="0"/>
               <a:pPr/>
-              <a:t>2012-01-19</a:t>
+              <a:t>2012-01-25</a:t>
             </a:fld>
             <a:endParaRPr lang="en-US"/>
           </a:p>
@@ -1831,7 +1824,7 @@
             <a:fld id="{1D8BD707-D9CF-40AE-B4C6-C98DA3205C09}" type="datetimeFigureOut">
               <a:rPr lang="en-US" smtClean="0"/>
               <a:pPr/>
-              <a:t>2012-01-19</a:t>
+              <a:t>2012-01-25</a:t>
             </a:fld>
             <a:endParaRPr lang="en-US"/>
           </a:p>
@@ -2008,7 +2001,7 @@
             <a:fld id="{1D8BD707-D9CF-40AE-B4C6-C98DA3205C09}" type="datetimeFigureOut">
               <a:rPr lang="en-US" smtClean="0"/>
               <a:pPr/>
-              <a:t>2012-01-19</a:t>
+              <a:t>2012-01-25</a:t>
             </a:fld>
             <a:endParaRPr lang="en-US"/>
           </a:p>
@@ -4139,7 +4132,7 @@
             <a:fld id="{1D8BD707-D9CF-40AE-B4C6-C98DA3205C09}" type="datetimeFigureOut">
               <a:rPr lang="en-US" smtClean="0"/>
               <a:pPr/>
-              <a:t>2012-01-19</a:t>
+              <a:t>2012-01-25</a:t>
             </a:fld>
             <a:endParaRPr lang="en-US"/>
           </a:p>
@@ -5060,7 +5053,7 @@
             <a:fld id="{1D8BD707-D9CF-40AE-B4C6-C98DA3205C09}" type="datetimeFigureOut">
               <a:rPr lang="en-US" smtClean="0"/>
               <a:pPr/>
-              <a:t>2012-01-19</a:t>
+              <a:t>2012-01-25</a:t>
             </a:fld>
             <a:endParaRPr lang="en-US"/>
           </a:p>
@@ -5345,7 +5338,7 @@
             <a:fld id="{1D8BD707-D9CF-40AE-B4C6-C98DA3205C09}" type="datetimeFigureOut">
               <a:rPr lang="en-US" smtClean="0"/>
               <a:pPr/>
-              <a:t>2012-01-19</a:t>
+              <a:t>2012-01-25</a:t>
             </a:fld>
             <a:endParaRPr lang="en-US"/>
           </a:p>
@@ -5764,7 +5757,7 @@
             <a:fld id="{1D8BD707-D9CF-40AE-B4C6-C98DA3205C09}" type="datetimeFigureOut">
               <a:rPr lang="en-US" smtClean="0"/>
               <a:pPr/>
-              <a:t>2012-01-19</a:t>
+              <a:t>2012-01-25</a:t>
             </a:fld>
             <a:endParaRPr lang="en-US"/>
           </a:p>
@@ -5879,7 +5872,7 @@
             <a:fld id="{1D8BD707-D9CF-40AE-B4C6-C98DA3205C09}" type="datetimeFigureOut">
               <a:rPr lang="en-US" smtClean="0"/>
               <a:pPr/>
-              <a:t>2012-01-19</a:t>
+              <a:t>2012-01-25</a:t>
             </a:fld>
             <a:endParaRPr lang="en-US"/>
           </a:p>
@@ -5971,7 +5964,7 @@
             <a:fld id="{1D8BD707-D9CF-40AE-B4C6-C98DA3205C09}" type="datetimeFigureOut">
               <a:rPr lang="en-US" smtClean="0"/>
               <a:pPr/>
-              <a:t>2012-01-19</a:t>
+              <a:t>2012-01-25</a:t>
             </a:fld>
             <a:endParaRPr lang="en-US"/>
           </a:p>
@@ -6245,7 +6238,7 @@
             <a:fld id="{1D8BD707-D9CF-40AE-B4C6-C98DA3205C09}" type="datetimeFigureOut">
               <a:rPr lang="en-US" smtClean="0"/>
               <a:pPr/>
-              <a:t>2012-01-19</a:t>
+              <a:t>2012-01-25</a:t>
             </a:fld>
             <a:endParaRPr lang="en-US"/>
           </a:p>
@@ -6495,7 +6488,7 @@
             <a:fld id="{1D8BD707-D9CF-40AE-B4C6-C98DA3205C09}" type="datetimeFigureOut">
               <a:rPr lang="en-US" smtClean="0"/>
               <a:pPr/>
-              <a:t>2012-01-19</a:t>
+              <a:t>2012-01-25</a:t>
             </a:fld>
             <a:endParaRPr lang="en-US"/>
           </a:p>
@@ -6705,7 +6698,7 @@
             <a:fld id="{1D8BD707-D9CF-40AE-B4C6-C98DA3205C09}" type="datetimeFigureOut">
               <a:rPr lang="en-US" smtClean="0"/>
               <a:pPr/>
-              <a:t>2012-01-19</a:t>
+              <a:t>2012-01-25</a:t>
             </a:fld>
             <a:endParaRPr lang="en-US"/>
           </a:p>
@@ -8316,11 +8309,7 @@
           <a:p>
             <a:r>
               <a:rPr lang="en-US" dirty="0" smtClean="0"/>
-              <a:t>Cost </a:t>
-            </a:r>
-            <a:r>
-              <a:rPr lang="en-US" dirty="0" smtClean="0"/>
-              <a:t>Estimation</a:t>
+              <a:t>Cost Estimation</a:t>
             </a:r>
             <a:endParaRPr lang="en-US" dirty="0"/>
           </a:p>
@@ -8399,11 +8388,7 @@
           <a:p>
             <a:r>
               <a:rPr lang="en-US" dirty="0" smtClean="0"/>
-              <a:t>Cost </a:t>
-            </a:r>
-            <a:r>
-              <a:rPr lang="en-US" dirty="0" smtClean="0"/>
-              <a:t>Estimation</a:t>
+              <a:t>Cost Estimation</a:t>
             </a:r>
             <a:endParaRPr lang="en-US" dirty="0"/>
           </a:p>
@@ -8633,71 +8618,93 @@
             <p:ph type="title"/>
           </p:nvPr>
         </p:nvSpPr>
-        <p:spPr>
+        <p:spPr/>
+        <p:txBody>
+          <a:bodyPr/>
+          <a:lstStyle/>
+          <a:p>
+            <a:r>
+              <a:rPr lang="en-US" sz="3600" dirty="0" smtClean="0"/>
+              <a:t>Demonstration: Agent Communication</a:t>
+            </a:r>
+            <a:endParaRPr lang="en-US" sz="3600" dirty="0"/>
+          </a:p>
+        </p:txBody>
+      </p:sp>
+      <p:pic>
+        <p:nvPicPr>
+          <p:cNvPr id="1028" name="Picture 4"/>
+          <p:cNvPicPr>
+            <a:picLocks noChangeAspect="1" noChangeArrowheads="1"/>
+          </p:cNvPicPr>
+          <p:nvPr/>
+        </p:nvPicPr>
+        <p:blipFill>
+          <a:blip r:embed="rId2">
+            <a:extLst>
+              <a:ext uri="{28A0092B-C50C-407E-A947-70E740481C1C}">
+                <a14:useLocalDpi xmlns:a14="http://schemas.microsoft.com/office/drawing/2010/main" val="0"/>
+              </a:ext>
+            </a:extLst>
+          </a:blip>
+          <a:srcRect/>
+          <a:stretch>
+            <a:fillRect/>
+          </a:stretch>
+        </p:blipFill>
+        <p:spPr bwMode="auto">
           <a:xfrm>
-            <a:off x="457200" y="274638"/>
-            <a:ext cx="8229600" cy="1858962"/>
+            <a:off x="705320" y="1242377"/>
+            <a:ext cx="7795565" cy="5076181"/>
           </a:xfrm>
+          <a:prstGeom prst="rect">
+            <a:avLst/>
+          </a:prstGeom>
+          <a:noFill/>
+          <a:ln>
+            <a:noFill/>
+          </a:ln>
+          <a:effectLst/>
+          <a:extLst>
+            <a:ext uri="{909E8E84-426E-40DD-AFC4-6F175D3DCCD1}">
+              <a14:hiddenFill xmlns:a14="http://schemas.microsoft.com/office/drawing/2010/main">
+                <a:solidFill>
+                  <a:schemeClr val="accent1"/>
+                </a:solidFill>
+              </a14:hiddenFill>
+            </a:ext>
+            <a:ext uri="{91240B29-F687-4F45-9708-019B960494DF}">
+              <a14:hiddenLine xmlns:a14="http://schemas.microsoft.com/office/drawing/2010/main" w="9525">
+                <a:solidFill>
+                  <a:schemeClr val="tx1"/>
+                </a:solidFill>
+                <a:miter lim="800000"/>
+                <a:headEnd/>
+                <a:tailEnd/>
+              </a14:hiddenLine>
+            </a:ext>
+            <a:ext uri="{AF507438-7753-43E0-B8FC-AC1667EBCBE1}">
+              <a14:hiddenEffects xmlns:a14="http://schemas.microsoft.com/office/drawing/2010/main">
+                <a:effectLst>
+                  <a:outerShdw dist="35921" dir="2700000" algn="ctr" rotWithShape="0">
+                    <a:schemeClr val="bg2"/>
+                  </a:outerShdw>
+                </a:effectLst>
+              </a14:hiddenEffects>
+            </a:ext>
+          </a:extLst>
         </p:spPr>
-        <p:txBody>
-          <a:bodyPr/>
-          <a:lstStyle/>
-          <a:p>
-            <a:r>
-              <a:rPr lang="en-US" dirty="0" smtClean="0"/>
-              <a:t>Demonstration Agent Communication</a:t>
-            </a:r>
-            <a:br>
-              <a:rPr lang="en-US" dirty="0" smtClean="0"/>
-            </a:br>
-            <a:endParaRPr lang="en-US" dirty="0"/>
-          </a:p>
-        </p:txBody>
-      </p:sp>
-      <p:sp>
-        <p:nvSpPr>
-          <p:cNvPr id="3" name="Content Placeholder 2"/>
-          <p:cNvSpPr>
-            <a:spLocks noGrp="1"/>
-          </p:cNvSpPr>
-          <p:nvPr>
-            <p:ph idx="1"/>
-          </p:nvPr>
-        </p:nvSpPr>
-        <p:spPr>
-          <a:xfrm>
-            <a:off x="457200" y="1905000"/>
-            <a:ext cx="8229600" cy="4221163"/>
-          </a:xfrm>
-        </p:spPr>
-        <p:txBody>
-          <a:bodyPr/>
-          <a:lstStyle/>
-          <a:p>
-            <a:pPr marL="0" indent="0">
-              <a:buNone/>
-            </a:pPr>
-            <a:endParaRPr lang="en-US" dirty="0"/>
-          </a:p>
-        </p:txBody>
-      </p:sp>
+      </p:pic>
     </p:spTree>
     <p:extLst>
       <p:ext uri="{BB962C8B-B14F-4D97-AF65-F5344CB8AC3E}">
-        <p14:creationId xmlns:p14="http://schemas.microsoft.com/office/powerpoint/2010/main" val="3310161817"/>
+        <p14:creationId xmlns:p14="http://schemas.microsoft.com/office/powerpoint/2010/main" val="3789268478"/>
       </p:ext>
     </p:extLst>
   </p:cSld>
   <p:clrMapOvr>
     <a:masterClrMapping/>
   </p:clrMapOvr>
-  <p:timing>
-    <p:tnLst>
-      <p:par>
-        <p:cTn id="1" dur="indefinite" restart="never" nodeType="tmRoot"/>
-      </p:par>
-    </p:tnLst>
-  </p:timing>
 </p:sld>
 </file>
 
@@ -8740,7 +8747,7 @@
           <a:p>
             <a:r>
               <a:rPr lang="en-US" dirty="0" smtClean="0"/>
-              <a:t>Demonstration Interaction with Simulator</a:t>
+              <a:t>Demonstration Agent Communication</a:t>
             </a:r>
             <a:br>
               <a:rPr lang="en-US" dirty="0" smtClean="0"/>
@@ -8761,14 +8768,17 @@
         </p:nvSpPr>
         <p:spPr>
           <a:xfrm>
-            <a:off x="457200" y="2057400"/>
-            <a:ext cx="8229600" cy="4068763"/>
+            <a:off x="457200" y="1905000"/>
+            <a:ext cx="8229600" cy="4221163"/>
           </a:xfrm>
         </p:spPr>
         <p:txBody>
           <a:bodyPr/>
           <a:lstStyle/>
           <a:p>
+            <a:pPr marL="0" indent="0">
+              <a:buNone/>
+            </a:pPr>
             <a:endParaRPr lang="en-US" dirty="0"/>
           </a:p>
         </p:txBody>
@@ -8776,7 +8786,7 @@
     </p:spTree>
     <p:extLst>
       <p:ext uri="{BB962C8B-B14F-4D97-AF65-F5344CB8AC3E}">
-        <p14:creationId xmlns:p14="http://schemas.microsoft.com/office/powerpoint/2010/main" val="3794968801"/>
+        <p14:creationId xmlns:p14="http://schemas.microsoft.com/office/powerpoint/2010/main" val="3310161817"/>
       </p:ext>
     </p:extLst>
   </p:cSld>
@@ -8820,15 +8830,23 @@
             <p:ph type="title"/>
           </p:nvPr>
         </p:nvSpPr>
-        <p:spPr/>
+        <p:spPr>
+          <a:xfrm>
+            <a:off x="457200" y="274638"/>
+            <a:ext cx="8229600" cy="1858962"/>
+          </a:xfrm>
+        </p:spPr>
         <p:txBody>
           <a:bodyPr/>
           <a:lstStyle/>
           <a:p>
             <a:r>
               <a:rPr lang="en-US" dirty="0" smtClean="0"/>
-              <a:t>Phase II Deliverables</a:t>
-            </a:r>
+              <a:t>Demonstration Interaction with Simulator</a:t>
+            </a:r>
+            <a:br>
+              <a:rPr lang="en-US" dirty="0" smtClean="0"/>
+            </a:br>
             <a:endParaRPr lang="en-US" dirty="0"/>
           </a:p>
         </p:txBody>
@@ -8843,19 +8861,24 @@
             <p:ph idx="1"/>
           </p:nvPr>
         </p:nvSpPr>
-        <p:spPr/>
-        <p:txBody>
-          <a:bodyPr/>
-          <a:lstStyle/>
-          <a:p>
-            <a:endParaRPr lang="en-US"/>
+        <p:spPr>
+          <a:xfrm>
+            <a:off x="457200" y="2057400"/>
+            <a:ext cx="8229600" cy="4068763"/>
+          </a:xfrm>
+        </p:spPr>
+        <p:txBody>
+          <a:bodyPr/>
+          <a:lstStyle/>
+          <a:p>
+            <a:endParaRPr lang="en-US" dirty="0"/>
           </a:p>
         </p:txBody>
       </p:sp>
     </p:spTree>
     <p:extLst>
       <p:ext uri="{BB962C8B-B14F-4D97-AF65-F5344CB8AC3E}">
-        <p14:creationId xmlns:p14="http://schemas.microsoft.com/office/powerpoint/2010/main" val="722826162"/>
+        <p14:creationId xmlns:p14="http://schemas.microsoft.com/office/powerpoint/2010/main" val="3794968801"/>
       </p:ext>
     </p:extLst>
   </p:cSld>
@@ -8971,11 +8994,7 @@
           <a:p>
             <a:r>
               <a:rPr lang="en-US" sz="2100" dirty="0" smtClean="0"/>
-              <a:t>Candidate </a:t>
-            </a:r>
-            <a:r>
-              <a:rPr lang="en-US" sz="2100" dirty="0" smtClean="0"/>
-              <a:t>Architecture Overview</a:t>
+              <a:t>Candidate Architecture Overview</a:t>
             </a:r>
           </a:p>
           <a:p>
@@ -8987,11 +9006,7 @@
           <a:p>
             <a:r>
               <a:rPr lang="en-US" sz="2100" dirty="0" smtClean="0"/>
-              <a:t>Demonstration Interaction with </a:t>
-            </a:r>
-            <a:r>
-              <a:rPr lang="en-US" sz="2100" dirty="0" smtClean="0"/>
-              <a:t>Simulator</a:t>
+              <a:t>Demonstration Interaction with Simulator</a:t>
             </a:r>
           </a:p>
           <a:p>
@@ -9003,7 +9018,6 @@
               <a:rPr lang="en-US" sz="2100" dirty="0" smtClean="0"/>
               <a:t>Deliverables</a:t>
             </a:r>
-            <a:endParaRPr lang="en-US" sz="2100" dirty="0" smtClean="0"/>
           </a:p>
           <a:p>
             <a:r>
@@ -9022,7 +9036,6 @@
               <a:rPr lang="en-US" sz="2100" dirty="0" smtClean="0"/>
               <a:t>Concerns</a:t>
             </a:r>
-            <a:endParaRPr lang="en-US" sz="2100" dirty="0" smtClean="0"/>
           </a:p>
           <a:p>
             <a:r>
@@ -9093,7 +9106,7 @@
           <a:p>
             <a:r>
               <a:rPr lang="en-US" dirty="0" smtClean="0"/>
-              <a:t>Project Log</a:t>
+              <a:t>Phase II Deliverables</a:t>
             </a:r>
             <a:endParaRPr lang="en-US" dirty="0"/>
           </a:p>
@@ -9121,7 +9134,7 @@
     </p:spTree>
     <p:extLst>
       <p:ext uri="{BB962C8B-B14F-4D97-AF65-F5344CB8AC3E}">
-        <p14:creationId xmlns:p14="http://schemas.microsoft.com/office/powerpoint/2010/main" val="4154735931"/>
+        <p14:creationId xmlns:p14="http://schemas.microsoft.com/office/powerpoint/2010/main" val="722826162"/>
       </p:ext>
     </p:extLst>
   </p:cSld>
@@ -9172,7 +9185,7 @@
           <a:p>
             <a:r>
               <a:rPr lang="en-US" dirty="0" smtClean="0"/>
-              <a:t>Project Risks and Spikes</a:t>
+              <a:t>Project Log</a:t>
             </a:r>
             <a:endParaRPr lang="en-US" dirty="0"/>
           </a:p>
@@ -9200,7 +9213,7 @@
     </p:spTree>
     <p:extLst>
       <p:ext uri="{BB962C8B-B14F-4D97-AF65-F5344CB8AC3E}">
-        <p14:creationId xmlns:p14="http://schemas.microsoft.com/office/powerpoint/2010/main" val="810269815"/>
+        <p14:creationId xmlns:p14="http://schemas.microsoft.com/office/powerpoint/2010/main" val="4154735931"/>
       </p:ext>
     </p:extLst>
   </p:cSld>
@@ -9251,7 +9264,7 @@
           <a:p>
             <a:r>
               <a:rPr lang="en-US" dirty="0" smtClean="0"/>
-              <a:t>Project Concerns</a:t>
+              <a:t>Project Risks and Spikes</a:t>
             </a:r>
             <a:endParaRPr lang="en-US" dirty="0"/>
           </a:p>
@@ -9272,24 +9285,27 @@
           <a:bodyPr/>
           <a:lstStyle/>
           <a:p>
-            <a:r>
-              <a:rPr lang="en-US" dirty="0" smtClean="0"/>
-              <a:t>Am I trying to do too much?</a:t>
-            </a:r>
-            <a:endParaRPr lang="en-US" dirty="0"/>
+            <a:endParaRPr lang="en-US"/>
           </a:p>
         </p:txBody>
       </p:sp>
     </p:spTree>
     <p:extLst>
       <p:ext uri="{BB962C8B-B14F-4D97-AF65-F5344CB8AC3E}">
-        <p14:creationId xmlns:p14="http://schemas.microsoft.com/office/powerpoint/2010/main" val="600425415"/>
+        <p14:creationId xmlns:p14="http://schemas.microsoft.com/office/powerpoint/2010/main" val="810269815"/>
       </p:ext>
     </p:extLst>
   </p:cSld>
   <p:clrMapOvr>
     <a:masterClrMapping/>
   </p:clrMapOvr>
+  <p:timing>
+    <p:tnLst>
+      <p:par>
+        <p:cTn id="1" dur="indefinite" restart="never" nodeType="tmRoot"/>
+      </p:par>
+    </p:tnLst>
+  </p:timing>
 </p:sld>
 </file>
 
@@ -9327,6 +9343,82 @@
           <a:p>
             <a:r>
               <a:rPr lang="en-US" dirty="0" smtClean="0"/>
+              <a:t>Project Concerns</a:t>
+            </a:r>
+            <a:endParaRPr lang="en-US" dirty="0"/>
+          </a:p>
+        </p:txBody>
+      </p:sp>
+      <p:sp>
+        <p:nvSpPr>
+          <p:cNvPr id="3" name="Content Placeholder 2"/>
+          <p:cNvSpPr>
+            <a:spLocks noGrp="1"/>
+          </p:cNvSpPr>
+          <p:nvPr>
+            <p:ph idx="1"/>
+          </p:nvPr>
+        </p:nvSpPr>
+        <p:spPr/>
+        <p:txBody>
+          <a:bodyPr/>
+          <a:lstStyle/>
+          <a:p>
+            <a:r>
+              <a:rPr lang="en-US" dirty="0" smtClean="0"/>
+              <a:t>Am I trying to do too much?</a:t>
+            </a:r>
+            <a:endParaRPr lang="en-US" dirty="0"/>
+          </a:p>
+        </p:txBody>
+      </p:sp>
+    </p:spTree>
+    <p:extLst>
+      <p:ext uri="{BB962C8B-B14F-4D97-AF65-F5344CB8AC3E}">
+        <p14:creationId xmlns:p14="http://schemas.microsoft.com/office/powerpoint/2010/main" val="600425415"/>
+      </p:ext>
+    </p:extLst>
+  </p:cSld>
+  <p:clrMapOvr>
+    <a:masterClrMapping/>
+  </p:clrMapOvr>
+</p:sld>
+</file>
+
+<file path=ppt/slides/slide24.xml><?xml version="1.0" encoding="utf-8"?>
+<p:sld xmlns:a="http://schemas.openxmlformats.org/drawingml/2006/main" xmlns:r="http://schemas.openxmlformats.org/officeDocument/2006/relationships" xmlns:p="http://schemas.openxmlformats.org/presentationml/2006/main">
+  <p:cSld>
+    <p:spTree>
+      <p:nvGrpSpPr>
+        <p:cNvPr id="1" name=""/>
+        <p:cNvGrpSpPr/>
+        <p:nvPr/>
+      </p:nvGrpSpPr>
+      <p:grpSpPr>
+        <a:xfrm>
+          <a:off x="0" y="0"/>
+          <a:ext cx="0" cy="0"/>
+          <a:chOff x="0" y="0"/>
+          <a:chExt cx="0" cy="0"/>
+        </a:xfrm>
+      </p:grpSpPr>
+      <p:sp>
+        <p:nvSpPr>
+          <p:cNvPr id="2" name="Title 1"/>
+          <p:cNvSpPr>
+            <a:spLocks noGrp="1"/>
+          </p:cNvSpPr>
+          <p:nvPr>
+            <p:ph type="title"/>
+          </p:nvPr>
+        </p:nvSpPr>
+        <p:spPr/>
+        <p:txBody>
+          <a:bodyPr/>
+          <a:lstStyle/>
+          <a:p>
+            <a:r>
+              <a:rPr lang="en-US" dirty="0" smtClean="0"/>
               <a:t>Questions and Comments</a:t>
             </a:r>
             <a:endParaRPr lang="en-US" dirty="0"/>
@@ -9372,7 +9464,7 @@
 </p:sld>
 </file>
 
-<file path=ppt/slides/slide24.xml><?xml version="1.0" encoding="utf-8"?>
+<file path=ppt/slides/slide25.xml><?xml version="1.0" encoding="utf-8"?>
 <p:sld xmlns:a="http://schemas.openxmlformats.org/drawingml/2006/main" xmlns:r="http://schemas.openxmlformats.org/officeDocument/2006/relationships" xmlns:p="http://schemas.openxmlformats.org/presentationml/2006/main">
   <p:cSld>
     <p:spTree>

</xml_diff>

<commit_message>
working on aggregate spike diagrams
</commit_message>
<xml_diff>
--- a/portfolio/PresentationInception.pptx
+++ b/portfolio/PresentationInception.pptx
@@ -6,7 +6,7 @@
     <p:sldMasterId id="2147483660" r:id="rId2"/>
   </p:sldMasterIdLst>
   <p:notesMasterIdLst>
-    <p:notesMasterId r:id="rId28"/>
+    <p:notesMasterId r:id="rId29"/>
   </p:notesMasterIdLst>
   <p:sldIdLst>
     <p:sldId id="256" r:id="rId3"/>
@@ -27,13 +27,14 @@
     <p:sldId id="263" r:id="rId18"/>
     <p:sldId id="280" r:id="rId19"/>
     <p:sldId id="264" r:id="rId20"/>
-    <p:sldId id="265" r:id="rId21"/>
-    <p:sldId id="271" r:id="rId22"/>
-    <p:sldId id="262" r:id="rId23"/>
-    <p:sldId id="261" r:id="rId24"/>
-    <p:sldId id="279" r:id="rId25"/>
-    <p:sldId id="267" r:id="rId26"/>
-    <p:sldId id="266" r:id="rId27"/>
+    <p:sldId id="281" r:id="rId21"/>
+    <p:sldId id="265" r:id="rId22"/>
+    <p:sldId id="271" r:id="rId23"/>
+    <p:sldId id="262" r:id="rId24"/>
+    <p:sldId id="261" r:id="rId25"/>
+    <p:sldId id="279" r:id="rId26"/>
+    <p:sldId id="267" r:id="rId27"/>
+    <p:sldId id="266" r:id="rId28"/>
   </p:sldIdLst>
   <p:sldSz cx="9144000" cy="6858000" type="letter"/>
   <p:notesSz cx="6858000" cy="9144000"/>
@@ -707,6 +708,100 @@
           <a:p>
             <a:r>
               <a:rPr lang="en-US" baseline="0" dirty="0" smtClean="0"/>
+              <a:t>Consumers, Producers and Queues</a:t>
+            </a:r>
+          </a:p>
+          <a:p>
+            <a:r>
+              <a:rPr lang="en-US" baseline="0" dirty="0" smtClean="0"/>
+              <a:t>Agents denoted by red boxes</a:t>
+            </a:r>
+            <a:endParaRPr lang="en-US" dirty="0"/>
+          </a:p>
+        </p:txBody>
+      </p:sp>
+      <p:sp>
+        <p:nvSpPr>
+          <p:cNvPr id="4" name="Slide Number Placeholder 3"/>
+          <p:cNvSpPr>
+            <a:spLocks noGrp="1"/>
+          </p:cNvSpPr>
+          <p:nvPr>
+            <p:ph type="sldNum" sz="quarter" idx="10"/>
+          </p:nvPr>
+        </p:nvSpPr>
+        <p:spPr/>
+        <p:txBody>
+          <a:bodyPr/>
+          <a:lstStyle/>
+          <a:p>
+            <a:fld id="{2711E407-3140-410D-B1AB-3643DD24E9EF}" type="slidenum">
+              <a:rPr lang="en-US" smtClean="0"/>
+              <a:t>18</a:t>
+            </a:fld>
+            <a:endParaRPr lang="en-US"/>
+          </a:p>
+        </p:txBody>
+      </p:sp>
+    </p:spTree>
+    <p:extLst>
+      <p:ext uri="{BB962C8B-B14F-4D97-AF65-F5344CB8AC3E}">
+        <p14:creationId xmlns:p14="http://schemas.microsoft.com/office/powerpoint/2010/main" val="493092143"/>
+      </p:ext>
+    </p:extLst>
+  </p:cSld>
+  <p:clrMapOvr>
+    <a:masterClrMapping/>
+  </p:clrMapOvr>
+</p:notes>
+</file>
+
+<file path=ppt/notesSlides/notesSlide12.xml><?xml version="1.0" encoding="utf-8"?>
+<p:notes xmlns:a="http://schemas.openxmlformats.org/drawingml/2006/main" xmlns:r="http://schemas.openxmlformats.org/officeDocument/2006/relationships" xmlns:p="http://schemas.openxmlformats.org/presentationml/2006/main">
+  <p:cSld>
+    <p:spTree>
+      <p:nvGrpSpPr>
+        <p:cNvPr id="1" name=""/>
+        <p:cNvGrpSpPr/>
+        <p:nvPr/>
+      </p:nvGrpSpPr>
+      <p:grpSpPr>
+        <a:xfrm>
+          <a:off x="0" y="0"/>
+          <a:ext cx="0" cy="0"/>
+          <a:chOff x="0" y="0"/>
+          <a:chExt cx="0" cy="0"/>
+        </a:xfrm>
+      </p:grpSpPr>
+      <p:sp>
+        <p:nvSpPr>
+          <p:cNvPr id="2" name="Slide Image Placeholder 1"/>
+          <p:cNvSpPr>
+            <a:spLocks noGrp="1" noRot="1" noChangeAspect="1"/>
+          </p:cNvSpPr>
+          <p:nvPr>
+            <p:ph type="sldImg"/>
+          </p:nvPr>
+        </p:nvSpPr>
+        <p:spPr/>
+      </p:sp>
+      <p:sp>
+        <p:nvSpPr>
+          <p:cNvPr id="3" name="Notes Placeholder 2"/>
+          <p:cNvSpPr>
+            <a:spLocks noGrp="1"/>
+          </p:cNvSpPr>
+          <p:nvPr>
+            <p:ph type="body" idx="1"/>
+          </p:nvPr>
+        </p:nvSpPr>
+        <p:spPr/>
+        <p:txBody>
+          <a:bodyPr/>
+          <a:lstStyle/>
+          <a:p>
+            <a:r>
+              <a:rPr lang="en-US" baseline="0" dirty="0" smtClean="0"/>
               <a:t>Sequence Diagram?</a:t>
             </a:r>
             <a:endParaRPr lang="en-US" dirty="0"/>
@@ -730,7 +825,7 @@
           <a:p>
             <a:fld id="{2711E407-3140-410D-B1AB-3643DD24E9EF}" type="slidenum">
               <a:rPr lang="en-US" smtClean="0"/>
-              <a:t>18</a:t>
+              <a:t>19</a:t>
             </a:fld>
             <a:endParaRPr lang="en-US"/>
           </a:p>
@@ -8705,6 +8800,13 @@
   <p:clrMapOvr>
     <a:masterClrMapping/>
   </p:clrMapOvr>
+  <p:timing>
+    <p:tnLst>
+      <p:par>
+        <p:cTn id="1" dur="indefinite" restart="never" nodeType="tmRoot"/>
+      </p:par>
+    </p:tnLst>
+  </p:timing>
 </p:sld>
 </file>
 
@@ -8738,7 +8840,7 @@
         <p:spPr>
           <a:xfrm>
             <a:off x="457200" y="274638"/>
-            <a:ext cx="8229600" cy="1858962"/>
+            <a:ext cx="8229600" cy="944562"/>
           </a:xfrm>
         </p:spPr>
         <p:txBody>
@@ -8746,43 +8848,47 @@
           <a:lstStyle/>
           <a:p>
             <a:r>
-              <a:rPr lang="en-US" dirty="0" smtClean="0"/>
-              <a:t>Demonstration Agent Communication</a:t>
-            </a:r>
-            <a:br>
-              <a:rPr lang="en-US" dirty="0" smtClean="0"/>
-            </a:br>
+              <a:rPr lang="en-US" sz="3600" dirty="0" smtClean="0"/>
+              <a:t>Demonstration Agent </a:t>
+            </a:r>
+            <a:r>
+              <a:rPr lang="en-US" sz="3600" dirty="0" smtClean="0"/>
+              <a:t>Communication</a:t>
+            </a:r>
             <a:endParaRPr lang="en-US" dirty="0"/>
           </a:p>
         </p:txBody>
       </p:sp>
-      <p:sp>
-        <p:nvSpPr>
-          <p:cNvPr id="3" name="Content Placeholder 2"/>
-          <p:cNvSpPr>
-            <a:spLocks noGrp="1"/>
-          </p:cNvSpPr>
-          <p:nvPr>
-            <p:ph idx="1"/>
-          </p:nvPr>
-        </p:nvSpPr>
+      <p:pic>
+        <p:nvPicPr>
+          <p:cNvPr id="4" name="Picture 3"/>
+          <p:cNvPicPr>
+            <a:picLocks noChangeAspect="1"/>
+          </p:cNvPicPr>
+          <p:nvPr/>
+        </p:nvPicPr>
+        <p:blipFill>
+          <a:blip r:embed="rId3" cstate="print">
+            <a:extLst>
+              <a:ext uri="{28A0092B-C50C-407E-A947-70E740481C1C}">
+                <a14:useLocalDpi xmlns:a14="http://schemas.microsoft.com/office/drawing/2010/main" val="0"/>
+              </a:ext>
+            </a:extLst>
+          </a:blip>
+          <a:stretch>
+            <a:fillRect/>
+          </a:stretch>
+        </p:blipFill>
         <p:spPr>
           <a:xfrm>
-            <a:off x="457200" y="1905000"/>
-            <a:ext cx="8229600" cy="4221163"/>
+            <a:off x="478974" y="1019874"/>
+            <a:ext cx="8305800" cy="5359074"/>
           </a:xfrm>
+          <a:prstGeom prst="rect">
+            <a:avLst/>
+          </a:prstGeom>
         </p:spPr>
-        <p:txBody>
-          <a:bodyPr/>
-          <a:lstStyle/>
-          <a:p>
-            <a:pPr marL="0" indent="0">
-              <a:buNone/>
-            </a:pPr>
-            <a:endParaRPr lang="en-US" dirty="0"/>
-          </a:p>
-        </p:txBody>
-      </p:sp>
+      </p:pic>
     </p:spTree>
     <p:extLst>
       <p:ext uri="{BB962C8B-B14F-4D97-AF65-F5344CB8AC3E}">
@@ -8832,8 +8938,8 @@
         </p:nvSpPr>
         <p:spPr>
           <a:xfrm>
-            <a:off x="457200" y="274638"/>
-            <a:ext cx="8229600" cy="1858962"/>
+            <a:off x="469735" y="152400"/>
+            <a:ext cx="8229600" cy="838200"/>
           </a:xfrm>
         </p:spPr>
         <p:txBody>
@@ -8841,44 +8947,51 @@
           <a:lstStyle/>
           <a:p>
             <a:r>
-              <a:rPr lang="en-US" dirty="0" smtClean="0"/>
-              <a:t>Demonstration Interaction with Simulator</a:t>
-            </a:r>
-            <a:br>
-              <a:rPr lang="en-US" dirty="0" smtClean="0"/>
-            </a:br>
+              <a:rPr lang="en-US" sz="3600" dirty="0" smtClean="0"/>
+              <a:t>Demonstration Agent </a:t>
+            </a:r>
+            <a:r>
+              <a:rPr lang="en-US" sz="3600" dirty="0" smtClean="0"/>
+              <a:t>Communication</a:t>
+            </a:r>
             <a:endParaRPr lang="en-US" dirty="0"/>
           </a:p>
         </p:txBody>
       </p:sp>
-      <p:sp>
-        <p:nvSpPr>
-          <p:cNvPr id="3" name="Content Placeholder 2"/>
-          <p:cNvSpPr>
-            <a:spLocks noGrp="1"/>
-          </p:cNvSpPr>
-          <p:nvPr>
-            <p:ph idx="1"/>
-          </p:nvPr>
-        </p:nvSpPr>
+      <p:pic>
+        <p:nvPicPr>
+          <p:cNvPr id="3" name="Picture 2"/>
+          <p:cNvPicPr>
+            <a:picLocks noChangeAspect="1"/>
+          </p:cNvPicPr>
+          <p:nvPr/>
+        </p:nvPicPr>
+        <p:blipFill>
+          <a:blip r:embed="rId3" cstate="print">
+            <a:extLst>
+              <a:ext uri="{28A0092B-C50C-407E-A947-70E740481C1C}">
+                <a14:useLocalDpi xmlns:a14="http://schemas.microsoft.com/office/drawing/2010/main" val="0"/>
+              </a:ext>
+            </a:extLst>
+          </a:blip>
+          <a:stretch>
+            <a:fillRect/>
+          </a:stretch>
+        </p:blipFill>
         <p:spPr>
           <a:xfrm>
-            <a:off x="457200" y="2057400"/>
-            <a:ext cx="8229600" cy="4068763"/>
+            <a:off x="415637" y="914400"/>
+            <a:ext cx="8312727" cy="5532082"/>
           </a:xfrm>
+          <a:prstGeom prst="rect">
+            <a:avLst/>
+          </a:prstGeom>
         </p:spPr>
-        <p:txBody>
-          <a:bodyPr/>
-          <a:lstStyle/>
-          <a:p>
-            <a:endParaRPr lang="en-US" dirty="0"/>
-          </a:p>
-        </p:txBody>
-      </p:sp>
+      </p:pic>
     </p:spTree>
     <p:extLst>
       <p:ext uri="{BB962C8B-B14F-4D97-AF65-F5344CB8AC3E}">
-        <p14:creationId xmlns:p14="http://schemas.microsoft.com/office/powerpoint/2010/main" val="3794968801"/>
+        <p14:creationId xmlns:p14="http://schemas.microsoft.com/office/powerpoint/2010/main" val="2675656598"/>
       </p:ext>
     </p:extLst>
   </p:cSld>
@@ -9099,15 +9212,23 @@
             <p:ph type="title"/>
           </p:nvPr>
         </p:nvSpPr>
-        <p:spPr/>
+        <p:spPr>
+          <a:xfrm>
+            <a:off x="457200" y="274638"/>
+            <a:ext cx="8229600" cy="1858962"/>
+          </a:xfrm>
+        </p:spPr>
         <p:txBody>
           <a:bodyPr/>
           <a:lstStyle/>
           <a:p>
             <a:r>
               <a:rPr lang="en-US" dirty="0" smtClean="0"/>
-              <a:t>Phase II Deliverables</a:t>
-            </a:r>
+              <a:t>Demonstration Interaction with Simulator</a:t>
+            </a:r>
+            <a:br>
+              <a:rPr lang="en-US" dirty="0" smtClean="0"/>
+            </a:br>
             <a:endParaRPr lang="en-US" dirty="0"/>
           </a:p>
         </p:txBody>
@@ -9122,19 +9243,24 @@
             <p:ph idx="1"/>
           </p:nvPr>
         </p:nvSpPr>
-        <p:spPr/>
-        <p:txBody>
-          <a:bodyPr/>
-          <a:lstStyle/>
-          <a:p>
-            <a:endParaRPr lang="en-US"/>
+        <p:spPr>
+          <a:xfrm>
+            <a:off x="457200" y="2057400"/>
+            <a:ext cx="8229600" cy="4068763"/>
+          </a:xfrm>
+        </p:spPr>
+        <p:txBody>
+          <a:bodyPr/>
+          <a:lstStyle/>
+          <a:p>
+            <a:endParaRPr lang="en-US" dirty="0"/>
           </a:p>
         </p:txBody>
       </p:sp>
     </p:spTree>
     <p:extLst>
       <p:ext uri="{BB962C8B-B14F-4D97-AF65-F5344CB8AC3E}">
-        <p14:creationId xmlns:p14="http://schemas.microsoft.com/office/powerpoint/2010/main" val="722826162"/>
+        <p14:creationId xmlns:p14="http://schemas.microsoft.com/office/powerpoint/2010/main" val="3794968801"/>
       </p:ext>
     </p:extLst>
   </p:cSld>
@@ -9185,7 +9311,7 @@
           <a:p>
             <a:r>
               <a:rPr lang="en-US" dirty="0" smtClean="0"/>
-              <a:t>Project Log</a:t>
+              <a:t>Phase II Deliverables</a:t>
             </a:r>
             <a:endParaRPr lang="en-US" dirty="0"/>
           </a:p>
@@ -9213,7 +9339,7 @@
     </p:spTree>
     <p:extLst>
       <p:ext uri="{BB962C8B-B14F-4D97-AF65-F5344CB8AC3E}">
-        <p14:creationId xmlns:p14="http://schemas.microsoft.com/office/powerpoint/2010/main" val="4154735931"/>
+        <p14:creationId xmlns:p14="http://schemas.microsoft.com/office/powerpoint/2010/main" val="722826162"/>
       </p:ext>
     </p:extLst>
   </p:cSld>
@@ -9264,7 +9390,7 @@
           <a:p>
             <a:r>
               <a:rPr lang="en-US" dirty="0" smtClean="0"/>
-              <a:t>Project Risks and Spikes</a:t>
+              <a:t>Project Log</a:t>
             </a:r>
             <a:endParaRPr lang="en-US" dirty="0"/>
           </a:p>
@@ -9292,7 +9418,7 @@
     </p:spTree>
     <p:extLst>
       <p:ext uri="{BB962C8B-B14F-4D97-AF65-F5344CB8AC3E}">
-        <p14:creationId xmlns:p14="http://schemas.microsoft.com/office/powerpoint/2010/main" val="810269815"/>
+        <p14:creationId xmlns:p14="http://schemas.microsoft.com/office/powerpoint/2010/main" val="4154735931"/>
       </p:ext>
     </p:extLst>
   </p:cSld>
@@ -9343,7 +9469,7 @@
           <a:p>
             <a:r>
               <a:rPr lang="en-US" dirty="0" smtClean="0"/>
-              <a:t>Project Concerns</a:t>
+              <a:t>Project Risks and Spikes</a:t>
             </a:r>
             <a:endParaRPr lang="en-US" dirty="0"/>
           </a:p>
@@ -9364,24 +9490,27 @@
           <a:bodyPr/>
           <a:lstStyle/>
           <a:p>
-            <a:r>
-              <a:rPr lang="en-US" dirty="0" smtClean="0"/>
-              <a:t>Am I trying to do too much?</a:t>
-            </a:r>
-            <a:endParaRPr lang="en-US" dirty="0"/>
+            <a:endParaRPr lang="en-US"/>
           </a:p>
         </p:txBody>
       </p:sp>
     </p:spTree>
     <p:extLst>
       <p:ext uri="{BB962C8B-B14F-4D97-AF65-F5344CB8AC3E}">
-        <p14:creationId xmlns:p14="http://schemas.microsoft.com/office/powerpoint/2010/main" val="600425415"/>
+        <p14:creationId xmlns:p14="http://schemas.microsoft.com/office/powerpoint/2010/main" val="810269815"/>
       </p:ext>
     </p:extLst>
   </p:cSld>
   <p:clrMapOvr>
     <a:masterClrMapping/>
   </p:clrMapOvr>
+  <p:timing>
+    <p:tnLst>
+      <p:par>
+        <p:cTn id="1" dur="indefinite" restart="never" nodeType="tmRoot"/>
+      </p:par>
+    </p:tnLst>
+  </p:timing>
 </p:sld>
 </file>
 
@@ -9419,6 +9548,82 @@
           <a:p>
             <a:r>
               <a:rPr lang="en-US" dirty="0" smtClean="0"/>
+              <a:t>Project Concerns</a:t>
+            </a:r>
+            <a:endParaRPr lang="en-US" dirty="0"/>
+          </a:p>
+        </p:txBody>
+      </p:sp>
+      <p:sp>
+        <p:nvSpPr>
+          <p:cNvPr id="3" name="Content Placeholder 2"/>
+          <p:cNvSpPr>
+            <a:spLocks noGrp="1"/>
+          </p:cNvSpPr>
+          <p:nvPr>
+            <p:ph idx="1"/>
+          </p:nvPr>
+        </p:nvSpPr>
+        <p:spPr/>
+        <p:txBody>
+          <a:bodyPr/>
+          <a:lstStyle/>
+          <a:p>
+            <a:r>
+              <a:rPr lang="en-US" dirty="0" smtClean="0"/>
+              <a:t>Am I trying to do too much?</a:t>
+            </a:r>
+            <a:endParaRPr lang="en-US" dirty="0"/>
+          </a:p>
+        </p:txBody>
+      </p:sp>
+    </p:spTree>
+    <p:extLst>
+      <p:ext uri="{BB962C8B-B14F-4D97-AF65-F5344CB8AC3E}">
+        <p14:creationId xmlns:p14="http://schemas.microsoft.com/office/powerpoint/2010/main" val="600425415"/>
+      </p:ext>
+    </p:extLst>
+  </p:cSld>
+  <p:clrMapOvr>
+    <a:masterClrMapping/>
+  </p:clrMapOvr>
+</p:sld>
+</file>
+
+<file path=ppt/slides/slide25.xml><?xml version="1.0" encoding="utf-8"?>
+<p:sld xmlns:a="http://schemas.openxmlformats.org/drawingml/2006/main" xmlns:r="http://schemas.openxmlformats.org/officeDocument/2006/relationships" xmlns:p="http://schemas.openxmlformats.org/presentationml/2006/main">
+  <p:cSld>
+    <p:spTree>
+      <p:nvGrpSpPr>
+        <p:cNvPr id="1" name=""/>
+        <p:cNvGrpSpPr/>
+        <p:nvPr/>
+      </p:nvGrpSpPr>
+      <p:grpSpPr>
+        <a:xfrm>
+          <a:off x="0" y="0"/>
+          <a:ext cx="0" cy="0"/>
+          <a:chOff x="0" y="0"/>
+          <a:chExt cx="0" cy="0"/>
+        </a:xfrm>
+      </p:grpSpPr>
+      <p:sp>
+        <p:nvSpPr>
+          <p:cNvPr id="2" name="Title 1"/>
+          <p:cNvSpPr>
+            <a:spLocks noGrp="1"/>
+          </p:cNvSpPr>
+          <p:nvPr>
+            <p:ph type="title"/>
+          </p:nvPr>
+        </p:nvSpPr>
+        <p:spPr/>
+        <p:txBody>
+          <a:bodyPr/>
+          <a:lstStyle/>
+          <a:p>
+            <a:r>
+              <a:rPr lang="en-US" dirty="0" smtClean="0"/>
               <a:t>Questions and Comments</a:t>
             </a:r>
             <a:endParaRPr lang="en-US" dirty="0"/>
@@ -9464,7 +9669,7 @@
 </p:sld>
 </file>
 
-<file path=ppt/slides/slide25.xml><?xml version="1.0" encoding="utf-8"?>
+<file path=ppt/slides/slide26.xml><?xml version="1.0" encoding="utf-8"?>
 <p:sld xmlns:a="http://schemas.openxmlformats.org/drawingml/2006/main" xmlns:r="http://schemas.openxmlformats.org/officeDocument/2006/relationships" xmlns:p="http://schemas.openxmlformats.org/presentationml/2006/main">
   <p:cSld>
     <p:spTree>

</xml_diff>

<commit_message>
updated for presentation 1
</commit_message>
<xml_diff>
--- a/portfolio/PresentationInception.pptx
+++ b/portfolio/PresentationInception.pptx
@@ -6,35 +6,31 @@
     <p:sldMasterId id="2147483660" r:id="rId2"/>
   </p:sldMasterIdLst>
   <p:notesMasterIdLst>
-    <p:notesMasterId r:id="rId29"/>
+    <p:notesMasterId r:id="rId25"/>
   </p:notesMasterIdLst>
   <p:sldIdLst>
     <p:sldId id="256" r:id="rId3"/>
     <p:sldId id="257" r:id="rId4"/>
     <p:sldId id="268" r:id="rId5"/>
-    <p:sldId id="258" r:id="rId6"/>
-    <p:sldId id="269" r:id="rId7"/>
-    <p:sldId id="260" r:id="rId8"/>
-    <p:sldId id="272" r:id="rId9"/>
-    <p:sldId id="270" r:id="rId10"/>
-    <p:sldId id="273" r:id="rId11"/>
-    <p:sldId id="274" r:id="rId12"/>
-    <p:sldId id="275" r:id="rId13"/>
-    <p:sldId id="276" r:id="rId14"/>
-    <p:sldId id="277" r:id="rId15"/>
-    <p:sldId id="278" r:id="rId16"/>
-    <p:sldId id="259" r:id="rId17"/>
-    <p:sldId id="263" r:id="rId18"/>
-    <p:sldId id="280" r:id="rId19"/>
-    <p:sldId id="264" r:id="rId20"/>
-    <p:sldId id="281" r:id="rId21"/>
-    <p:sldId id="265" r:id="rId22"/>
-    <p:sldId id="271" r:id="rId23"/>
-    <p:sldId id="262" r:id="rId24"/>
-    <p:sldId id="261" r:id="rId25"/>
-    <p:sldId id="279" r:id="rId26"/>
-    <p:sldId id="267" r:id="rId27"/>
-    <p:sldId id="266" r:id="rId28"/>
+    <p:sldId id="269" r:id="rId6"/>
+    <p:sldId id="260" r:id="rId7"/>
+    <p:sldId id="272" r:id="rId8"/>
+    <p:sldId id="270" r:id="rId9"/>
+    <p:sldId id="273" r:id="rId10"/>
+    <p:sldId id="274" r:id="rId11"/>
+    <p:sldId id="275" r:id="rId12"/>
+    <p:sldId id="259" r:id="rId13"/>
+    <p:sldId id="263" r:id="rId14"/>
+    <p:sldId id="280" r:id="rId15"/>
+    <p:sldId id="264" r:id="rId16"/>
+    <p:sldId id="281" r:id="rId17"/>
+    <p:sldId id="265" r:id="rId18"/>
+    <p:sldId id="271" r:id="rId19"/>
+    <p:sldId id="262" r:id="rId20"/>
+    <p:sldId id="261" r:id="rId21"/>
+    <p:sldId id="267" r:id="rId22"/>
+    <p:sldId id="266" r:id="rId23"/>
+    <p:sldId id="282" r:id="rId24"/>
   </p:sldIdLst>
   <p:sldSz cx="9144000" cy="6858000" type="letter"/>
   <p:notesSz cx="6858000" cy="9144000"/>
@@ -532,7 +528,7 @@
           <a:p>
             <a:r>
               <a:rPr lang="en-US" dirty="0" smtClean="0"/>
-              <a:t>Use case diagram here</a:t>
+              <a:t>The system does not attempt to model the activity of individual cars.  That is left to the simulator, SUMO.</a:t>
             </a:r>
             <a:endParaRPr lang="en-US" dirty="0"/>
           </a:p>
@@ -555,7 +551,7 @@
           <a:p>
             <a:fld id="{2711E407-3140-410D-B1AB-3643DD24E9EF}" type="slidenum">
               <a:rPr lang="en-US" smtClean="0"/>
-              <a:t>6</a:t>
+              <a:t>5</a:t>
             </a:fld>
             <a:endParaRPr lang="en-US"/>
           </a:p>
@@ -620,7 +616,17 @@
           <a:p>
             <a:r>
               <a:rPr lang="en-US" dirty="0" smtClean="0"/>
-              <a:t>Major sections</a:t>
+              <a:t>Do the Metrics Agent for the Formal Requirements Specification?</a:t>
+            </a:r>
+          </a:p>
+          <a:p>
+            <a:r>
+              <a:rPr lang="en-US" dirty="0" smtClean="0"/>
+              <a:t>I think my documentation</a:t>
+            </a:r>
+            <a:r>
+              <a:rPr lang="en-US" baseline="0" dirty="0" smtClean="0"/>
+              <a:t> was suggesting the safety officer agent.</a:t>
             </a:r>
             <a:endParaRPr lang="en-US" dirty="0"/>
           </a:p>
@@ -643,7 +649,7 @@
           <a:p>
             <a:fld id="{2711E407-3140-410D-B1AB-3643DD24E9EF}" type="slidenum">
               <a:rPr lang="en-US" smtClean="0"/>
-              <a:t>15</a:t>
+              <a:t>17</a:t>
             </a:fld>
             <a:endParaRPr lang="en-US"/>
           </a:p>
@@ -652,7 +658,7 @@
     </p:spTree>
     <p:extLst>
       <p:ext uri="{BB962C8B-B14F-4D97-AF65-F5344CB8AC3E}">
-        <p14:creationId xmlns:p14="http://schemas.microsoft.com/office/powerpoint/2010/main" val="2100797969"/>
+        <p14:creationId xmlns:p14="http://schemas.microsoft.com/office/powerpoint/2010/main" val="3084319532"/>
       </p:ext>
     </p:extLst>
   </p:cSld>
@@ -707,14 +713,18 @@
           <a:lstStyle/>
           <a:p>
             <a:r>
+              <a:rPr lang="en-US" dirty="0" smtClean="0"/>
+              <a:t>Share</a:t>
+            </a:r>
+            <a:r>
               <a:rPr lang="en-US" baseline="0" dirty="0" smtClean="0"/>
-              <a:t>Consumers, Producers and Queues</a:t>
+              <a:t> the Google document with them?</a:t>
             </a:r>
           </a:p>
           <a:p>
             <a:r>
               <a:rPr lang="en-US" baseline="0" dirty="0" smtClean="0"/>
-              <a:t>Agents denoted by red boxes</a:t>
+              <a:t>Cover benefits, pain points.</a:t>
             </a:r>
             <a:endParaRPr lang="en-US" dirty="0"/>
           </a:p>
@@ -746,7 +756,7 @@
     </p:spTree>
     <p:extLst>
       <p:ext uri="{BB962C8B-B14F-4D97-AF65-F5344CB8AC3E}">
-        <p14:creationId xmlns:p14="http://schemas.microsoft.com/office/powerpoint/2010/main" val="493092143"/>
+        <p14:creationId xmlns:p14="http://schemas.microsoft.com/office/powerpoint/2010/main" val="628514855"/>
       </p:ext>
     </p:extLst>
   </p:cSld>
@@ -801,8 +811,18 @@
           <a:lstStyle/>
           <a:p>
             <a:r>
+              <a:rPr lang="en-US" dirty="0" smtClean="0"/>
+              <a:t>Am I trying to do too</a:t>
+            </a:r>
+            <a:r>
               <a:rPr lang="en-US" baseline="0" dirty="0" smtClean="0"/>
-              <a:t>Sequence Diagram?</a:t>
+              <a:t> much in my time frame?</a:t>
+            </a:r>
+          </a:p>
+          <a:p>
+            <a:r>
+              <a:rPr lang="en-US" baseline="0" dirty="0" smtClean="0"/>
+              <a:t>Quality concern by 100% test coverage of non-trivial code.  Won’t test API/library calls.  Will strive for low cyclomatic complexity.</a:t>
             </a:r>
             <a:endParaRPr lang="en-US" dirty="0"/>
           </a:p>
@@ -834,7 +854,7 @@
     </p:spTree>
     <p:extLst>
       <p:ext uri="{BB962C8B-B14F-4D97-AF65-F5344CB8AC3E}">
-        <p14:creationId xmlns:p14="http://schemas.microsoft.com/office/powerpoint/2010/main" val="493092143"/>
+        <p14:creationId xmlns:p14="http://schemas.microsoft.com/office/powerpoint/2010/main" val="2271470169"/>
       </p:ext>
     </p:extLst>
   </p:cSld>
@@ -894,7 +914,25 @@
             </a:r>
             <a:r>
               <a:rPr lang="en-US" baseline="0" dirty="0" smtClean="0"/>
-              <a:t> switch to software application</a:t>
+              <a:t> switch to software </a:t>
+            </a:r>
+            <a:r>
+              <a:rPr lang="en-US" baseline="0" dirty="0" smtClean="0"/>
+              <a:t>application.</a:t>
+            </a:r>
+          </a:p>
+          <a:p>
+            <a:r>
+              <a:rPr lang="en-US" baseline="0" dirty="0" smtClean="0"/>
+              <a:t>Discussion of incorporating risks, spikes and </a:t>
+            </a:r>
+            <a:r>
+              <a:rPr lang="en-US" baseline="0" dirty="0" err="1" smtClean="0"/>
+              <a:t>maintenance.Initial</a:t>
+            </a:r>
+            <a:r>
+              <a:rPr lang="en-US" baseline="0" dirty="0" smtClean="0"/>
+              <a:t> consideration for flow based approach?</a:t>
             </a:r>
             <a:endParaRPr lang="en-US" dirty="0"/>
           </a:p>
@@ -917,7 +955,7 @@
           <a:p>
             <a:fld id="{2711E407-3140-410D-B1AB-3643DD24E9EF}" type="slidenum">
               <a:rPr lang="en-US" smtClean="0"/>
-              <a:t>7</a:t>
+              <a:t>6</a:t>
             </a:fld>
             <a:endParaRPr lang="en-US"/>
           </a:p>
@@ -1011,7 +1049,7 @@
           <a:p>
             <a:fld id="{2711E407-3140-410D-B1AB-3643DD24E9EF}" type="slidenum">
               <a:rPr lang="en-US" smtClean="0"/>
-              <a:t>8</a:t>
+              <a:t>7</a:t>
             </a:fld>
             <a:endParaRPr lang="en-US"/>
           </a:p>
@@ -1098,7 +1136,7 @@
           <a:p>
             <a:fld id="{2711E407-3140-410D-B1AB-3643DD24E9EF}" type="slidenum">
               <a:rPr lang="en-US" smtClean="0"/>
-              <a:t>9</a:t>
+              <a:t>8</a:t>
             </a:fld>
             <a:endParaRPr lang="en-US"/>
           </a:p>
@@ -1167,8 +1205,67 @@
             </a:r>
             <a:r>
               <a:rPr lang="en-US" baseline="0" dirty="0" smtClean="0"/>
-              <a:t> size estimates</a:t>
-            </a:r>
+              <a:t> size </a:t>
+            </a:r>
+            <a:r>
+              <a:rPr lang="en-US" baseline="0" dirty="0" smtClean="0"/>
+              <a:t>estimates</a:t>
+            </a:r>
+          </a:p>
+          <a:p>
+            <a:pPr marL="0" marR="0" indent="0" algn="l" defTabSz="914400" rtl="0" eaLnBrk="1" fontAlgn="auto" latinLnBrk="0" hangingPunct="1">
+              <a:lnSpc>
+                <a:spcPct val="100000"/>
+              </a:lnSpc>
+              <a:spcBef>
+                <a:spcPts val="0"/>
+              </a:spcBef>
+              <a:spcAft>
+                <a:spcPts val="0"/>
+              </a:spcAft>
+              <a:buClrTx/>
+              <a:buSzTx/>
+              <a:buFontTx/>
+              <a:buNone/>
+              <a:tabLst/>
+              <a:defRPr/>
+            </a:pPr>
+            <a:r>
+              <a:rPr lang="en-US" sz="1200" kern="1200" dirty="0" smtClean="0">
+                <a:solidFill>
+                  <a:schemeClr val="tx1"/>
+                </a:solidFill>
+                <a:effectLst/>
+                <a:latin typeface="+mn-lt"/>
+                <a:ea typeface="+mn-ea"/>
+                <a:cs typeface="+mn-cs"/>
+              </a:rPr>
+              <a:t>Unadjusted function points are used in the early design stage for project estimation.  I followed the information I found about computing function points on the Code Project website[9].  Additional information included definitions of the function point types can be found in section 2.2 of COCOMO II: Model Definition Manual[8].  I reviewed my use cases and arrived at this</a:t>
+            </a:r>
+            <a:r>
+              <a:rPr lang="en-US" sz="1200" kern="1200" baseline="0" dirty="0" smtClean="0">
+                <a:solidFill>
+                  <a:schemeClr val="tx1"/>
+                </a:solidFill>
+                <a:effectLst/>
+                <a:latin typeface="+mn-lt"/>
+                <a:ea typeface="+mn-ea"/>
+                <a:cs typeface="+mn-cs"/>
+              </a:rPr>
+              <a:t> table.</a:t>
+            </a:r>
+            <a:endParaRPr lang="en-US" sz="1200" kern="1200" dirty="0" smtClean="0">
+              <a:solidFill>
+                <a:schemeClr val="tx1"/>
+              </a:solidFill>
+              <a:effectLst/>
+              <a:latin typeface="+mn-lt"/>
+              <a:ea typeface="+mn-ea"/>
+              <a:cs typeface="+mn-cs"/>
+            </a:endParaRPr>
+          </a:p>
+          <a:p>
+            <a:endParaRPr lang="en-US" baseline="0" dirty="0" smtClean="0"/>
           </a:p>
         </p:txBody>
       </p:sp>
@@ -1189,7 +1286,7 @@
           <a:p>
             <a:fld id="{2711E407-3140-410D-B1AB-3643DD24E9EF}" type="slidenum">
               <a:rPr lang="en-US" smtClean="0"/>
-              <a:t>10</a:t>
+              <a:t>9</a:t>
             </a:fld>
             <a:endParaRPr lang="en-US"/>
           </a:p>
@@ -1254,7 +1351,23 @@
           <a:p>
             <a:r>
               <a:rPr lang="en-US" dirty="0" smtClean="0"/>
-              <a:t>COCOMO full equation</a:t>
+              <a:t>COCOMO variables</a:t>
+            </a:r>
+            <a:r>
+              <a:rPr lang="en-US" baseline="0" dirty="0" smtClean="0"/>
+              <a:t> and partial computations for full equation</a:t>
+            </a:r>
+          </a:p>
+          <a:p>
+            <a:r>
+              <a:rPr lang="en-US" baseline="0" dirty="0" smtClean="0"/>
+              <a:t>Discuss UFP-&gt;Lines of Code</a:t>
+            </a:r>
+          </a:p>
+          <a:p>
+            <a:r>
+              <a:rPr lang="en-US" baseline="0" dirty="0" smtClean="0"/>
+              <a:t>Discuss Effort and TDEV</a:t>
             </a:r>
             <a:endParaRPr lang="en-US" dirty="0"/>
           </a:p>
@@ -1277,7 +1390,7 @@
           <a:p>
             <a:fld id="{2711E407-3140-410D-B1AB-3643DD24E9EF}" type="slidenum">
               <a:rPr lang="en-US" smtClean="0"/>
-              <a:t>11</a:t>
+              <a:t>10</a:t>
             </a:fld>
             <a:endParaRPr lang="en-US"/>
           </a:p>
@@ -1342,11 +1455,63 @@
           <a:p>
             <a:r>
               <a:rPr lang="en-US" dirty="0" smtClean="0"/>
-              <a:t>COCOMO variables</a:t>
+              <a:t>Technical Inspectors TBD</a:t>
+            </a:r>
+          </a:p>
+          <a:p>
+            <a:r>
+              <a:rPr lang="en-US" dirty="0" smtClean="0"/>
+              <a:t>Documentation to delivery for each phase</a:t>
+            </a:r>
+          </a:p>
+          <a:p>
+            <a:r>
+              <a:rPr lang="en-US" dirty="0" smtClean="0"/>
+              <a:t>meet PEP 8 and 257 code/documentation standards</a:t>
+            </a:r>
+          </a:p>
+          <a:p>
+            <a:r>
+              <a:rPr lang="en-US" dirty="0" smtClean="0"/>
+              <a:t>rework metric as measure of code quality</a:t>
+            </a:r>
+          </a:p>
+          <a:p>
+            <a:r>
+              <a:rPr lang="en-US" dirty="0" smtClean="0"/>
+              <a:t>Test plan will incorporate unit and integration tests.</a:t>
+            </a:r>
+          </a:p>
+          <a:p>
+            <a:r>
+              <a:rPr lang="en-US" dirty="0" smtClean="0"/>
+              <a:t>Have blogged/experimented</a:t>
             </a:r>
             <a:r>
               <a:rPr lang="en-US" baseline="0" dirty="0" smtClean="0"/>
-              <a:t> and partial computations for full equation</a:t>
+              <a:t> with/about tools.  Notable: PEP8, </a:t>
+            </a:r>
+            <a:r>
+              <a:rPr lang="en-US" baseline="0" dirty="0" err="1" smtClean="0"/>
+              <a:t>PyMetrics</a:t>
+            </a:r>
+            <a:r>
+              <a:rPr lang="en-US" baseline="0" dirty="0" smtClean="0"/>
+              <a:t>, Google Docs and </a:t>
+            </a:r>
+            <a:r>
+              <a:rPr lang="en-US" baseline="0" dirty="0" err="1" smtClean="0"/>
+              <a:t>GanntProject</a:t>
+            </a:r>
+            <a:r>
+              <a:rPr lang="en-US" baseline="0" dirty="0" smtClean="0"/>
+              <a:t>.</a:t>
+            </a:r>
+          </a:p>
+          <a:p>
+            <a:r>
+              <a:rPr lang="en-US" baseline="0" dirty="0" smtClean="0"/>
+              <a:t>Does the website with PDF documents and zip file work for them?</a:t>
             </a:r>
             <a:endParaRPr lang="en-US" dirty="0"/>
           </a:p>
@@ -1369,7 +1534,7 @@
           <a:p>
             <a:fld id="{2711E407-3140-410D-B1AB-3643DD24E9EF}" type="slidenum">
               <a:rPr lang="en-US" smtClean="0"/>
-              <a:t>12</a:t>
+              <a:t>11</a:t>
             </a:fld>
             <a:endParaRPr lang="en-US"/>
           </a:p>
@@ -1378,7 +1543,7 @@
     </p:spTree>
     <p:extLst>
       <p:ext uri="{BB962C8B-B14F-4D97-AF65-F5344CB8AC3E}">
-        <p14:creationId xmlns:p14="http://schemas.microsoft.com/office/powerpoint/2010/main" val="1211898916"/>
+        <p14:creationId xmlns:p14="http://schemas.microsoft.com/office/powerpoint/2010/main" val="2100797969"/>
       </p:ext>
     </p:extLst>
   </p:cSld>
@@ -1433,15 +1598,15 @@
           <a:lstStyle/>
           <a:p>
             <a:r>
-              <a:rPr lang="en-US" dirty="0" smtClean="0"/>
-              <a:t>COCOMO</a:t>
-            </a:r>
-            <a:r>
               <a:rPr lang="en-US" baseline="0" dirty="0" smtClean="0"/>
-              <a:t> Process Exponent</a:t>
-            </a:r>
-          </a:p>
-          <a:p>
+              <a:t>Consumers, Producers and Queues</a:t>
+            </a:r>
+          </a:p>
+          <a:p>
+            <a:r>
+              <a:rPr lang="en-US" baseline="0" dirty="0" smtClean="0"/>
+              <a:t>Agents denoted by red boxes</a:t>
+            </a:r>
             <a:endParaRPr lang="en-US" dirty="0"/>
           </a:p>
         </p:txBody>
@@ -1463,7 +1628,7 @@
           <a:p>
             <a:fld id="{2711E407-3140-410D-B1AB-3643DD24E9EF}" type="slidenum">
               <a:rPr lang="en-US" smtClean="0"/>
-              <a:t>13</a:t>
+              <a:t>14</a:t>
             </a:fld>
             <a:endParaRPr lang="en-US"/>
           </a:p>
@@ -1472,7 +1637,7 @@
     </p:spTree>
     <p:extLst>
       <p:ext uri="{BB962C8B-B14F-4D97-AF65-F5344CB8AC3E}">
-        <p14:creationId xmlns:p14="http://schemas.microsoft.com/office/powerpoint/2010/main" val="1900965011"/>
+        <p14:creationId xmlns:p14="http://schemas.microsoft.com/office/powerpoint/2010/main" val="493092143"/>
       </p:ext>
     </p:extLst>
   </p:cSld>
@@ -1526,10 +1691,6 @@
           <a:bodyPr/>
           <a:lstStyle/>
           <a:p>
-            <a:r>
-              <a:rPr lang="en-US" dirty="0" smtClean="0"/>
-              <a:t>COCOMO time to develop numbers</a:t>
-            </a:r>
             <a:endParaRPr lang="en-US" dirty="0"/>
           </a:p>
         </p:txBody>
@@ -1551,7 +1712,7 @@
           <a:p>
             <a:fld id="{2711E407-3140-410D-B1AB-3643DD24E9EF}" type="slidenum">
               <a:rPr lang="en-US" smtClean="0"/>
-              <a:t>14</a:t>
+              <a:t>15</a:t>
             </a:fld>
             <a:endParaRPr lang="en-US"/>
           </a:p>
@@ -1560,7 +1721,7 @@
     </p:spTree>
     <p:extLst>
       <p:ext uri="{BB962C8B-B14F-4D97-AF65-F5344CB8AC3E}">
-        <p14:creationId xmlns:p14="http://schemas.microsoft.com/office/powerpoint/2010/main" val="1481595861"/>
+        <p14:creationId xmlns:p14="http://schemas.microsoft.com/office/powerpoint/2010/main" val="493092143"/>
       </p:ext>
     </p:extLst>
   </p:cSld>
@@ -8052,8 +8213,8 @@
         </p:nvSpPr>
         <p:spPr>
           <a:xfrm>
-            <a:off x="685800" y="1752600"/>
-            <a:ext cx="7772400" cy="1470025"/>
+            <a:off x="0" y="228600"/>
+            <a:ext cx="9144000" cy="2994025"/>
           </a:xfrm>
         </p:spPr>
         <p:txBody>
@@ -8061,21 +8222,35 @@
           <a:lstStyle/>
           <a:p>
             <a:r>
-              <a:rPr lang="en-US" dirty="0" smtClean="0"/>
+              <a:rPr lang="en-US" dirty="0" smtClean="0">
+                <a:solidFill>
+                  <a:schemeClr val="accent6">
+                    <a:lumMod val="60000"/>
+                    <a:lumOff val="40000"/>
+                  </a:schemeClr>
+                </a:solidFill>
+              </a:rPr>
               <a:t>MSE Presentation 1</a:t>
             </a:r>
             <a:br>
-              <a:rPr lang="en-US" dirty="0" smtClean="0"/>
+              <a:rPr lang="en-US" dirty="0" smtClean="0">
+                <a:solidFill>
+                  <a:schemeClr val="accent6">
+                    <a:lumMod val="60000"/>
+                    <a:lumOff val="40000"/>
+                  </a:schemeClr>
+                </a:solidFill>
+              </a:rPr>
             </a:br>
             <a:r>
-              <a:rPr lang="en-US" sz="3600" dirty="0" err="1" smtClean="0"/>
+              <a:rPr lang="en-US" sz="3200" dirty="0" err="1" smtClean="0"/>
               <a:t>MultiAgent</a:t>
             </a:r>
             <a:r>
-              <a:rPr lang="en-US" sz="3600" dirty="0" smtClean="0"/>
+              <a:rPr lang="en-US" sz="3200" dirty="0" smtClean="0"/>
               <a:t> Control of Traffic Signals (MACTS)</a:t>
             </a:r>
-            <a:endParaRPr lang="en-US" sz="3600" dirty="0"/>
+            <a:endParaRPr lang="en-US" sz="3200" dirty="0"/>
           </a:p>
         </p:txBody>
       </p:sp>
@@ -8089,7 +8264,12 @@
             <p:ph type="subTitle" idx="1"/>
           </p:nvPr>
         </p:nvSpPr>
-        <p:spPr/>
+        <p:spPr>
+          <a:xfrm>
+            <a:off x="1371600" y="4038600"/>
+            <a:ext cx="6400800" cy="1981200"/>
+          </a:xfrm>
+        </p:spPr>
         <p:txBody>
           <a:bodyPr/>
           <a:lstStyle/>
@@ -8106,10 +8286,22 @@
           </a:p>
           <a:p>
             <a:r>
-              <a:rPr lang="en-US" sz="2400" dirty="0" smtClean="0"/>
+              <a:rPr lang="en-US" sz="2400" dirty="0" smtClean="0">
+                <a:solidFill>
+                  <a:schemeClr val="accent2">
+                    <a:lumMod val="75000"/>
+                  </a:schemeClr>
+                </a:solidFill>
+              </a:rPr>
               <a:t>MSE Candidate</a:t>
             </a:r>
-            <a:endParaRPr lang="en-US" sz="2400" dirty="0"/>
+            <a:endParaRPr lang="en-US" sz="2400" dirty="0">
+              <a:solidFill>
+                <a:schemeClr val="accent2">
+                  <a:lumMod val="75000"/>
+                </a:schemeClr>
+              </a:solidFill>
+            </a:endParaRPr>
           </a:p>
         </p:txBody>
       </p:sp>
@@ -8150,9 +8342,73 @@
           <a:chExt cx="0" cy="0"/>
         </a:xfrm>
       </p:grpSpPr>
-      <p:sp>
-        <p:nvSpPr>
-          <p:cNvPr id="2" name="Title 1"/>
+      <p:pic>
+        <p:nvPicPr>
+          <p:cNvPr id="9218" name="Picture 2"/>
+          <p:cNvPicPr>
+            <a:picLocks noChangeAspect="1" noChangeArrowheads="1"/>
+          </p:cNvPicPr>
+          <p:nvPr/>
+        </p:nvPicPr>
+        <p:blipFill>
+          <a:blip r:embed="rId3">
+            <a:extLst>
+              <a:ext uri="{28A0092B-C50C-407E-A947-70E740481C1C}">
+                <a14:useLocalDpi xmlns:a14="http://schemas.microsoft.com/office/drawing/2010/main" val="0"/>
+              </a:ext>
+            </a:extLst>
+          </a:blip>
+          <a:srcRect/>
+          <a:stretch>
+            <a:fillRect/>
+          </a:stretch>
+        </p:blipFill>
+        <p:spPr bwMode="auto">
+          <a:xfrm>
+            <a:off x="2362200" y="76200"/>
+            <a:ext cx="6634195" cy="6324599"/>
+          </a:xfrm>
+          <a:prstGeom prst="rect">
+            <a:avLst/>
+          </a:prstGeom>
+          <a:noFill/>
+          <a:ln>
+            <a:noFill/>
+          </a:ln>
+          <a:effectLst/>
+          <a:extLst>
+            <a:ext uri="{909E8E84-426E-40DD-AFC4-6F175D3DCCD1}">
+              <a14:hiddenFill xmlns:a14="http://schemas.microsoft.com/office/drawing/2010/main">
+                <a:solidFill>
+                  <a:schemeClr val="accent1"/>
+                </a:solidFill>
+              </a14:hiddenFill>
+            </a:ext>
+            <a:ext uri="{91240B29-F687-4F45-9708-019B960494DF}">
+              <a14:hiddenLine xmlns:a14="http://schemas.microsoft.com/office/drawing/2010/main" w="9525">
+                <a:solidFill>
+                  <a:schemeClr val="tx1"/>
+                </a:solidFill>
+                <a:miter lim="800000"/>
+                <a:headEnd/>
+                <a:tailEnd/>
+              </a14:hiddenLine>
+            </a:ext>
+            <a:ext uri="{AF507438-7753-43E0-B8FC-AC1667EBCBE1}">
+              <a14:hiddenEffects xmlns:a14="http://schemas.microsoft.com/office/drawing/2010/main">
+                <a:effectLst>
+                  <a:outerShdw dist="35921" dir="2700000" algn="ctr" rotWithShape="0">
+                    <a:schemeClr val="bg2"/>
+                  </a:outerShdw>
+                </a:effectLst>
+              </a14:hiddenEffects>
+            </a:ext>
+          </a:extLst>
+        </p:spPr>
+      </p:pic>
+      <p:sp>
+        <p:nvSpPr>
+          <p:cNvPr id="7" name="Title 1"/>
           <p:cNvSpPr>
             <a:spLocks noGrp="1"/>
           </p:cNvSpPr>
@@ -8160,42 +8416,29 @@
             <p:ph type="title"/>
           </p:nvPr>
         </p:nvSpPr>
-        <p:spPr/>
-        <p:txBody>
-          <a:bodyPr/>
+        <p:spPr>
+          <a:xfrm>
+            <a:off x="152399" y="142875"/>
+            <a:ext cx="2209801" cy="1533525"/>
+          </a:xfrm>
+        </p:spPr>
+        <p:txBody>
+          <a:bodyPr anchor="t"/>
           <a:lstStyle/>
           <a:p>
-            <a:r>
-              <a:rPr lang="en-US" dirty="0" smtClean="0"/>
-              <a:t>Cost Estimation</a:t>
-            </a:r>
-            <a:endParaRPr lang="en-US" dirty="0"/>
-          </a:p>
-        </p:txBody>
-      </p:sp>
-      <p:sp>
-        <p:nvSpPr>
-          <p:cNvPr id="3" name="Content Placeholder 2"/>
-          <p:cNvSpPr>
-            <a:spLocks noGrp="1"/>
-          </p:cNvSpPr>
-          <p:nvPr>
-            <p:ph idx="1"/>
-          </p:nvPr>
-        </p:nvSpPr>
-        <p:spPr/>
-        <p:txBody>
-          <a:bodyPr/>
-          <a:lstStyle/>
-          <a:p>
-            <a:endParaRPr lang="en-US"/>
+            <a:pPr algn="l"/>
+            <a:r>
+              <a:rPr lang="en-US" sz="2800" dirty="0" smtClean="0"/>
+              <a:t>Early Design Calculations</a:t>
+            </a:r>
+            <a:endParaRPr lang="en-US" sz="2800" dirty="0"/>
           </a:p>
         </p:txBody>
       </p:sp>
     </p:spTree>
     <p:extLst>
       <p:ext uri="{BB962C8B-B14F-4D97-AF65-F5344CB8AC3E}">
-        <p14:creationId xmlns:p14="http://schemas.microsoft.com/office/powerpoint/2010/main" val="2085443037"/>
+        <p14:creationId xmlns:p14="http://schemas.microsoft.com/office/powerpoint/2010/main" val="546393885"/>
       </p:ext>
     </p:extLst>
   </p:cSld>
@@ -8246,7 +8489,7 @@
           <a:p>
             <a:r>
               <a:rPr lang="en-US" dirty="0" smtClean="0"/>
-              <a:t>Cost Estimation</a:t>
+              <a:t>Project Software Quality Assurance Plan (SQAP)</a:t>
             </a:r>
             <a:endParaRPr lang="en-US" dirty="0"/>
           </a:p>
@@ -8262,19 +8505,64 @@
             <p:ph idx="1"/>
           </p:nvPr>
         </p:nvSpPr>
-        <p:spPr/>
+        <p:spPr>
+          <a:xfrm>
+            <a:off x="457200" y="1981200"/>
+            <a:ext cx="8229600" cy="4144963"/>
+          </a:xfrm>
+        </p:spPr>
         <p:txBody>
           <a:bodyPr/>
           <a:lstStyle/>
           <a:p>
-            <a:endParaRPr lang="en-US"/>
+            <a:r>
+              <a:rPr lang="en-US" sz="2800" dirty="0" smtClean="0"/>
+              <a:t>Management Organization</a:t>
+            </a:r>
+          </a:p>
+          <a:p>
+            <a:r>
+              <a:rPr lang="en-US" sz="2800" dirty="0" smtClean="0"/>
+              <a:t>Documentation</a:t>
+            </a:r>
+          </a:p>
+          <a:p>
+            <a:r>
+              <a:rPr lang="en-US" sz="2800" dirty="0" smtClean="0"/>
+              <a:t>Standards, Practices, Conventions and Metrics</a:t>
+            </a:r>
+          </a:p>
+          <a:p>
+            <a:r>
+              <a:rPr lang="en-US" sz="2800" dirty="0" smtClean="0"/>
+              <a:t>Test plan</a:t>
+            </a:r>
+          </a:p>
+          <a:p>
+            <a:r>
+              <a:rPr lang="en-US" sz="2800" dirty="0" smtClean="0"/>
+              <a:t>Problem reporting and corrective action</a:t>
+            </a:r>
+          </a:p>
+          <a:p>
+            <a:r>
+              <a:rPr lang="en-US" sz="2800" dirty="0" smtClean="0"/>
+              <a:t>Tools, techniques and methodology</a:t>
+            </a:r>
+          </a:p>
+          <a:p>
+            <a:r>
+              <a:rPr lang="en-US" sz="2800" dirty="0" smtClean="0"/>
+              <a:t>Record collection, maintenance and retention</a:t>
+            </a:r>
+            <a:endParaRPr lang="en-US" sz="2800" dirty="0"/>
           </a:p>
         </p:txBody>
       </p:sp>
     </p:spTree>
     <p:extLst>
       <p:ext uri="{BB962C8B-B14F-4D97-AF65-F5344CB8AC3E}">
-        <p14:creationId xmlns:p14="http://schemas.microsoft.com/office/powerpoint/2010/main" val="546393885"/>
+        <p14:creationId xmlns:p14="http://schemas.microsoft.com/office/powerpoint/2010/main" val="1841246764"/>
       </p:ext>
     </p:extLst>
   </p:cSld>
@@ -8320,323 +8608,7 @@
         </p:nvSpPr>
         <p:spPr/>
         <p:txBody>
-          <a:bodyPr/>
-          <a:lstStyle/>
-          <a:p>
-            <a:r>
-              <a:rPr lang="en-US" dirty="0" smtClean="0"/>
-              <a:t>Cost Estimation</a:t>
-            </a:r>
-            <a:endParaRPr lang="en-US" dirty="0"/>
-          </a:p>
-        </p:txBody>
-      </p:sp>
-      <p:sp>
-        <p:nvSpPr>
-          <p:cNvPr id="3" name="Content Placeholder 2"/>
-          <p:cNvSpPr>
-            <a:spLocks noGrp="1"/>
-          </p:cNvSpPr>
-          <p:nvPr>
-            <p:ph idx="1"/>
-          </p:nvPr>
-        </p:nvSpPr>
-        <p:spPr/>
-        <p:txBody>
-          <a:bodyPr/>
-          <a:lstStyle/>
-          <a:p>
-            <a:endParaRPr lang="en-US"/>
-          </a:p>
-        </p:txBody>
-      </p:sp>
-    </p:spTree>
-    <p:extLst>
-      <p:ext uri="{BB962C8B-B14F-4D97-AF65-F5344CB8AC3E}">
-        <p14:creationId xmlns:p14="http://schemas.microsoft.com/office/powerpoint/2010/main" val="1408913151"/>
-      </p:ext>
-    </p:extLst>
-  </p:cSld>
-  <p:clrMapOvr>
-    <a:masterClrMapping/>
-  </p:clrMapOvr>
-  <p:timing>
-    <p:tnLst>
-      <p:par>
-        <p:cTn id="1" dur="indefinite" restart="never" nodeType="tmRoot"/>
-      </p:par>
-    </p:tnLst>
-  </p:timing>
-</p:sld>
-</file>
-
-<file path=ppt/slides/slide13.xml><?xml version="1.0" encoding="utf-8"?>
-<p:sld xmlns:a="http://schemas.openxmlformats.org/drawingml/2006/main" xmlns:r="http://schemas.openxmlformats.org/officeDocument/2006/relationships" xmlns:p="http://schemas.openxmlformats.org/presentationml/2006/main">
-  <p:cSld>
-    <p:spTree>
-      <p:nvGrpSpPr>
-        <p:cNvPr id="1" name=""/>
-        <p:cNvGrpSpPr/>
-        <p:nvPr/>
-      </p:nvGrpSpPr>
-      <p:grpSpPr>
-        <a:xfrm>
-          <a:off x="0" y="0"/>
-          <a:ext cx="0" cy="0"/>
-          <a:chOff x="0" y="0"/>
-          <a:chExt cx="0" cy="0"/>
-        </a:xfrm>
-      </p:grpSpPr>
-      <p:sp>
-        <p:nvSpPr>
-          <p:cNvPr id="2" name="Title 1"/>
-          <p:cNvSpPr>
-            <a:spLocks noGrp="1"/>
-          </p:cNvSpPr>
-          <p:nvPr>
-            <p:ph type="title"/>
-          </p:nvPr>
-        </p:nvSpPr>
-        <p:spPr/>
-        <p:txBody>
-          <a:bodyPr/>
-          <a:lstStyle/>
-          <a:p>
-            <a:r>
-              <a:rPr lang="en-US" dirty="0" smtClean="0"/>
-              <a:t>Cost Estimation</a:t>
-            </a:r>
-            <a:endParaRPr lang="en-US" dirty="0"/>
-          </a:p>
-        </p:txBody>
-      </p:sp>
-      <p:sp>
-        <p:nvSpPr>
-          <p:cNvPr id="3" name="Content Placeholder 2"/>
-          <p:cNvSpPr>
-            <a:spLocks noGrp="1"/>
-          </p:cNvSpPr>
-          <p:nvPr>
-            <p:ph idx="1"/>
-          </p:nvPr>
-        </p:nvSpPr>
-        <p:spPr/>
-        <p:txBody>
-          <a:bodyPr/>
-          <a:lstStyle/>
-          <a:p>
-            <a:endParaRPr lang="en-US"/>
-          </a:p>
-        </p:txBody>
-      </p:sp>
-    </p:spTree>
-    <p:extLst>
-      <p:ext uri="{BB962C8B-B14F-4D97-AF65-F5344CB8AC3E}">
-        <p14:creationId xmlns:p14="http://schemas.microsoft.com/office/powerpoint/2010/main" val="3294033336"/>
-      </p:ext>
-    </p:extLst>
-  </p:cSld>
-  <p:clrMapOvr>
-    <a:masterClrMapping/>
-  </p:clrMapOvr>
-  <p:timing>
-    <p:tnLst>
-      <p:par>
-        <p:cTn id="1" dur="indefinite" restart="never" nodeType="tmRoot"/>
-      </p:par>
-    </p:tnLst>
-  </p:timing>
-</p:sld>
-</file>
-
-<file path=ppt/slides/slide14.xml><?xml version="1.0" encoding="utf-8"?>
-<p:sld xmlns:a="http://schemas.openxmlformats.org/drawingml/2006/main" xmlns:r="http://schemas.openxmlformats.org/officeDocument/2006/relationships" xmlns:p="http://schemas.openxmlformats.org/presentationml/2006/main">
-  <p:cSld>
-    <p:spTree>
-      <p:nvGrpSpPr>
-        <p:cNvPr id="1" name=""/>
-        <p:cNvGrpSpPr/>
-        <p:nvPr/>
-      </p:nvGrpSpPr>
-      <p:grpSpPr>
-        <a:xfrm>
-          <a:off x="0" y="0"/>
-          <a:ext cx="0" cy="0"/>
-          <a:chOff x="0" y="0"/>
-          <a:chExt cx="0" cy="0"/>
-        </a:xfrm>
-      </p:grpSpPr>
-      <p:sp>
-        <p:nvSpPr>
-          <p:cNvPr id="2" name="Title 1"/>
-          <p:cNvSpPr>
-            <a:spLocks noGrp="1"/>
-          </p:cNvSpPr>
-          <p:nvPr>
-            <p:ph type="title"/>
-          </p:nvPr>
-        </p:nvSpPr>
-        <p:spPr/>
-        <p:txBody>
-          <a:bodyPr/>
-          <a:lstStyle/>
-          <a:p>
-            <a:r>
-              <a:rPr lang="en-US" dirty="0" smtClean="0"/>
-              <a:t>Cost Estimation</a:t>
-            </a:r>
-            <a:endParaRPr lang="en-US" dirty="0"/>
-          </a:p>
-        </p:txBody>
-      </p:sp>
-      <p:sp>
-        <p:nvSpPr>
-          <p:cNvPr id="3" name="Content Placeholder 2"/>
-          <p:cNvSpPr>
-            <a:spLocks noGrp="1"/>
-          </p:cNvSpPr>
-          <p:nvPr>
-            <p:ph idx="1"/>
-          </p:nvPr>
-        </p:nvSpPr>
-        <p:spPr/>
-        <p:txBody>
-          <a:bodyPr/>
-          <a:lstStyle/>
-          <a:p>
-            <a:endParaRPr lang="en-US"/>
-          </a:p>
-        </p:txBody>
-      </p:sp>
-    </p:spTree>
-    <p:extLst>
-      <p:ext uri="{BB962C8B-B14F-4D97-AF65-F5344CB8AC3E}">
-        <p14:creationId xmlns:p14="http://schemas.microsoft.com/office/powerpoint/2010/main" val="2463910191"/>
-      </p:ext>
-    </p:extLst>
-  </p:cSld>
-  <p:clrMapOvr>
-    <a:masterClrMapping/>
-  </p:clrMapOvr>
-  <p:timing>
-    <p:tnLst>
-      <p:par>
-        <p:cTn id="1" dur="indefinite" restart="never" nodeType="tmRoot"/>
-      </p:par>
-    </p:tnLst>
-  </p:timing>
-</p:sld>
-</file>
-
-<file path=ppt/slides/slide15.xml><?xml version="1.0" encoding="utf-8"?>
-<p:sld xmlns:a="http://schemas.openxmlformats.org/drawingml/2006/main" xmlns:r="http://schemas.openxmlformats.org/officeDocument/2006/relationships" xmlns:p="http://schemas.openxmlformats.org/presentationml/2006/main">
-  <p:cSld>
-    <p:spTree>
-      <p:nvGrpSpPr>
-        <p:cNvPr id="1" name=""/>
-        <p:cNvGrpSpPr/>
-        <p:nvPr/>
-      </p:nvGrpSpPr>
-      <p:grpSpPr>
-        <a:xfrm>
-          <a:off x="0" y="0"/>
-          <a:ext cx="0" cy="0"/>
-          <a:chOff x="0" y="0"/>
-          <a:chExt cx="0" cy="0"/>
-        </a:xfrm>
-      </p:grpSpPr>
-      <p:sp>
-        <p:nvSpPr>
-          <p:cNvPr id="2" name="Title 1"/>
-          <p:cNvSpPr>
-            <a:spLocks noGrp="1"/>
-          </p:cNvSpPr>
-          <p:nvPr>
-            <p:ph type="title"/>
-          </p:nvPr>
-        </p:nvSpPr>
-        <p:spPr/>
-        <p:txBody>
-          <a:bodyPr/>
-          <a:lstStyle/>
-          <a:p>
-            <a:r>
-              <a:rPr lang="en-US" dirty="0" smtClean="0"/>
-              <a:t>Project Software Quality Assurance Plan (SQAP)</a:t>
-            </a:r>
-            <a:endParaRPr lang="en-US" dirty="0"/>
-          </a:p>
-        </p:txBody>
-      </p:sp>
-      <p:sp>
-        <p:nvSpPr>
-          <p:cNvPr id="3" name="Content Placeholder 2"/>
-          <p:cNvSpPr>
-            <a:spLocks noGrp="1"/>
-          </p:cNvSpPr>
-          <p:nvPr>
-            <p:ph idx="1"/>
-          </p:nvPr>
-        </p:nvSpPr>
-        <p:spPr/>
-        <p:txBody>
-          <a:bodyPr/>
-          <a:lstStyle/>
-          <a:p>
-            <a:endParaRPr lang="en-US"/>
-          </a:p>
-        </p:txBody>
-      </p:sp>
-    </p:spTree>
-    <p:extLst>
-      <p:ext uri="{BB962C8B-B14F-4D97-AF65-F5344CB8AC3E}">
-        <p14:creationId xmlns:p14="http://schemas.microsoft.com/office/powerpoint/2010/main" val="1841246764"/>
-      </p:ext>
-    </p:extLst>
-  </p:cSld>
-  <p:clrMapOvr>
-    <a:masterClrMapping/>
-  </p:clrMapOvr>
-  <p:timing>
-    <p:tnLst>
-      <p:par>
-        <p:cTn id="1" dur="indefinite" restart="never" nodeType="tmRoot"/>
-      </p:par>
-    </p:tnLst>
-  </p:timing>
-</p:sld>
-</file>
-
-<file path=ppt/slides/slide16.xml><?xml version="1.0" encoding="utf-8"?>
-<p:sld xmlns:a="http://schemas.openxmlformats.org/drawingml/2006/main" xmlns:r="http://schemas.openxmlformats.org/officeDocument/2006/relationships" xmlns:p="http://schemas.openxmlformats.org/presentationml/2006/main">
-  <p:cSld>
-    <p:spTree>
-      <p:nvGrpSpPr>
-        <p:cNvPr id="1" name=""/>
-        <p:cNvGrpSpPr/>
-        <p:nvPr/>
-      </p:nvGrpSpPr>
-      <p:grpSpPr>
-        <a:xfrm>
-          <a:off x="0" y="0"/>
-          <a:ext cx="0" cy="0"/>
-          <a:chOff x="0" y="0"/>
-          <a:chExt cx="0" cy="0"/>
-        </a:xfrm>
-      </p:grpSpPr>
-      <p:sp>
-        <p:nvSpPr>
-          <p:cNvPr id="2" name="Title 1"/>
-          <p:cNvSpPr>
-            <a:spLocks noGrp="1"/>
-          </p:cNvSpPr>
-          <p:nvPr>
-            <p:ph type="title"/>
-          </p:nvPr>
-        </p:nvSpPr>
-        <p:spPr/>
-        <p:txBody>
-          <a:bodyPr/>
+          <a:bodyPr anchor="t"/>
           <a:lstStyle/>
           <a:p>
             <a:r>
@@ -8647,25 +8619,70 @@
           </a:p>
         </p:txBody>
       </p:sp>
-      <p:sp>
-        <p:nvSpPr>
-          <p:cNvPr id="3" name="Content Placeholder 2"/>
-          <p:cNvSpPr>
-            <a:spLocks noGrp="1"/>
-          </p:cNvSpPr>
-          <p:nvPr>
-            <p:ph idx="1"/>
-          </p:nvPr>
-        </p:nvSpPr>
-        <p:spPr/>
-        <p:txBody>
-          <a:bodyPr/>
-          <a:lstStyle/>
-          <a:p>
-            <a:endParaRPr lang="en-US"/>
-          </a:p>
-        </p:txBody>
-      </p:sp>
+      <p:pic>
+        <p:nvPicPr>
+          <p:cNvPr id="4098" name="Picture 2"/>
+          <p:cNvPicPr>
+            <a:picLocks noChangeAspect="1" noChangeArrowheads="1"/>
+          </p:cNvPicPr>
+          <p:nvPr/>
+        </p:nvPicPr>
+        <p:blipFill>
+          <a:blip r:embed="rId2">
+            <a:extLst>
+              <a:ext uri="{28A0092B-C50C-407E-A947-70E740481C1C}">
+                <a14:useLocalDpi xmlns:a14="http://schemas.microsoft.com/office/drawing/2010/main" val="0"/>
+              </a:ext>
+            </a:extLst>
+          </a:blip>
+          <a:srcRect/>
+          <a:stretch>
+            <a:fillRect/>
+          </a:stretch>
+        </p:blipFill>
+        <p:spPr bwMode="auto">
+          <a:xfrm>
+            <a:off x="4231" y="1066800"/>
+            <a:ext cx="9139769" cy="4791075"/>
+          </a:xfrm>
+          <a:prstGeom prst="rect">
+            <a:avLst/>
+          </a:prstGeom>
+          <a:noFill/>
+          <a:ln>
+            <a:noFill/>
+          </a:ln>
+          <a:effectLst/>
+          <a:extLst>
+            <a:ext uri="{909E8E84-426E-40DD-AFC4-6F175D3DCCD1}">
+              <a14:hiddenFill xmlns:a14="http://schemas.microsoft.com/office/drawing/2010/main">
+                <a:solidFill>
+                  <a:schemeClr val="accent1"/>
+                </a:solidFill>
+              </a14:hiddenFill>
+            </a:ext>
+            <a:ext uri="{91240B29-F687-4F45-9708-019B960494DF}">
+              <a14:hiddenLine xmlns:a14="http://schemas.microsoft.com/office/drawing/2010/main" w="9525">
+                <a:solidFill>
+                  <a:schemeClr val="tx1"/>
+                </a:solidFill>
+                <a:miter lim="800000"/>
+                <a:headEnd/>
+                <a:tailEnd/>
+              </a14:hiddenLine>
+            </a:ext>
+            <a:ext uri="{AF507438-7753-43E0-B8FC-AC1667EBCBE1}">
+              <a14:hiddenEffects xmlns:a14="http://schemas.microsoft.com/office/drawing/2010/main">
+                <a:effectLst>
+                  <a:outerShdw dist="35921" dir="2700000" algn="ctr" rotWithShape="0">
+                    <a:schemeClr val="bg2"/>
+                  </a:outerShdw>
+                </a:effectLst>
+              </a14:hiddenEffects>
+            </a:ext>
+          </a:extLst>
+        </p:spPr>
+      </p:pic>
     </p:spTree>
     <p:extLst>
       <p:ext uri="{BB962C8B-B14F-4D97-AF65-F5344CB8AC3E}">
@@ -8686,7 +8703,7 @@
 </p:sld>
 </file>
 
-<file path=ppt/slides/slide17.xml><?xml version="1.0" encoding="utf-8"?>
+<file path=ppt/slides/slide13.xml><?xml version="1.0" encoding="utf-8"?>
 <p:sld xmlns:a="http://schemas.openxmlformats.org/drawingml/2006/main" xmlns:r="http://schemas.openxmlformats.org/officeDocument/2006/relationships" xmlns:p="http://schemas.openxmlformats.org/presentationml/2006/main">
   <p:cSld>
     <p:spTree>
@@ -8810,7 +8827,7 @@
 </p:sld>
 </file>
 
-<file path=ppt/slides/slide18.xml><?xml version="1.0" encoding="utf-8"?>
+<file path=ppt/slides/slide14.xml><?xml version="1.0" encoding="utf-8"?>
 <p:sld xmlns:a="http://schemas.openxmlformats.org/drawingml/2006/main" xmlns:r="http://schemas.openxmlformats.org/officeDocument/2006/relationships" xmlns:p="http://schemas.openxmlformats.org/presentationml/2006/main">
   <p:cSld>
     <p:spTree>
@@ -8849,11 +8866,7 @@
           <a:p>
             <a:r>
               <a:rPr lang="en-US" sz="3600" dirty="0" smtClean="0"/>
-              <a:t>Demonstration Agent </a:t>
-            </a:r>
-            <a:r>
-              <a:rPr lang="en-US" sz="3600" dirty="0" smtClean="0"/>
-              <a:t>Communication</a:t>
+              <a:t>Demonstration Agent Communication</a:t>
             </a:r>
             <a:endParaRPr lang="en-US" dirty="0"/>
           </a:p>
@@ -8909,6 +8922,511 @@
 </p:sld>
 </file>
 
+<file path=ppt/slides/slide15.xml><?xml version="1.0" encoding="utf-8"?>
+<p:sld xmlns:a="http://schemas.openxmlformats.org/drawingml/2006/main" xmlns:r="http://schemas.openxmlformats.org/officeDocument/2006/relationships" xmlns:p="http://schemas.openxmlformats.org/presentationml/2006/main">
+  <p:cSld>
+    <p:spTree>
+      <p:nvGrpSpPr>
+        <p:cNvPr id="1" name=""/>
+        <p:cNvGrpSpPr/>
+        <p:nvPr/>
+      </p:nvGrpSpPr>
+      <p:grpSpPr>
+        <a:xfrm>
+          <a:off x="0" y="0"/>
+          <a:ext cx="0" cy="0"/>
+          <a:chOff x="0" y="0"/>
+          <a:chExt cx="0" cy="0"/>
+        </a:xfrm>
+      </p:grpSpPr>
+      <p:sp>
+        <p:nvSpPr>
+          <p:cNvPr id="2" name="Title 1"/>
+          <p:cNvSpPr>
+            <a:spLocks noGrp="1"/>
+          </p:cNvSpPr>
+          <p:nvPr>
+            <p:ph type="title"/>
+          </p:nvPr>
+        </p:nvSpPr>
+        <p:spPr>
+          <a:xfrm>
+            <a:off x="469735" y="152400"/>
+            <a:ext cx="8229600" cy="838200"/>
+          </a:xfrm>
+        </p:spPr>
+        <p:txBody>
+          <a:bodyPr/>
+          <a:lstStyle/>
+          <a:p>
+            <a:r>
+              <a:rPr lang="en-US" sz="3600" dirty="0" smtClean="0"/>
+              <a:t>Demonstration Agent Communication</a:t>
+            </a:r>
+            <a:endParaRPr lang="en-US" dirty="0"/>
+          </a:p>
+        </p:txBody>
+      </p:sp>
+      <p:pic>
+        <p:nvPicPr>
+          <p:cNvPr id="1026" name="Picture 2"/>
+          <p:cNvPicPr>
+            <a:picLocks noChangeAspect="1" noChangeArrowheads="1"/>
+          </p:cNvPicPr>
+          <p:nvPr/>
+        </p:nvPicPr>
+        <p:blipFill>
+          <a:blip r:embed="rId3">
+            <a:extLst>
+              <a:ext uri="{28A0092B-C50C-407E-A947-70E740481C1C}">
+                <a14:useLocalDpi xmlns:a14="http://schemas.microsoft.com/office/drawing/2010/main" val="0"/>
+              </a:ext>
+            </a:extLst>
+          </a:blip>
+          <a:srcRect/>
+          <a:stretch>
+            <a:fillRect/>
+          </a:stretch>
+        </p:blipFill>
+        <p:spPr bwMode="auto">
+          <a:xfrm>
+            <a:off x="176213" y="1614488"/>
+            <a:ext cx="8791575" cy="3629025"/>
+          </a:xfrm>
+          <a:prstGeom prst="rect">
+            <a:avLst/>
+          </a:prstGeom>
+          <a:noFill/>
+          <a:ln>
+            <a:noFill/>
+          </a:ln>
+          <a:effectLst/>
+          <a:extLst>
+            <a:ext uri="{909E8E84-426E-40DD-AFC4-6F175D3DCCD1}">
+              <a14:hiddenFill xmlns:a14="http://schemas.microsoft.com/office/drawing/2010/main">
+                <a:solidFill>
+                  <a:schemeClr val="accent1"/>
+                </a:solidFill>
+              </a14:hiddenFill>
+            </a:ext>
+            <a:ext uri="{91240B29-F687-4F45-9708-019B960494DF}">
+              <a14:hiddenLine xmlns:a14="http://schemas.microsoft.com/office/drawing/2010/main" w="9525">
+                <a:solidFill>
+                  <a:schemeClr val="tx1"/>
+                </a:solidFill>
+                <a:miter lim="800000"/>
+                <a:headEnd/>
+                <a:tailEnd/>
+              </a14:hiddenLine>
+            </a:ext>
+            <a:ext uri="{AF507438-7753-43E0-B8FC-AC1667EBCBE1}">
+              <a14:hiddenEffects xmlns:a14="http://schemas.microsoft.com/office/drawing/2010/main">
+                <a:effectLst>
+                  <a:outerShdw dist="35921" dir="2700000" algn="ctr" rotWithShape="0">
+                    <a:schemeClr val="bg2"/>
+                  </a:outerShdw>
+                </a:effectLst>
+              </a14:hiddenEffects>
+            </a:ext>
+          </a:extLst>
+        </p:spPr>
+      </p:pic>
+    </p:spTree>
+    <p:extLst>
+      <p:ext uri="{BB962C8B-B14F-4D97-AF65-F5344CB8AC3E}">
+        <p14:creationId xmlns:p14="http://schemas.microsoft.com/office/powerpoint/2010/main" val="2675656598"/>
+      </p:ext>
+    </p:extLst>
+  </p:cSld>
+  <p:clrMapOvr>
+    <a:masterClrMapping/>
+  </p:clrMapOvr>
+  <p:timing>
+    <p:tnLst>
+      <p:par>
+        <p:cTn id="1" dur="indefinite" restart="never" nodeType="tmRoot"/>
+      </p:par>
+    </p:tnLst>
+  </p:timing>
+</p:sld>
+</file>
+
+<file path=ppt/slides/slide16.xml><?xml version="1.0" encoding="utf-8"?>
+<p:sld xmlns:a="http://schemas.openxmlformats.org/drawingml/2006/main" xmlns:r="http://schemas.openxmlformats.org/officeDocument/2006/relationships" xmlns:p="http://schemas.openxmlformats.org/presentationml/2006/main">
+  <p:cSld>
+    <p:spTree>
+      <p:nvGrpSpPr>
+        <p:cNvPr id="1" name=""/>
+        <p:cNvGrpSpPr/>
+        <p:nvPr/>
+      </p:nvGrpSpPr>
+      <p:grpSpPr>
+        <a:xfrm>
+          <a:off x="0" y="0"/>
+          <a:ext cx="0" cy="0"/>
+          <a:chOff x="0" y="0"/>
+          <a:chExt cx="0" cy="0"/>
+        </a:xfrm>
+      </p:grpSpPr>
+      <p:sp>
+        <p:nvSpPr>
+          <p:cNvPr id="2" name="Title 1"/>
+          <p:cNvSpPr>
+            <a:spLocks noGrp="1"/>
+          </p:cNvSpPr>
+          <p:nvPr>
+            <p:ph type="title"/>
+          </p:nvPr>
+        </p:nvSpPr>
+        <p:spPr>
+          <a:xfrm>
+            <a:off x="457200" y="274638"/>
+            <a:ext cx="8229600" cy="1858962"/>
+          </a:xfrm>
+        </p:spPr>
+        <p:txBody>
+          <a:bodyPr/>
+          <a:lstStyle/>
+          <a:p>
+            <a:r>
+              <a:rPr lang="en-US" sz="3600" dirty="0" smtClean="0"/>
+              <a:t>Demonstration Interaction with </a:t>
+            </a:r>
+            <a:r>
+              <a:rPr lang="en-US" sz="3600" dirty="0" smtClean="0"/>
+              <a:t>SUMO</a:t>
+            </a:r>
+            <a:r>
+              <a:rPr lang="en-US" dirty="0" smtClean="0"/>
+              <a:t/>
+            </a:r>
+            <a:br>
+              <a:rPr lang="en-US" dirty="0" smtClean="0"/>
+            </a:br>
+            <a:endParaRPr lang="en-US" dirty="0"/>
+          </a:p>
+        </p:txBody>
+      </p:sp>
+      <p:pic>
+        <p:nvPicPr>
+          <p:cNvPr id="10242" name="Picture 2"/>
+          <p:cNvPicPr>
+            <a:picLocks noChangeAspect="1" noChangeArrowheads="1"/>
+          </p:cNvPicPr>
+          <p:nvPr/>
+        </p:nvPicPr>
+        <p:blipFill>
+          <a:blip r:embed="rId2">
+            <a:extLst>
+              <a:ext uri="{28A0092B-C50C-407E-A947-70E740481C1C}">
+                <a14:useLocalDpi xmlns:a14="http://schemas.microsoft.com/office/drawing/2010/main" val="0"/>
+              </a:ext>
+            </a:extLst>
+          </a:blip>
+          <a:srcRect/>
+          <a:stretch>
+            <a:fillRect/>
+          </a:stretch>
+        </p:blipFill>
+        <p:spPr bwMode="auto">
+          <a:xfrm>
+            <a:off x="533400" y="1728788"/>
+            <a:ext cx="5420129" cy="4367212"/>
+          </a:xfrm>
+          <a:prstGeom prst="rect">
+            <a:avLst/>
+          </a:prstGeom>
+          <a:noFill/>
+          <a:ln>
+            <a:noFill/>
+          </a:ln>
+          <a:effectLst/>
+          <a:extLst>
+            <a:ext uri="{909E8E84-426E-40DD-AFC4-6F175D3DCCD1}">
+              <a14:hiddenFill xmlns:a14="http://schemas.microsoft.com/office/drawing/2010/main">
+                <a:solidFill>
+                  <a:schemeClr val="accent1"/>
+                </a:solidFill>
+              </a14:hiddenFill>
+            </a:ext>
+            <a:ext uri="{91240B29-F687-4F45-9708-019B960494DF}">
+              <a14:hiddenLine xmlns:a14="http://schemas.microsoft.com/office/drawing/2010/main" w="9525">
+                <a:solidFill>
+                  <a:schemeClr val="tx1"/>
+                </a:solidFill>
+                <a:miter lim="800000"/>
+                <a:headEnd/>
+                <a:tailEnd/>
+              </a14:hiddenLine>
+            </a:ext>
+            <a:ext uri="{AF507438-7753-43E0-B8FC-AC1667EBCBE1}">
+              <a14:hiddenEffects xmlns:a14="http://schemas.microsoft.com/office/drawing/2010/main">
+                <a:effectLst>
+                  <a:outerShdw dist="35921" dir="2700000" algn="ctr" rotWithShape="0">
+                    <a:schemeClr val="bg2"/>
+                  </a:outerShdw>
+                </a:effectLst>
+              </a14:hiddenEffects>
+            </a:ext>
+          </a:extLst>
+        </p:spPr>
+      </p:pic>
+    </p:spTree>
+    <p:extLst>
+      <p:ext uri="{BB962C8B-B14F-4D97-AF65-F5344CB8AC3E}">
+        <p14:creationId xmlns:p14="http://schemas.microsoft.com/office/powerpoint/2010/main" val="3794968801"/>
+      </p:ext>
+    </p:extLst>
+  </p:cSld>
+  <p:clrMapOvr>
+    <a:masterClrMapping/>
+  </p:clrMapOvr>
+  <p:timing>
+    <p:tnLst>
+      <p:par>
+        <p:cTn id="1" dur="indefinite" restart="never" nodeType="tmRoot"/>
+      </p:par>
+    </p:tnLst>
+  </p:timing>
+</p:sld>
+</file>
+
+<file path=ppt/slides/slide17.xml><?xml version="1.0" encoding="utf-8"?>
+<p:sld xmlns:a="http://schemas.openxmlformats.org/drawingml/2006/main" xmlns:r="http://schemas.openxmlformats.org/officeDocument/2006/relationships" xmlns:p="http://schemas.openxmlformats.org/presentationml/2006/main">
+  <p:cSld>
+    <p:spTree>
+      <p:nvGrpSpPr>
+        <p:cNvPr id="1" name=""/>
+        <p:cNvGrpSpPr/>
+        <p:nvPr/>
+      </p:nvGrpSpPr>
+      <p:grpSpPr>
+        <a:xfrm>
+          <a:off x="0" y="0"/>
+          <a:ext cx="0" cy="0"/>
+          <a:chOff x="0" y="0"/>
+          <a:chExt cx="0" cy="0"/>
+        </a:xfrm>
+      </p:grpSpPr>
+      <p:sp>
+        <p:nvSpPr>
+          <p:cNvPr id="2" name="Title 1"/>
+          <p:cNvSpPr>
+            <a:spLocks noGrp="1"/>
+          </p:cNvSpPr>
+          <p:nvPr>
+            <p:ph type="title"/>
+          </p:nvPr>
+        </p:nvSpPr>
+        <p:spPr/>
+        <p:txBody>
+          <a:bodyPr/>
+          <a:lstStyle/>
+          <a:p>
+            <a:r>
+              <a:rPr lang="en-US" dirty="0" smtClean="0"/>
+              <a:t>Phase II Deliverables</a:t>
+            </a:r>
+            <a:endParaRPr lang="en-US" dirty="0"/>
+          </a:p>
+        </p:txBody>
+      </p:sp>
+      <p:sp>
+        <p:nvSpPr>
+          <p:cNvPr id="3" name="Content Placeholder 2"/>
+          <p:cNvSpPr>
+            <a:spLocks noGrp="1"/>
+          </p:cNvSpPr>
+          <p:nvPr>
+            <p:ph idx="1"/>
+          </p:nvPr>
+        </p:nvSpPr>
+        <p:spPr>
+          <a:xfrm>
+            <a:off x="457200" y="1295400"/>
+            <a:ext cx="8229600" cy="5029200"/>
+          </a:xfrm>
+        </p:spPr>
+        <p:txBody>
+          <a:bodyPr/>
+          <a:lstStyle/>
+          <a:p>
+            <a:r>
+              <a:rPr lang="en-US" sz="2400" dirty="0" smtClean="0"/>
+              <a:t>Action Items from Phase 1</a:t>
+            </a:r>
+          </a:p>
+          <a:p>
+            <a:r>
+              <a:rPr lang="en-US" sz="2400" dirty="0" smtClean="0"/>
+              <a:t>Vision Document 2.0</a:t>
+            </a:r>
+          </a:p>
+          <a:p>
+            <a:r>
+              <a:rPr lang="en-US" sz="2400" dirty="0" smtClean="0"/>
+              <a:t>Project Plan 2.0</a:t>
+            </a:r>
+          </a:p>
+          <a:p>
+            <a:r>
+              <a:rPr lang="en-US" sz="2400" dirty="0" smtClean="0"/>
+              <a:t>Formal Requirements Specification</a:t>
+            </a:r>
+          </a:p>
+          <a:p>
+            <a:r>
+              <a:rPr lang="en-US" sz="2400" dirty="0" smtClean="0"/>
+              <a:t>Architecture Design 1.0</a:t>
+            </a:r>
+          </a:p>
+          <a:p>
+            <a:r>
+              <a:rPr lang="en-US" sz="2400" dirty="0" smtClean="0"/>
+              <a:t>Test Plan</a:t>
+            </a:r>
+          </a:p>
+          <a:p>
+            <a:r>
+              <a:rPr lang="en-US" sz="2400" dirty="0" smtClean="0"/>
+              <a:t>Formal Technical Inspection Checklist</a:t>
+            </a:r>
+          </a:p>
+          <a:p>
+            <a:r>
+              <a:rPr lang="en-US" sz="2400" dirty="0" smtClean="0"/>
+              <a:t>Executable Architecture Prototype</a:t>
+            </a:r>
+          </a:p>
+          <a:p>
+            <a:r>
+              <a:rPr lang="en-US" sz="2400" dirty="0" smtClean="0"/>
+              <a:t>Risk Log Update</a:t>
+            </a:r>
+          </a:p>
+          <a:p>
+            <a:r>
+              <a:rPr lang="en-US" sz="2400" dirty="0" smtClean="0"/>
+              <a:t>Presentation 2</a:t>
+            </a:r>
+          </a:p>
+          <a:p>
+            <a:endParaRPr lang="en-US" sz="2400" dirty="0"/>
+          </a:p>
+        </p:txBody>
+      </p:sp>
+    </p:spTree>
+    <p:extLst>
+      <p:ext uri="{BB962C8B-B14F-4D97-AF65-F5344CB8AC3E}">
+        <p14:creationId xmlns:p14="http://schemas.microsoft.com/office/powerpoint/2010/main" val="722826162"/>
+      </p:ext>
+    </p:extLst>
+  </p:cSld>
+  <p:clrMapOvr>
+    <a:masterClrMapping/>
+  </p:clrMapOvr>
+  <p:timing>
+    <p:tnLst>
+      <p:par>
+        <p:cTn id="1" dur="indefinite" restart="never" nodeType="tmRoot"/>
+      </p:par>
+    </p:tnLst>
+  </p:timing>
+</p:sld>
+</file>
+
+<file path=ppt/slides/slide18.xml><?xml version="1.0" encoding="utf-8"?>
+<p:sld xmlns:a="http://schemas.openxmlformats.org/drawingml/2006/main" xmlns:r="http://schemas.openxmlformats.org/officeDocument/2006/relationships" xmlns:p="http://schemas.openxmlformats.org/presentationml/2006/main">
+  <p:cSld>
+    <p:spTree>
+      <p:nvGrpSpPr>
+        <p:cNvPr id="1" name=""/>
+        <p:cNvGrpSpPr/>
+        <p:nvPr/>
+      </p:nvGrpSpPr>
+      <p:grpSpPr>
+        <a:xfrm>
+          <a:off x="0" y="0"/>
+          <a:ext cx="0" cy="0"/>
+          <a:chOff x="0" y="0"/>
+          <a:chExt cx="0" cy="0"/>
+        </a:xfrm>
+      </p:grpSpPr>
+      <p:sp>
+        <p:nvSpPr>
+          <p:cNvPr id="2" name="Title 1"/>
+          <p:cNvSpPr>
+            <a:spLocks noGrp="1"/>
+          </p:cNvSpPr>
+          <p:nvPr>
+            <p:ph type="title"/>
+          </p:nvPr>
+        </p:nvSpPr>
+        <p:spPr/>
+        <p:txBody>
+          <a:bodyPr/>
+          <a:lstStyle/>
+          <a:p>
+            <a:r>
+              <a:rPr lang="en-US" dirty="0" smtClean="0"/>
+              <a:t>Project Log</a:t>
+            </a:r>
+            <a:endParaRPr lang="en-US" dirty="0"/>
+          </a:p>
+        </p:txBody>
+      </p:sp>
+      <p:sp>
+        <p:nvSpPr>
+          <p:cNvPr id="3" name="Content Placeholder 2"/>
+          <p:cNvSpPr>
+            <a:spLocks noGrp="1"/>
+          </p:cNvSpPr>
+          <p:nvPr>
+            <p:ph idx="1"/>
+          </p:nvPr>
+        </p:nvSpPr>
+        <p:spPr/>
+        <p:txBody>
+          <a:bodyPr/>
+          <a:lstStyle/>
+          <a:p>
+            <a:r>
+              <a:rPr lang="en-US" dirty="0" smtClean="0"/>
+              <a:t>Maintained as a Google Document</a:t>
+            </a:r>
+          </a:p>
+          <a:p>
+            <a:r>
+              <a:rPr lang="en-US" dirty="0" smtClean="0"/>
+              <a:t>Exported as PDF for website</a:t>
+            </a:r>
+            <a:endParaRPr lang="en-US" dirty="0" smtClean="0"/>
+          </a:p>
+          <a:p>
+            <a:endParaRPr lang="en-US" dirty="0"/>
+          </a:p>
+        </p:txBody>
+      </p:sp>
+    </p:spTree>
+    <p:extLst>
+      <p:ext uri="{BB962C8B-B14F-4D97-AF65-F5344CB8AC3E}">
+        <p14:creationId xmlns:p14="http://schemas.microsoft.com/office/powerpoint/2010/main" val="4154735931"/>
+      </p:ext>
+    </p:extLst>
+  </p:cSld>
+  <p:clrMapOvr>
+    <a:masterClrMapping/>
+  </p:clrMapOvr>
+  <p:timing>
+    <p:tnLst>
+      <p:par>
+        <p:cTn id="1" dur="indefinite" restart="never" nodeType="tmRoot"/>
+      </p:par>
+    </p:tnLst>
+  </p:timing>
+</p:sld>
+</file>
+
 <file path=ppt/slides/slide19.xml><?xml version="1.0" encoding="utf-8"?>
 <p:sld xmlns:a="http://schemas.openxmlformats.org/drawingml/2006/main" xmlns:r="http://schemas.openxmlformats.org/officeDocument/2006/relationships" xmlns:p="http://schemas.openxmlformats.org/presentationml/2006/main">
   <p:cSld>
@@ -8936,62 +9454,640 @@
             <p:ph type="title"/>
           </p:nvPr>
         </p:nvSpPr>
+        <p:spPr/>
+        <p:txBody>
+          <a:bodyPr/>
+          <a:lstStyle/>
+          <a:p>
+            <a:r>
+              <a:rPr lang="en-US" dirty="0" smtClean="0"/>
+              <a:t>Project Risks and Spikes</a:t>
+            </a:r>
+            <a:endParaRPr lang="en-US" dirty="0"/>
+          </a:p>
+        </p:txBody>
+      </p:sp>
+      <p:sp>
+        <p:nvSpPr>
+          <p:cNvPr id="3" name="Content Placeholder 2"/>
+          <p:cNvSpPr>
+            <a:spLocks noGrp="1"/>
+          </p:cNvSpPr>
+          <p:nvPr>
+            <p:ph idx="1"/>
+          </p:nvPr>
+        </p:nvSpPr>
         <p:spPr>
           <a:xfrm>
-            <a:off x="469735" y="152400"/>
-            <a:ext cx="8229600" cy="838200"/>
+            <a:off x="405765" y="1600200"/>
+            <a:ext cx="2566035" cy="4648200"/>
           </a:xfrm>
         </p:spPr>
         <p:txBody>
           <a:bodyPr/>
           <a:lstStyle/>
           <a:p>
-            <a:r>
-              <a:rPr lang="en-US" sz="3600" dirty="0" smtClean="0"/>
-              <a:t>Demonstration Agent </a:t>
-            </a:r>
-            <a:r>
-              <a:rPr lang="en-US" sz="3600" dirty="0" smtClean="0"/>
-              <a:t>Communication</a:t>
+            <a:pPr marL="0" indent="0">
+              <a:buNone/>
+            </a:pPr>
+            <a:r>
+              <a:rPr lang="en-US" dirty="0" smtClean="0"/>
+              <a:t>Risks</a:t>
+            </a:r>
+          </a:p>
+          <a:p>
+            <a:r>
+              <a:rPr lang="en-US" dirty="0" smtClean="0"/>
+              <a:t>Python</a:t>
+            </a:r>
+          </a:p>
+          <a:p>
+            <a:r>
+              <a:rPr lang="en-US" dirty="0" smtClean="0"/>
+              <a:t>RabbitMQ</a:t>
+            </a:r>
+          </a:p>
+          <a:p>
+            <a:r>
+              <a:rPr lang="en-US" dirty="0" err="1" smtClean="0"/>
+              <a:t>MongoDB</a:t>
+            </a:r>
+            <a:endParaRPr lang="en-US" dirty="0" smtClean="0"/>
+          </a:p>
+          <a:p>
+            <a:r>
+              <a:rPr lang="en-US" dirty="0" smtClean="0"/>
+              <a:t>SUMO</a:t>
+            </a:r>
+          </a:p>
+          <a:p>
+            <a:r>
+              <a:rPr lang="en-US" dirty="0" err="1" smtClean="0"/>
+              <a:t>git</a:t>
+            </a:r>
+            <a:endParaRPr lang="en-US" dirty="0" smtClean="0"/>
+          </a:p>
+          <a:p>
+            <a:r>
+              <a:rPr lang="en-US" dirty="0" smtClean="0"/>
+              <a:t>Scope</a:t>
+            </a:r>
+          </a:p>
+          <a:p>
+            <a:r>
+              <a:rPr lang="en-US" dirty="0" smtClean="0"/>
+              <a:t>Time</a:t>
             </a:r>
             <a:endParaRPr lang="en-US" dirty="0"/>
           </a:p>
         </p:txBody>
       </p:sp>
-      <p:pic>
-        <p:nvPicPr>
-          <p:cNvPr id="3" name="Picture 2"/>
-          <p:cNvPicPr>
-            <a:picLocks noChangeAspect="1"/>
-          </p:cNvPicPr>
+      <p:sp>
+        <p:nvSpPr>
+          <p:cNvPr id="4" name="Content Placeholder 2"/>
+          <p:cNvSpPr txBox="1">
+            <a:spLocks/>
+          </p:cNvSpPr>
           <p:nvPr/>
-        </p:nvPicPr>
-        <p:blipFill>
-          <a:blip r:embed="rId3" cstate="print">
-            <a:extLst>
-              <a:ext uri="{28A0092B-C50C-407E-A947-70E740481C1C}">
-                <a14:useLocalDpi xmlns:a14="http://schemas.microsoft.com/office/drawing/2010/main" val="0"/>
-              </a:ext>
-            </a:extLst>
-          </a:blip>
-          <a:stretch>
-            <a:fillRect/>
-          </a:stretch>
-        </p:blipFill>
-        <p:spPr>
+        </p:nvSpPr>
+        <p:spPr bwMode="auto">
           <a:xfrm>
-            <a:off x="415637" y="914400"/>
-            <a:ext cx="8312727" cy="5532082"/>
+            <a:off x="3100387" y="1600200"/>
+            <a:ext cx="2667000" cy="4525963"/>
           </a:xfrm>
           <a:prstGeom prst="rect">
             <a:avLst/>
           </a:prstGeom>
+          <a:noFill/>
+          <a:ln>
+            <a:noFill/>
+          </a:ln>
+          <a:effectLst/>
+          <a:extLst>
+            <a:ext uri="{909E8E84-426E-40DD-AFC4-6F175D3DCCD1}">
+              <a14:hiddenFill xmlns:a14="http://schemas.microsoft.com/office/drawing/2010/main">
+                <a:solidFill>
+                  <a:schemeClr val="accent1"/>
+                </a:solidFill>
+              </a14:hiddenFill>
+            </a:ext>
+            <a:ext uri="{91240B29-F687-4F45-9708-019B960494DF}">
+              <a14:hiddenLine xmlns:a14="http://schemas.microsoft.com/office/drawing/2010/main" w="9525">
+                <a:solidFill>
+                  <a:schemeClr val="tx1"/>
+                </a:solidFill>
+                <a:miter lim="800000"/>
+                <a:headEnd/>
+                <a:tailEnd/>
+              </a14:hiddenLine>
+            </a:ext>
+            <a:ext uri="{AF507438-7753-43E0-B8FC-AC1667EBCBE1}">
+              <a14:hiddenEffects xmlns:a14="http://schemas.microsoft.com/office/drawing/2010/main">
+                <a:effectLst>
+                  <a:outerShdw dist="35921" dir="2700000" algn="ctr" rotWithShape="0">
+                    <a:schemeClr val="bg2"/>
+                  </a:outerShdw>
+                </a:effectLst>
+              </a14:hiddenEffects>
+            </a:ext>
+          </a:extLst>
         </p:spPr>
-      </p:pic>
+        <p:txBody>
+          <a:bodyPr vert="horz" wrap="square" lIns="91440" tIns="45720" rIns="91440" bIns="45720" numCol="1" anchor="t" anchorCtr="0" compatLnSpc="1">
+            <a:prstTxWarp prst="textNoShape">
+              <a:avLst/>
+            </a:prstTxWarp>
+          </a:bodyPr>
+          <a:lstStyle>
+            <a:lvl1pPr marL="342900" indent="-342900" algn="l" rtl="0" fontAlgn="base">
+              <a:spcBef>
+                <a:spcPct val="20000"/>
+              </a:spcBef>
+              <a:spcAft>
+                <a:spcPct val="0"/>
+              </a:spcAft>
+              <a:buChar char="•"/>
+              <a:defRPr sz="3200">
+                <a:solidFill>
+                  <a:schemeClr val="bg1"/>
+                </a:solidFill>
+                <a:latin typeface="+mn-lt"/>
+                <a:ea typeface="+mn-ea"/>
+                <a:cs typeface="+mn-cs"/>
+              </a:defRPr>
+            </a:lvl1pPr>
+            <a:lvl2pPr marL="742950" indent="-285750" algn="l" rtl="0" fontAlgn="base">
+              <a:spcBef>
+                <a:spcPct val="20000"/>
+              </a:spcBef>
+              <a:spcAft>
+                <a:spcPct val="0"/>
+              </a:spcAft>
+              <a:buChar char="–"/>
+              <a:defRPr sz="2800">
+                <a:solidFill>
+                  <a:schemeClr val="bg1"/>
+                </a:solidFill>
+                <a:latin typeface="+mn-lt"/>
+              </a:defRPr>
+            </a:lvl2pPr>
+            <a:lvl3pPr marL="1143000" indent="-228600" algn="l" rtl="0" fontAlgn="base">
+              <a:spcBef>
+                <a:spcPct val="20000"/>
+              </a:spcBef>
+              <a:spcAft>
+                <a:spcPct val="0"/>
+              </a:spcAft>
+              <a:buChar char="•"/>
+              <a:defRPr sz="2400">
+                <a:solidFill>
+                  <a:schemeClr val="bg1"/>
+                </a:solidFill>
+                <a:latin typeface="+mn-lt"/>
+              </a:defRPr>
+            </a:lvl3pPr>
+            <a:lvl4pPr marL="1600200" indent="-228600" algn="l" rtl="0" fontAlgn="base">
+              <a:spcBef>
+                <a:spcPct val="20000"/>
+              </a:spcBef>
+              <a:spcAft>
+                <a:spcPct val="0"/>
+              </a:spcAft>
+              <a:buChar char="–"/>
+              <a:defRPr sz="2000">
+                <a:solidFill>
+                  <a:schemeClr val="bg1"/>
+                </a:solidFill>
+                <a:latin typeface="+mn-lt"/>
+              </a:defRPr>
+            </a:lvl4pPr>
+            <a:lvl5pPr marL="2057400" indent="-228600" algn="l" rtl="0" fontAlgn="base">
+              <a:spcBef>
+                <a:spcPct val="20000"/>
+              </a:spcBef>
+              <a:spcAft>
+                <a:spcPct val="0"/>
+              </a:spcAft>
+              <a:buChar char="»"/>
+              <a:defRPr sz="2000">
+                <a:solidFill>
+                  <a:schemeClr val="bg1"/>
+                </a:solidFill>
+                <a:latin typeface="+mn-lt"/>
+              </a:defRPr>
+            </a:lvl5pPr>
+            <a:lvl6pPr marL="2514600" indent="-228600" algn="l" rtl="0" fontAlgn="base">
+              <a:spcBef>
+                <a:spcPct val="20000"/>
+              </a:spcBef>
+              <a:spcAft>
+                <a:spcPct val="0"/>
+              </a:spcAft>
+              <a:buChar char="»"/>
+              <a:defRPr sz="2000">
+                <a:solidFill>
+                  <a:schemeClr val="bg1"/>
+                </a:solidFill>
+                <a:latin typeface="+mn-lt"/>
+              </a:defRPr>
+            </a:lvl6pPr>
+            <a:lvl7pPr marL="2971800" indent="-228600" algn="l" rtl="0" fontAlgn="base">
+              <a:spcBef>
+                <a:spcPct val="20000"/>
+              </a:spcBef>
+              <a:spcAft>
+                <a:spcPct val="0"/>
+              </a:spcAft>
+              <a:buChar char="»"/>
+              <a:defRPr sz="2000">
+                <a:solidFill>
+                  <a:schemeClr val="bg1"/>
+                </a:solidFill>
+                <a:latin typeface="+mn-lt"/>
+              </a:defRPr>
+            </a:lvl7pPr>
+            <a:lvl8pPr marL="3429000" indent="-228600" algn="l" rtl="0" fontAlgn="base">
+              <a:spcBef>
+                <a:spcPct val="20000"/>
+              </a:spcBef>
+              <a:spcAft>
+                <a:spcPct val="0"/>
+              </a:spcAft>
+              <a:buChar char="»"/>
+              <a:defRPr sz="2000">
+                <a:solidFill>
+                  <a:schemeClr val="bg1"/>
+                </a:solidFill>
+                <a:latin typeface="+mn-lt"/>
+              </a:defRPr>
+            </a:lvl8pPr>
+            <a:lvl9pPr marL="3886200" indent="-228600" algn="l" rtl="0" fontAlgn="base">
+              <a:spcBef>
+                <a:spcPct val="20000"/>
+              </a:spcBef>
+              <a:spcAft>
+                <a:spcPct val="0"/>
+              </a:spcAft>
+              <a:buChar char="»"/>
+              <a:defRPr sz="2000">
+                <a:solidFill>
+                  <a:schemeClr val="bg1"/>
+                </a:solidFill>
+                <a:latin typeface="+mn-lt"/>
+              </a:defRPr>
+            </a:lvl9pPr>
+          </a:lstStyle>
+          <a:p>
+            <a:pPr marL="0" indent="0">
+              <a:buFontTx/>
+              <a:buNone/>
+            </a:pPr>
+            <a:r>
+              <a:rPr lang="en-US" sz="2000" dirty="0" smtClean="0"/>
+              <a:t>Spikes</a:t>
+            </a:r>
+          </a:p>
+          <a:p>
+            <a:r>
+              <a:rPr lang="en-US" sz="2000" dirty="0" smtClean="0"/>
+              <a:t>Python</a:t>
+            </a:r>
+          </a:p>
+          <a:p>
+            <a:r>
+              <a:rPr lang="en-US" sz="2000" dirty="0" smtClean="0"/>
+              <a:t>RabbitMQ</a:t>
+            </a:r>
+          </a:p>
+          <a:p>
+            <a:pPr lvl="1"/>
+            <a:r>
+              <a:rPr lang="en-US" sz="2000" dirty="0" smtClean="0"/>
+              <a:t>Q </a:t>
+            </a:r>
+            <a:r>
+              <a:rPr lang="en-US" sz="2000" dirty="0" err="1" smtClean="0"/>
+              <a:t>Fanout</a:t>
+            </a:r>
+            <a:endParaRPr lang="en-US" sz="2000" dirty="0" smtClean="0"/>
+          </a:p>
+          <a:p>
+            <a:pPr lvl="1"/>
+            <a:r>
+              <a:rPr lang="en-US" sz="2000" dirty="0" smtClean="0"/>
+              <a:t>Aggregation</a:t>
+            </a:r>
+          </a:p>
+          <a:p>
+            <a:r>
+              <a:rPr lang="en-US" sz="2000" dirty="0" err="1" smtClean="0"/>
+              <a:t>MongoDB</a:t>
+            </a:r>
+            <a:endParaRPr lang="en-US" sz="2000" dirty="0" smtClean="0"/>
+          </a:p>
+          <a:p>
+            <a:pPr lvl="1"/>
+            <a:r>
+              <a:rPr lang="en-US" sz="2000" dirty="0" smtClean="0"/>
+              <a:t>training</a:t>
+            </a:r>
+          </a:p>
+          <a:p>
+            <a:r>
+              <a:rPr lang="en-US" sz="2000" dirty="0" err="1" smtClean="0"/>
+              <a:t>git</a:t>
+            </a:r>
+            <a:endParaRPr lang="en-US" sz="2000" dirty="0" smtClean="0"/>
+          </a:p>
+          <a:p>
+            <a:pPr lvl="1"/>
+            <a:r>
+              <a:rPr lang="en-US" sz="2000" dirty="0" smtClean="0"/>
+              <a:t>reading</a:t>
+            </a:r>
+          </a:p>
+          <a:p>
+            <a:pPr lvl="1"/>
+            <a:r>
+              <a:rPr lang="en-US" sz="2000" dirty="0" smtClean="0"/>
+              <a:t>seminars</a:t>
+            </a:r>
+          </a:p>
+          <a:p>
+            <a:pPr lvl="1"/>
+            <a:r>
+              <a:rPr lang="en-US" sz="2000" dirty="0" smtClean="0"/>
+              <a:t>hands on use</a:t>
+            </a:r>
+          </a:p>
+        </p:txBody>
+      </p:sp>
+      <p:sp>
+        <p:nvSpPr>
+          <p:cNvPr id="5" name="Content Placeholder 2"/>
+          <p:cNvSpPr txBox="1">
+            <a:spLocks/>
+          </p:cNvSpPr>
+          <p:nvPr/>
+        </p:nvSpPr>
+        <p:spPr bwMode="auto">
+          <a:xfrm>
+            <a:off x="5895975" y="1600200"/>
+            <a:ext cx="2971800" cy="4525963"/>
+          </a:xfrm>
+          <a:prstGeom prst="rect">
+            <a:avLst/>
+          </a:prstGeom>
+          <a:noFill/>
+          <a:ln>
+            <a:noFill/>
+          </a:ln>
+          <a:effectLst/>
+          <a:extLst>
+            <a:ext uri="{909E8E84-426E-40DD-AFC4-6F175D3DCCD1}">
+              <a14:hiddenFill xmlns:a14="http://schemas.microsoft.com/office/drawing/2010/main">
+                <a:solidFill>
+                  <a:schemeClr val="accent1"/>
+                </a:solidFill>
+              </a14:hiddenFill>
+            </a:ext>
+            <a:ext uri="{91240B29-F687-4F45-9708-019B960494DF}">
+              <a14:hiddenLine xmlns:a14="http://schemas.microsoft.com/office/drawing/2010/main" w="9525">
+                <a:solidFill>
+                  <a:schemeClr val="tx1"/>
+                </a:solidFill>
+                <a:miter lim="800000"/>
+                <a:headEnd/>
+                <a:tailEnd/>
+              </a14:hiddenLine>
+            </a:ext>
+            <a:ext uri="{AF507438-7753-43E0-B8FC-AC1667EBCBE1}">
+              <a14:hiddenEffects xmlns:a14="http://schemas.microsoft.com/office/drawing/2010/main">
+                <a:effectLst>
+                  <a:outerShdw dist="35921" dir="2700000" algn="ctr" rotWithShape="0">
+                    <a:schemeClr val="bg2"/>
+                  </a:outerShdw>
+                </a:effectLst>
+              </a14:hiddenEffects>
+            </a:ext>
+          </a:extLst>
+        </p:spPr>
+        <p:txBody>
+          <a:bodyPr vert="horz" wrap="square" lIns="91440" tIns="45720" rIns="91440" bIns="45720" numCol="1" anchor="t" anchorCtr="0" compatLnSpc="1">
+            <a:prstTxWarp prst="textNoShape">
+              <a:avLst/>
+            </a:prstTxWarp>
+          </a:bodyPr>
+          <a:lstStyle>
+            <a:lvl1pPr marL="342900" indent="-342900" algn="l" rtl="0" fontAlgn="base">
+              <a:spcBef>
+                <a:spcPct val="20000"/>
+              </a:spcBef>
+              <a:spcAft>
+                <a:spcPct val="0"/>
+              </a:spcAft>
+              <a:buChar char="•"/>
+              <a:defRPr sz="3200">
+                <a:solidFill>
+                  <a:schemeClr val="bg1"/>
+                </a:solidFill>
+                <a:latin typeface="+mn-lt"/>
+                <a:ea typeface="+mn-ea"/>
+                <a:cs typeface="+mn-cs"/>
+              </a:defRPr>
+            </a:lvl1pPr>
+            <a:lvl2pPr marL="742950" indent="-285750" algn="l" rtl="0" fontAlgn="base">
+              <a:spcBef>
+                <a:spcPct val="20000"/>
+              </a:spcBef>
+              <a:spcAft>
+                <a:spcPct val="0"/>
+              </a:spcAft>
+              <a:buChar char="–"/>
+              <a:defRPr sz="2800">
+                <a:solidFill>
+                  <a:schemeClr val="bg1"/>
+                </a:solidFill>
+                <a:latin typeface="+mn-lt"/>
+              </a:defRPr>
+            </a:lvl2pPr>
+            <a:lvl3pPr marL="1143000" indent="-228600" algn="l" rtl="0" fontAlgn="base">
+              <a:spcBef>
+                <a:spcPct val="20000"/>
+              </a:spcBef>
+              <a:spcAft>
+                <a:spcPct val="0"/>
+              </a:spcAft>
+              <a:buChar char="•"/>
+              <a:defRPr sz="2400">
+                <a:solidFill>
+                  <a:schemeClr val="bg1"/>
+                </a:solidFill>
+                <a:latin typeface="+mn-lt"/>
+              </a:defRPr>
+            </a:lvl3pPr>
+            <a:lvl4pPr marL="1600200" indent="-228600" algn="l" rtl="0" fontAlgn="base">
+              <a:spcBef>
+                <a:spcPct val="20000"/>
+              </a:spcBef>
+              <a:spcAft>
+                <a:spcPct val="0"/>
+              </a:spcAft>
+              <a:buChar char="–"/>
+              <a:defRPr sz="2000">
+                <a:solidFill>
+                  <a:schemeClr val="bg1"/>
+                </a:solidFill>
+                <a:latin typeface="+mn-lt"/>
+              </a:defRPr>
+            </a:lvl4pPr>
+            <a:lvl5pPr marL="2057400" indent="-228600" algn="l" rtl="0" fontAlgn="base">
+              <a:spcBef>
+                <a:spcPct val="20000"/>
+              </a:spcBef>
+              <a:spcAft>
+                <a:spcPct val="0"/>
+              </a:spcAft>
+              <a:buChar char="»"/>
+              <a:defRPr sz="2000">
+                <a:solidFill>
+                  <a:schemeClr val="bg1"/>
+                </a:solidFill>
+                <a:latin typeface="+mn-lt"/>
+              </a:defRPr>
+            </a:lvl5pPr>
+            <a:lvl6pPr marL="2514600" indent="-228600" algn="l" rtl="0" fontAlgn="base">
+              <a:spcBef>
+                <a:spcPct val="20000"/>
+              </a:spcBef>
+              <a:spcAft>
+                <a:spcPct val="0"/>
+              </a:spcAft>
+              <a:buChar char="»"/>
+              <a:defRPr sz="2000">
+                <a:solidFill>
+                  <a:schemeClr val="bg1"/>
+                </a:solidFill>
+                <a:latin typeface="+mn-lt"/>
+              </a:defRPr>
+            </a:lvl6pPr>
+            <a:lvl7pPr marL="2971800" indent="-228600" algn="l" rtl="0" fontAlgn="base">
+              <a:spcBef>
+                <a:spcPct val="20000"/>
+              </a:spcBef>
+              <a:spcAft>
+                <a:spcPct val="0"/>
+              </a:spcAft>
+              <a:buChar char="»"/>
+              <a:defRPr sz="2000">
+                <a:solidFill>
+                  <a:schemeClr val="bg1"/>
+                </a:solidFill>
+                <a:latin typeface="+mn-lt"/>
+              </a:defRPr>
+            </a:lvl7pPr>
+            <a:lvl8pPr marL="3429000" indent="-228600" algn="l" rtl="0" fontAlgn="base">
+              <a:spcBef>
+                <a:spcPct val="20000"/>
+              </a:spcBef>
+              <a:spcAft>
+                <a:spcPct val="0"/>
+              </a:spcAft>
+              <a:buChar char="»"/>
+              <a:defRPr sz="2000">
+                <a:solidFill>
+                  <a:schemeClr val="bg1"/>
+                </a:solidFill>
+                <a:latin typeface="+mn-lt"/>
+              </a:defRPr>
+            </a:lvl8pPr>
+            <a:lvl9pPr marL="3886200" indent="-228600" algn="l" rtl="0" fontAlgn="base">
+              <a:spcBef>
+                <a:spcPct val="20000"/>
+              </a:spcBef>
+              <a:spcAft>
+                <a:spcPct val="0"/>
+              </a:spcAft>
+              <a:buChar char="»"/>
+              <a:defRPr sz="2000">
+                <a:solidFill>
+                  <a:schemeClr val="bg1"/>
+                </a:solidFill>
+                <a:latin typeface="+mn-lt"/>
+              </a:defRPr>
+            </a:lvl9pPr>
+          </a:lstStyle>
+          <a:p>
+            <a:pPr marL="0" indent="0">
+              <a:buFontTx/>
+              <a:buNone/>
+            </a:pPr>
+            <a:r>
+              <a:rPr lang="en-US" sz="2000" dirty="0" smtClean="0"/>
+              <a:t>Spikes</a:t>
+            </a:r>
+          </a:p>
+          <a:p>
+            <a:r>
+              <a:rPr lang="en-US" sz="2000" dirty="0" smtClean="0"/>
+              <a:t>SUMO</a:t>
+            </a:r>
+          </a:p>
+          <a:p>
+            <a:pPr lvl="1"/>
+            <a:r>
+              <a:rPr lang="en-US" sz="2000" dirty="0" smtClean="0"/>
+              <a:t>Network Load</a:t>
+            </a:r>
+          </a:p>
+          <a:p>
+            <a:pPr lvl="1"/>
+            <a:r>
+              <a:rPr lang="en-US" sz="2000" dirty="0" smtClean="0"/>
+              <a:t>Network Double T</a:t>
+            </a:r>
+          </a:p>
+          <a:p>
+            <a:pPr lvl="1"/>
+            <a:r>
+              <a:rPr lang="en-US" sz="2000" dirty="0" smtClean="0"/>
+              <a:t>Read from TRACI</a:t>
+            </a:r>
+          </a:p>
+          <a:p>
+            <a:pPr lvl="1"/>
+            <a:r>
+              <a:rPr lang="en-US" sz="2000" dirty="0" smtClean="0"/>
+              <a:t>Send to TRACI</a:t>
+            </a:r>
+          </a:p>
+          <a:p>
+            <a:pPr lvl="1"/>
+            <a:r>
+              <a:rPr lang="en-US" sz="2000" dirty="0" smtClean="0"/>
+              <a:t>Network Metrics</a:t>
+            </a:r>
+          </a:p>
+          <a:p>
+            <a:pPr lvl="1"/>
+            <a:r>
+              <a:rPr lang="en-US" sz="2000" dirty="0" smtClean="0"/>
+              <a:t>Read Sensors</a:t>
+            </a:r>
+          </a:p>
+          <a:p>
+            <a:pPr lvl="1"/>
+            <a:r>
+              <a:rPr lang="en-US" sz="2000" dirty="0" smtClean="0"/>
+              <a:t>Add Sensors</a:t>
+            </a:r>
+          </a:p>
+        </p:txBody>
+      </p:sp>
     </p:spTree>
     <p:extLst>
       <p:ext uri="{BB962C8B-B14F-4D97-AF65-F5344CB8AC3E}">
-        <p14:creationId xmlns:p14="http://schemas.microsoft.com/office/powerpoint/2010/main" val="2675656598"/>
+        <p14:creationId xmlns:p14="http://schemas.microsoft.com/office/powerpoint/2010/main" val="810269815"/>
       </p:ext>
     </p:extLst>
   </p:cSld>
@@ -9070,13 +10166,11 @@
           <a:p>
             <a:r>
               <a:rPr lang="en-US" sz="2100" dirty="0" smtClean="0"/>
-              <a:t>Project Overview</a:t>
-            </a:r>
-          </a:p>
-          <a:p>
+              <a:t>Project </a:t>
+            </a:r>
             <a:r>
               <a:rPr lang="en-US" sz="2100" dirty="0" smtClean="0"/>
-              <a:t>Project Vision</a:t>
+              <a:t>Vision</a:t>
             </a:r>
           </a:p>
           <a:p>
@@ -9119,8 +10213,13 @@
           <a:p>
             <a:r>
               <a:rPr lang="en-US" sz="2100" dirty="0" smtClean="0"/>
-              <a:t>Demonstration Interaction with Simulator</a:t>
-            </a:r>
+              <a:t>Demonstration Interaction with </a:t>
+            </a:r>
+            <a:r>
+              <a:rPr lang="en-US" sz="2100" dirty="0" smtClean="0"/>
+              <a:t>Simulator (SUMO)</a:t>
+            </a:r>
+            <a:endParaRPr lang="en-US" sz="2100" dirty="0" smtClean="0"/>
           </a:p>
           <a:p>
             <a:r>
@@ -9212,55 +10311,54 @@
             <p:ph type="title"/>
           </p:nvPr>
         </p:nvSpPr>
+        <p:spPr/>
+        <p:txBody>
+          <a:bodyPr/>
+          <a:lstStyle/>
+          <a:p>
+            <a:r>
+              <a:rPr lang="en-US" dirty="0" smtClean="0"/>
+              <a:t>Questions and Comments</a:t>
+            </a:r>
+            <a:endParaRPr lang="en-US" dirty="0"/>
+          </a:p>
+        </p:txBody>
+      </p:sp>
+      <p:sp>
+        <p:nvSpPr>
+          <p:cNvPr id="3" name="Content Placeholder 2"/>
+          <p:cNvSpPr>
+            <a:spLocks noGrp="1"/>
+          </p:cNvSpPr>
+          <p:nvPr>
+            <p:ph idx="1"/>
+          </p:nvPr>
+        </p:nvSpPr>
         <p:spPr>
           <a:xfrm>
-            <a:off x="457200" y="274638"/>
-            <a:ext cx="8229600" cy="1858962"/>
+            <a:off x="3581400" y="1676400"/>
+            <a:ext cx="1905000" cy="3048000"/>
           </a:xfrm>
         </p:spPr>
         <p:txBody>
           <a:bodyPr/>
           <a:lstStyle/>
           <a:p>
-            <a:r>
-              <a:rPr lang="en-US" dirty="0" smtClean="0"/>
-              <a:t>Demonstration Interaction with Simulator</a:t>
-            </a:r>
-            <a:br>
-              <a:rPr lang="en-US" dirty="0" smtClean="0"/>
-            </a:br>
-            <a:endParaRPr lang="en-US" dirty="0"/>
-          </a:p>
-        </p:txBody>
-      </p:sp>
-      <p:sp>
-        <p:nvSpPr>
-          <p:cNvPr id="3" name="Content Placeholder 2"/>
-          <p:cNvSpPr>
-            <a:spLocks noGrp="1"/>
-          </p:cNvSpPr>
-          <p:nvPr>
-            <p:ph idx="1"/>
-          </p:nvPr>
-        </p:nvSpPr>
-        <p:spPr>
-          <a:xfrm>
-            <a:off x="457200" y="2057400"/>
-            <a:ext cx="8229600" cy="4068763"/>
-          </a:xfrm>
-        </p:spPr>
-        <p:txBody>
-          <a:bodyPr/>
-          <a:lstStyle/>
-          <a:p>
-            <a:endParaRPr lang="en-US" dirty="0"/>
+            <a:pPr marL="0" indent="0">
+              <a:buNone/>
+            </a:pPr>
+            <a:r>
+              <a:rPr lang="en-US" sz="20000" dirty="0" smtClean="0"/>
+              <a:t>?</a:t>
+            </a:r>
+            <a:endParaRPr lang="en-US" sz="20000" dirty="0"/>
           </a:p>
         </p:txBody>
       </p:sp>
     </p:spTree>
     <p:extLst>
       <p:ext uri="{BB962C8B-B14F-4D97-AF65-F5344CB8AC3E}">
-        <p14:creationId xmlns:p14="http://schemas.microsoft.com/office/powerpoint/2010/main" val="3794968801"/>
+        <p14:creationId xmlns:p14="http://schemas.microsoft.com/office/powerpoint/2010/main" val="3976208202"/>
       </p:ext>
     </p:extLst>
   </p:cSld>
@@ -9304,14 +10402,19 @@
             <p:ph type="title"/>
           </p:nvPr>
         </p:nvSpPr>
-        <p:spPr/>
-        <p:txBody>
-          <a:bodyPr/>
+        <p:spPr>
+          <a:xfrm>
+            <a:off x="457200" y="152400"/>
+            <a:ext cx="8229600" cy="762000"/>
+          </a:xfrm>
+        </p:spPr>
+        <p:txBody>
+          <a:bodyPr anchor="t"/>
           <a:lstStyle/>
           <a:p>
             <a:r>
               <a:rPr lang="en-US" dirty="0" smtClean="0"/>
-              <a:t>Phase II Deliverables</a:t>
+              <a:t>References</a:t>
             </a:r>
             <a:endParaRPr lang="en-US" dirty="0"/>
           </a:p>
@@ -9327,19 +10430,368 @@
             <p:ph idx="1"/>
           </p:nvPr>
         </p:nvSpPr>
-        <p:spPr/>
+        <p:spPr>
+          <a:xfrm>
+            <a:off x="0" y="914400"/>
+            <a:ext cx="9067800" cy="5562600"/>
+          </a:xfrm>
+        </p:spPr>
         <p:txBody>
           <a:bodyPr/>
           <a:lstStyle/>
           <a:p>
-            <a:endParaRPr lang="en-US"/>
+            <a:pPr>
+              <a:spcBef>
+                <a:spcPts val="0"/>
+              </a:spcBef>
+              <a:spcAft>
+                <a:spcPts val="0"/>
+              </a:spcAft>
+            </a:pPr>
+            <a:r>
+              <a:rPr lang="en-US" sz="1600" dirty="0" smtClean="0">
+                <a:latin typeface="Times New Roman" pitchFamily="18" charset="0"/>
+                <a:ea typeface="Calibri"/>
+                <a:cs typeface="Times New Roman" pitchFamily="18" charset="0"/>
+              </a:rPr>
+              <a:t>SUMO</a:t>
+            </a:r>
+            <a:r>
+              <a:rPr lang="en-US" sz="1600" dirty="0">
+                <a:latin typeface="Times New Roman" pitchFamily="18" charset="0"/>
+                <a:ea typeface="Calibri"/>
+                <a:cs typeface="Times New Roman" pitchFamily="18" charset="0"/>
+              </a:rPr>
+              <a:t>, “Simulation for Urban </a:t>
+            </a:r>
+            <a:r>
+              <a:rPr lang="en-US" sz="1600" dirty="0" err="1">
+                <a:latin typeface="Times New Roman" pitchFamily="18" charset="0"/>
+                <a:ea typeface="Calibri"/>
+                <a:cs typeface="Times New Roman" pitchFamily="18" charset="0"/>
+              </a:rPr>
+              <a:t>MObility</a:t>
+            </a:r>
+            <a:r>
+              <a:rPr lang="en-US" sz="1600" dirty="0">
+                <a:latin typeface="Times New Roman" pitchFamily="18" charset="0"/>
+                <a:ea typeface="Calibri"/>
+                <a:cs typeface="Times New Roman" pitchFamily="18" charset="0"/>
+              </a:rPr>
+              <a:t>,” Sep. 2011; http://sourceforge.net/apps/mediawiki/sumo/index.php?title=Main_Page</a:t>
+            </a:r>
+            <a:r>
+              <a:rPr lang="en-US" sz="1600" dirty="0" smtClean="0">
+                <a:latin typeface="Times New Roman" pitchFamily="18" charset="0"/>
+                <a:ea typeface="Calibri"/>
+                <a:cs typeface="Times New Roman" pitchFamily="18" charset="0"/>
+              </a:rPr>
+              <a:t>.</a:t>
+            </a:r>
+            <a:endParaRPr lang="en-US" sz="1600" dirty="0">
+              <a:latin typeface="Times New Roman" pitchFamily="18" charset="0"/>
+              <a:ea typeface="Calibri"/>
+              <a:cs typeface="Times New Roman" pitchFamily="18" charset="0"/>
+            </a:endParaRPr>
+          </a:p>
+          <a:p>
+            <a:pPr>
+              <a:spcBef>
+                <a:spcPts val="0"/>
+              </a:spcBef>
+              <a:spcAft>
+                <a:spcPts val="0"/>
+              </a:spcAft>
+            </a:pPr>
+            <a:r>
+              <a:rPr lang="en-US" sz="1600" dirty="0">
+                <a:latin typeface="Times New Roman" pitchFamily="18" charset="0"/>
+                <a:ea typeface="Calibri"/>
+                <a:cs typeface="Times New Roman" pitchFamily="18" charset="0"/>
+              </a:rPr>
+              <a:t>T. </a:t>
+            </a:r>
+            <a:r>
+              <a:rPr lang="en-US" sz="1600" dirty="0" err="1">
+                <a:latin typeface="Times New Roman" pitchFamily="18" charset="0"/>
+                <a:ea typeface="Calibri"/>
+                <a:cs typeface="Times New Roman" pitchFamily="18" charset="0"/>
+              </a:rPr>
+              <a:t>Masterton</a:t>
+            </a:r>
+            <a:r>
+              <a:rPr lang="en-US" sz="1600" dirty="0">
+                <a:latin typeface="Times New Roman" pitchFamily="18" charset="0"/>
+                <a:ea typeface="Calibri"/>
+                <a:cs typeface="Times New Roman" pitchFamily="18" charset="0"/>
+              </a:rPr>
+              <a:t> and D. </a:t>
+            </a:r>
+            <a:r>
+              <a:rPr lang="en-US" sz="1600" dirty="0" err="1">
+                <a:latin typeface="Times New Roman" pitchFamily="18" charset="0"/>
+                <a:ea typeface="Calibri"/>
+                <a:cs typeface="Times New Roman" pitchFamily="18" charset="0"/>
+              </a:rPr>
+              <a:t>Topiwala</a:t>
+            </a:r>
+            <a:r>
+              <a:rPr lang="en-US" sz="1600" dirty="0">
+                <a:latin typeface="Times New Roman" pitchFamily="18" charset="0"/>
+                <a:ea typeface="Calibri"/>
+                <a:cs typeface="Times New Roman" pitchFamily="18" charset="0"/>
+              </a:rPr>
+              <a:t>, “Multi-Agent Traffic Light </a:t>
+            </a:r>
+            <a:r>
+              <a:rPr lang="en-US" sz="1600" dirty="0" err="1">
+                <a:latin typeface="Times New Roman" pitchFamily="18" charset="0"/>
+                <a:ea typeface="Calibri"/>
+                <a:cs typeface="Times New Roman" pitchFamily="18" charset="0"/>
+              </a:rPr>
+              <a:t>Optimisation</a:t>
+            </a:r>
+            <a:r>
+              <a:rPr lang="en-US" sz="1600" dirty="0">
+                <a:latin typeface="Times New Roman" pitchFamily="18" charset="0"/>
+                <a:ea typeface="Calibri"/>
+                <a:cs typeface="Times New Roman" pitchFamily="18" charset="0"/>
+              </a:rPr>
+              <a:t> and Coordination,” white paper, Thales Group, Reference VCS081002, Issue 2, 2008</a:t>
+            </a:r>
+            <a:r>
+              <a:rPr lang="en-US" sz="1600" dirty="0" smtClean="0">
+                <a:latin typeface="Times New Roman" pitchFamily="18" charset="0"/>
+                <a:ea typeface="Calibri"/>
+                <a:cs typeface="Times New Roman" pitchFamily="18" charset="0"/>
+              </a:rPr>
+              <a:t>.</a:t>
+            </a:r>
+            <a:endParaRPr lang="en-US" sz="1600" dirty="0">
+              <a:latin typeface="Times New Roman" pitchFamily="18" charset="0"/>
+              <a:ea typeface="Calibri"/>
+              <a:cs typeface="Times New Roman" pitchFamily="18" charset="0"/>
+            </a:endParaRPr>
+          </a:p>
+          <a:p>
+            <a:pPr lvl="0">
+              <a:spcBef>
+                <a:spcPts val="0"/>
+              </a:spcBef>
+              <a:spcAft>
+                <a:spcPts val="0"/>
+              </a:spcAft>
+              <a:buFont typeface="Symbol"/>
+              <a:buChar char=""/>
+            </a:pPr>
+            <a:r>
+              <a:rPr lang="en-US" sz="1600" dirty="0">
+                <a:latin typeface="Times New Roman" pitchFamily="18" charset="0"/>
+                <a:ea typeface="Calibri"/>
+                <a:cs typeface="Times New Roman" pitchFamily="18" charset="0"/>
+              </a:rPr>
+              <a:t>W. Royce, Software Project Management: A Unified Framework, Addison-Wesley,1998, p. 34, pp. 265-281.</a:t>
+            </a:r>
+          </a:p>
+          <a:p>
+            <a:pPr lvl="0">
+              <a:spcBef>
+                <a:spcPts val="0"/>
+              </a:spcBef>
+              <a:spcAft>
+                <a:spcPts val="0"/>
+              </a:spcAft>
+              <a:buFont typeface="Symbol"/>
+              <a:buChar char=""/>
+            </a:pPr>
+            <a:r>
+              <a:rPr lang="en-US" sz="1600" dirty="0">
+                <a:latin typeface="Times New Roman" pitchFamily="18" charset="0"/>
+                <a:ea typeface="Calibri"/>
+                <a:cs typeface="Times New Roman" pitchFamily="18" charset="0"/>
+              </a:rPr>
+              <a:t>B. Boehm et al., “Cost Models for Future Software Processes: COCOMO 2.0,” Annals of Software Eng., Vol. 1, 1995, pp. 57-94.</a:t>
+            </a:r>
+          </a:p>
+          <a:p>
+            <a:pPr lvl="0">
+              <a:spcBef>
+                <a:spcPts val="0"/>
+              </a:spcBef>
+              <a:spcAft>
+                <a:spcPts val="0"/>
+              </a:spcAft>
+              <a:buFont typeface="Symbol"/>
+              <a:buChar char=""/>
+            </a:pPr>
+            <a:r>
+              <a:rPr lang="en-US" sz="1600" dirty="0">
+                <a:latin typeface="Times New Roman" pitchFamily="18" charset="0"/>
+                <a:ea typeface="Calibri"/>
+                <a:cs typeface="Times New Roman" pitchFamily="18" charset="0"/>
+              </a:rPr>
+              <a:t>K-State Master of Software Engineering web site, “MSE Portfolio Requirements,”</a:t>
+            </a:r>
+          </a:p>
+          <a:p>
+            <a:pPr lvl="0">
+              <a:spcBef>
+                <a:spcPts val="0"/>
+              </a:spcBef>
+              <a:spcAft>
+                <a:spcPts val="0"/>
+              </a:spcAft>
+              <a:buFont typeface="Symbol"/>
+              <a:buChar char=""/>
+            </a:pPr>
+            <a:r>
+              <a:rPr lang="en-US" sz="1600" dirty="0">
+                <a:latin typeface="Times New Roman" pitchFamily="18" charset="0"/>
+                <a:ea typeface="Calibri"/>
+                <a:cs typeface="Times New Roman" pitchFamily="18" charset="0"/>
+              </a:rPr>
+              <a:t>November 28, 2011; http://mse.cis.ksu.edu/portfolio.html.</a:t>
+            </a:r>
+          </a:p>
+          <a:p>
+            <a:pPr lvl="0">
+              <a:spcBef>
+                <a:spcPts val="0"/>
+              </a:spcBef>
+              <a:spcAft>
+                <a:spcPts val="0"/>
+              </a:spcAft>
+              <a:buFont typeface="Symbol"/>
+              <a:buChar char=""/>
+            </a:pPr>
+            <a:r>
+              <a:rPr lang="en-US" sz="1600" dirty="0">
+                <a:latin typeface="Times New Roman" pitchFamily="18" charset="0"/>
+                <a:ea typeface="Calibri"/>
+                <a:cs typeface="Times New Roman" pitchFamily="18" charset="0"/>
+              </a:rPr>
+              <a:t>Center for Systems and Software Engineering web site, “COCOMO II,” December 4, 2011: http://sunset.usc.edu/csse/research/COCOMOII/cocomo_main.html.</a:t>
+            </a:r>
+          </a:p>
+          <a:p>
+            <a:pPr lvl="0">
+              <a:spcBef>
+                <a:spcPts val="0"/>
+              </a:spcBef>
+              <a:spcAft>
+                <a:spcPts val="0"/>
+              </a:spcAft>
+              <a:buFont typeface="Symbol"/>
+              <a:buChar char=""/>
+            </a:pPr>
+            <a:r>
+              <a:rPr lang="en-US" sz="1600" dirty="0">
+                <a:latin typeface="Times New Roman" pitchFamily="18" charset="0"/>
+                <a:ea typeface="Calibri"/>
+                <a:cs typeface="Times New Roman" pitchFamily="18" charset="0"/>
+              </a:rPr>
+              <a:t>The Code Project web site, “Software Project Cost Estimates Using COCOMO II Model,” December 4, 2011: http://www.codeproject.com/KB/architecture/cocomo2.aspx.</a:t>
+            </a:r>
+          </a:p>
+          <a:p>
+            <a:pPr lvl="0">
+              <a:spcBef>
+                <a:spcPts val="0"/>
+              </a:spcBef>
+              <a:spcAft>
+                <a:spcPts val="0"/>
+              </a:spcAft>
+              <a:buFont typeface="Symbol"/>
+              <a:buChar char=""/>
+            </a:pPr>
+            <a:r>
+              <a:rPr lang="en-US" sz="1600" dirty="0">
+                <a:latin typeface="Times New Roman" pitchFamily="18" charset="0"/>
+                <a:ea typeface="Calibri"/>
+                <a:cs typeface="Times New Roman" pitchFamily="18" charset="0"/>
+              </a:rPr>
+              <a:t>Naval Postgraduate School web site, “COCOMO II - Constructive Cost Model,” December 4, 2011: http://diana.nps.edu/~madachy/tools/COCOMOII.php.</a:t>
+            </a:r>
+          </a:p>
+          <a:p>
+            <a:pPr lvl="0">
+              <a:spcBef>
+                <a:spcPts val="0"/>
+              </a:spcBef>
+              <a:spcAft>
+                <a:spcPts val="0"/>
+              </a:spcAft>
+              <a:buFont typeface="Symbol"/>
+              <a:buChar char=""/>
+            </a:pPr>
+            <a:r>
+              <a:rPr lang="en-US" sz="1600" dirty="0">
+                <a:latin typeface="Times New Roman" pitchFamily="18" charset="0"/>
+                <a:ea typeface="Calibri"/>
+                <a:cs typeface="Times New Roman" pitchFamily="18" charset="0"/>
+              </a:rPr>
+              <a:t>Center for Software Engineering, USC, COCOMO II: Model Definition Manual Version 2.1, 2000.</a:t>
+            </a:r>
+          </a:p>
+          <a:p>
+            <a:pPr lvl="0">
+              <a:spcBef>
+                <a:spcPts val="0"/>
+              </a:spcBef>
+              <a:spcAft>
+                <a:spcPts val="0"/>
+              </a:spcAft>
+              <a:buFont typeface="Symbol"/>
+              <a:buChar char=""/>
+            </a:pPr>
+            <a:r>
+              <a:rPr lang="en-US" sz="1600" dirty="0">
+                <a:latin typeface="Times New Roman" pitchFamily="18" charset="0"/>
+                <a:ea typeface="Calibri"/>
+                <a:cs typeface="Times New Roman" pitchFamily="18" charset="0"/>
+              </a:rPr>
+              <a:t>The Code Project web site, “Calculating Function Points,” December 4, 2011: http://www.codeproject.com/KB/architecture/Calculate_Function_Point.aspx.</a:t>
+            </a:r>
+          </a:p>
+          <a:p>
+            <a:pPr lvl="0">
+              <a:spcBef>
+                <a:spcPts val="0"/>
+              </a:spcBef>
+              <a:spcAft>
+                <a:spcPts val="0"/>
+              </a:spcAft>
+              <a:buFont typeface="Symbol"/>
+              <a:buChar char=""/>
+            </a:pPr>
+            <a:r>
+              <a:rPr lang="en-US" sz="1600" dirty="0">
+                <a:latin typeface="Times New Roman" pitchFamily="18" charset="0"/>
+                <a:ea typeface="Calibri"/>
+                <a:cs typeface="Times New Roman" pitchFamily="18" charset="0"/>
+              </a:rPr>
+              <a:t>USC Center for Software Engineering website, “COCOMO II Affiliates,” December 4, 2011: http://csse.usc.edu/csse/affiliate/private/COCOMOII_Driver+Calc_Ss/SpreadSheet-COCOMOII.html</a:t>
+            </a:r>
+            <a:r>
+              <a:rPr lang="en-US" sz="1600" dirty="0" smtClean="0">
+                <a:latin typeface="Times New Roman" pitchFamily="18" charset="0"/>
+                <a:ea typeface="Calibri"/>
+                <a:cs typeface="Times New Roman" pitchFamily="18" charset="0"/>
+              </a:rPr>
+              <a:t>.</a:t>
+            </a:r>
+            <a:endParaRPr lang="en-US" sz="1600" dirty="0">
+              <a:latin typeface="Times New Roman" pitchFamily="18" charset="0"/>
+              <a:ea typeface="Calibri"/>
+              <a:cs typeface="Times New Roman" pitchFamily="18" charset="0"/>
+            </a:endParaRPr>
           </a:p>
         </p:txBody>
       </p:sp>
     </p:spTree>
     <p:extLst>
       <p:ext uri="{BB962C8B-B14F-4D97-AF65-F5344CB8AC3E}">
-        <p14:creationId xmlns:p14="http://schemas.microsoft.com/office/powerpoint/2010/main" val="722826162"/>
+        <p14:creationId xmlns:p14="http://schemas.microsoft.com/office/powerpoint/2010/main" val="270877464"/>
       </p:ext>
     </p:extLst>
   </p:cSld>
@@ -9383,14 +10835,19 @@
             <p:ph type="title"/>
           </p:nvPr>
         </p:nvSpPr>
-        <p:spPr/>
-        <p:txBody>
-          <a:bodyPr/>
+        <p:spPr>
+          <a:xfrm>
+            <a:off x="457200" y="76200"/>
+            <a:ext cx="8229600" cy="742950"/>
+          </a:xfrm>
+        </p:spPr>
+        <p:txBody>
+          <a:bodyPr anchor="t"/>
           <a:lstStyle/>
           <a:p>
             <a:r>
               <a:rPr lang="en-US" dirty="0" smtClean="0"/>
-              <a:t>Project Log</a:t>
+              <a:t>References 2</a:t>
             </a:r>
             <a:endParaRPr lang="en-US" dirty="0"/>
           </a:p>
@@ -9398,7 +10855,7 @@
       </p:sp>
       <p:sp>
         <p:nvSpPr>
-          <p:cNvPr id="3" name="Content Placeholder 2"/>
+          <p:cNvPr id="4" name="Content Placeholder 2"/>
           <p:cNvSpPr>
             <a:spLocks noGrp="1"/>
           </p:cNvSpPr>
@@ -9406,332 +10863,248 @@
             <p:ph idx="1"/>
           </p:nvPr>
         </p:nvSpPr>
-        <p:spPr/>
+        <p:spPr>
+          <a:xfrm>
+            <a:off x="228600" y="914400"/>
+            <a:ext cx="8839200" cy="5486400"/>
+          </a:xfrm>
+        </p:spPr>
         <p:txBody>
           <a:bodyPr/>
           <a:lstStyle/>
           <a:p>
-            <a:endParaRPr lang="en-US"/>
+            <a:pPr>
+              <a:spcBef>
+                <a:spcPts val="0"/>
+              </a:spcBef>
+              <a:spcAft>
+                <a:spcPts val="1000"/>
+              </a:spcAft>
+            </a:pPr>
+            <a:r>
+              <a:rPr lang="en-US" sz="1600" dirty="0">
+                <a:latin typeface="Times New Roman"/>
+                <a:ea typeface="Calibri"/>
+              </a:rPr>
+              <a:t>IEEE Std. 730-1998, IEEE Standard for Software Quality Assurance Plans, IEEE 1998</a:t>
+            </a:r>
+            <a:r>
+              <a:rPr lang="en-US" sz="1600" dirty="0" smtClean="0">
+                <a:latin typeface="Times New Roman"/>
+                <a:ea typeface="Calibri"/>
+              </a:rPr>
+              <a:t>.</a:t>
+            </a:r>
+            <a:endParaRPr lang="en-US" sz="1600" dirty="0">
+              <a:latin typeface="Times New Roman"/>
+              <a:ea typeface="Calibri"/>
+            </a:endParaRPr>
+          </a:p>
+          <a:p>
+            <a:pPr>
+              <a:spcBef>
+                <a:spcPts val="0"/>
+              </a:spcBef>
+              <a:spcAft>
+                <a:spcPts val="1000"/>
+              </a:spcAft>
+            </a:pPr>
+            <a:r>
+              <a:rPr lang="en-US" sz="1600" dirty="0">
+                <a:latin typeface="Times New Roman"/>
+                <a:ea typeface="Calibri"/>
+              </a:rPr>
+              <a:t>IEEE Std. 730.1-1995 IEEE Guide for Software Quality Assurance Planning, IEEE, 1995</a:t>
+            </a:r>
+            <a:r>
+              <a:rPr lang="en-US" sz="1600" dirty="0" smtClean="0">
+                <a:latin typeface="Times New Roman"/>
+                <a:ea typeface="Calibri"/>
+              </a:rPr>
+              <a:t>.</a:t>
+            </a:r>
+            <a:endParaRPr lang="en-US" sz="1600" dirty="0">
+              <a:latin typeface="Times New Roman"/>
+              <a:ea typeface="Calibri"/>
+            </a:endParaRPr>
+          </a:p>
+          <a:p>
+            <a:pPr>
+              <a:spcBef>
+                <a:spcPts val="0"/>
+              </a:spcBef>
+              <a:spcAft>
+                <a:spcPts val="1000"/>
+              </a:spcAft>
+            </a:pPr>
+            <a:r>
+              <a:rPr lang="en-US" sz="1600" dirty="0">
+                <a:latin typeface="Times New Roman"/>
+                <a:ea typeface="Calibri"/>
+              </a:rPr>
+              <a:t>Python Software Foundation, “PEP 8 -- Style Guide for Python Code”, Python, 24 Sep. 2011; http://www.python.org/dev/peps/pep-0008</a:t>
+            </a:r>
+            <a:r>
+              <a:rPr lang="en-US" sz="1600" dirty="0" smtClean="0">
+                <a:latin typeface="Times New Roman"/>
+                <a:ea typeface="Calibri"/>
+              </a:rPr>
+              <a:t>/.</a:t>
+            </a:r>
+            <a:endParaRPr lang="en-US" sz="1600" dirty="0">
+              <a:latin typeface="Times New Roman"/>
+              <a:ea typeface="Calibri"/>
+            </a:endParaRPr>
+          </a:p>
+          <a:p>
+            <a:pPr>
+              <a:spcBef>
+                <a:spcPts val="0"/>
+              </a:spcBef>
+              <a:spcAft>
+                <a:spcPts val="1000"/>
+              </a:spcAft>
+            </a:pPr>
+            <a:r>
+              <a:rPr lang="en-US" sz="1600" dirty="0">
+                <a:latin typeface="Times New Roman"/>
+                <a:ea typeface="Calibri"/>
+              </a:rPr>
+              <a:t>Python Software Foundation, “PEP 257 – </a:t>
+            </a:r>
+            <a:r>
+              <a:rPr lang="en-US" sz="1600" dirty="0" err="1">
+                <a:latin typeface="Times New Roman"/>
+                <a:ea typeface="Calibri"/>
+              </a:rPr>
+              <a:t>Docstring</a:t>
+            </a:r>
+            <a:r>
+              <a:rPr lang="en-US" sz="1600" dirty="0">
+                <a:latin typeface="Times New Roman"/>
+                <a:ea typeface="Calibri"/>
+              </a:rPr>
+              <a:t> Conventions”, Python, 24 Sep. 2011; http://www.python.org/dev/peps/pep-0257</a:t>
+            </a:r>
+            <a:r>
+              <a:rPr lang="en-US" sz="1600" dirty="0" smtClean="0">
+                <a:latin typeface="Times New Roman"/>
+                <a:ea typeface="Calibri"/>
+              </a:rPr>
+              <a:t>/.</a:t>
+            </a:r>
+            <a:endParaRPr lang="en-US" sz="1600" dirty="0">
+              <a:latin typeface="Times New Roman"/>
+              <a:ea typeface="Calibri"/>
+            </a:endParaRPr>
+          </a:p>
+          <a:p>
+            <a:pPr>
+              <a:spcBef>
+                <a:spcPts val="0"/>
+              </a:spcBef>
+              <a:spcAft>
+                <a:spcPts val="1000"/>
+              </a:spcAft>
+            </a:pPr>
+            <a:r>
+              <a:rPr lang="en-US" sz="1600" dirty="0">
+                <a:latin typeface="Times New Roman"/>
+                <a:ea typeface="Calibri"/>
+              </a:rPr>
+              <a:t>K. Hill, “</a:t>
+            </a:r>
+            <a:r>
+              <a:rPr lang="en-US" sz="1600" dirty="0" err="1">
+                <a:latin typeface="Times New Roman"/>
+                <a:ea typeface="Calibri"/>
+              </a:rPr>
+              <a:t>GMoDS</a:t>
+            </a:r>
+            <a:r>
+              <a:rPr lang="en-US" sz="1600" dirty="0">
+                <a:latin typeface="Times New Roman"/>
+                <a:ea typeface="Calibri"/>
+              </a:rPr>
+              <a:t>-based Runtime Agent Role Interpreter SQA Plan 1.0”, People, 15 Sep. 2011; http://people.cis.ksu.edu/~kylhill/phase_1/sqa_plan.pdf</a:t>
+            </a:r>
+            <a:r>
+              <a:rPr lang="en-US" sz="1600" dirty="0" smtClean="0">
+                <a:latin typeface="Times New Roman"/>
+                <a:ea typeface="Calibri"/>
+              </a:rPr>
+              <a:t>.</a:t>
+            </a:r>
+            <a:endParaRPr lang="en-US" sz="1600" dirty="0">
+              <a:latin typeface="Times New Roman"/>
+              <a:ea typeface="Calibri"/>
+            </a:endParaRPr>
+          </a:p>
+          <a:p>
+            <a:pPr>
+              <a:spcBef>
+                <a:spcPts val="0"/>
+              </a:spcBef>
+              <a:spcAft>
+                <a:spcPts val="1000"/>
+              </a:spcAft>
+            </a:pPr>
+            <a:r>
+              <a:rPr lang="en-US" sz="1600" dirty="0">
+                <a:latin typeface="Times New Roman"/>
+                <a:ea typeface="Calibri"/>
+              </a:rPr>
+              <a:t>B. Nehl, “Multiagent Control of Traffic Signals Project Plan 1.0”, People, 26 Sep. 2011; http://people.cis.ksu.edu/~bnehl/repos/macts.git</a:t>
+            </a:r>
+            <a:r>
+              <a:rPr lang="en-US" sz="1600" dirty="0" smtClean="0">
+                <a:latin typeface="Times New Roman"/>
+                <a:ea typeface="Calibri"/>
+              </a:rPr>
+              <a:t>/.</a:t>
+            </a:r>
+            <a:endParaRPr lang="en-US" sz="1600" dirty="0">
+              <a:latin typeface="Times New Roman"/>
+              <a:ea typeface="Calibri"/>
+            </a:endParaRPr>
+          </a:p>
+          <a:p>
+            <a:pPr>
+              <a:spcBef>
+                <a:spcPts val="0"/>
+              </a:spcBef>
+              <a:spcAft>
+                <a:spcPts val="1000"/>
+              </a:spcAft>
+            </a:pPr>
+            <a:r>
+              <a:rPr lang="en-US" sz="1600" dirty="0">
+                <a:latin typeface="Times New Roman"/>
+                <a:ea typeface="Calibri"/>
+              </a:rPr>
+              <a:t>W. Royce, Software Project Management; Addison-Wesley, 1998, pp. 290-291.</a:t>
+            </a:r>
+          </a:p>
+          <a:p>
+            <a:pPr>
+              <a:spcBef>
+                <a:spcPts val="0"/>
+              </a:spcBef>
+              <a:spcAft>
+                <a:spcPts val="0"/>
+              </a:spcAft>
+            </a:pPr>
+            <a:endParaRPr lang="en-US" sz="1600" dirty="0">
+              <a:latin typeface="Georgia" pitchFamily="18" charset="0"/>
+              <a:ea typeface="Calibri"/>
+            </a:endParaRPr>
           </a:p>
         </p:txBody>
       </p:sp>
     </p:spTree>
     <p:extLst>
       <p:ext uri="{BB962C8B-B14F-4D97-AF65-F5344CB8AC3E}">
-        <p14:creationId xmlns:p14="http://schemas.microsoft.com/office/powerpoint/2010/main" val="4154735931"/>
-      </p:ext>
-    </p:extLst>
-  </p:cSld>
-  <p:clrMapOvr>
-    <a:masterClrMapping/>
-  </p:clrMapOvr>
-  <p:timing>
-    <p:tnLst>
-      <p:par>
-        <p:cTn id="1" dur="indefinite" restart="never" nodeType="tmRoot"/>
-      </p:par>
-    </p:tnLst>
-  </p:timing>
-</p:sld>
-</file>
-
-<file path=ppt/slides/slide23.xml><?xml version="1.0" encoding="utf-8"?>
-<p:sld xmlns:a="http://schemas.openxmlformats.org/drawingml/2006/main" xmlns:r="http://schemas.openxmlformats.org/officeDocument/2006/relationships" xmlns:p="http://schemas.openxmlformats.org/presentationml/2006/main">
-  <p:cSld>
-    <p:spTree>
-      <p:nvGrpSpPr>
-        <p:cNvPr id="1" name=""/>
-        <p:cNvGrpSpPr/>
-        <p:nvPr/>
-      </p:nvGrpSpPr>
-      <p:grpSpPr>
-        <a:xfrm>
-          <a:off x="0" y="0"/>
-          <a:ext cx="0" cy="0"/>
-          <a:chOff x="0" y="0"/>
-          <a:chExt cx="0" cy="0"/>
-        </a:xfrm>
-      </p:grpSpPr>
-      <p:sp>
-        <p:nvSpPr>
-          <p:cNvPr id="2" name="Title 1"/>
-          <p:cNvSpPr>
-            <a:spLocks noGrp="1"/>
-          </p:cNvSpPr>
-          <p:nvPr>
-            <p:ph type="title"/>
-          </p:nvPr>
-        </p:nvSpPr>
-        <p:spPr/>
-        <p:txBody>
-          <a:bodyPr/>
-          <a:lstStyle/>
-          <a:p>
-            <a:r>
-              <a:rPr lang="en-US" dirty="0" smtClean="0"/>
-              <a:t>Project Risks and Spikes</a:t>
-            </a:r>
-            <a:endParaRPr lang="en-US" dirty="0"/>
-          </a:p>
-        </p:txBody>
-      </p:sp>
-      <p:sp>
-        <p:nvSpPr>
-          <p:cNvPr id="3" name="Content Placeholder 2"/>
-          <p:cNvSpPr>
-            <a:spLocks noGrp="1"/>
-          </p:cNvSpPr>
-          <p:nvPr>
-            <p:ph idx="1"/>
-          </p:nvPr>
-        </p:nvSpPr>
-        <p:spPr/>
-        <p:txBody>
-          <a:bodyPr/>
-          <a:lstStyle/>
-          <a:p>
-            <a:endParaRPr lang="en-US"/>
-          </a:p>
-        </p:txBody>
-      </p:sp>
-    </p:spTree>
-    <p:extLst>
-      <p:ext uri="{BB962C8B-B14F-4D97-AF65-F5344CB8AC3E}">
-        <p14:creationId xmlns:p14="http://schemas.microsoft.com/office/powerpoint/2010/main" val="810269815"/>
-      </p:ext>
-    </p:extLst>
-  </p:cSld>
-  <p:clrMapOvr>
-    <a:masterClrMapping/>
-  </p:clrMapOvr>
-  <p:timing>
-    <p:tnLst>
-      <p:par>
-        <p:cTn id="1" dur="indefinite" restart="never" nodeType="tmRoot"/>
-      </p:par>
-    </p:tnLst>
-  </p:timing>
-</p:sld>
-</file>
-
-<file path=ppt/slides/slide24.xml><?xml version="1.0" encoding="utf-8"?>
-<p:sld xmlns:a="http://schemas.openxmlformats.org/drawingml/2006/main" xmlns:r="http://schemas.openxmlformats.org/officeDocument/2006/relationships" xmlns:p="http://schemas.openxmlformats.org/presentationml/2006/main">
-  <p:cSld>
-    <p:spTree>
-      <p:nvGrpSpPr>
-        <p:cNvPr id="1" name=""/>
-        <p:cNvGrpSpPr/>
-        <p:nvPr/>
-      </p:nvGrpSpPr>
-      <p:grpSpPr>
-        <a:xfrm>
-          <a:off x="0" y="0"/>
-          <a:ext cx="0" cy="0"/>
-          <a:chOff x="0" y="0"/>
-          <a:chExt cx="0" cy="0"/>
-        </a:xfrm>
-      </p:grpSpPr>
-      <p:sp>
-        <p:nvSpPr>
-          <p:cNvPr id="2" name="Title 1"/>
-          <p:cNvSpPr>
-            <a:spLocks noGrp="1"/>
-          </p:cNvSpPr>
-          <p:nvPr>
-            <p:ph type="title"/>
-          </p:nvPr>
-        </p:nvSpPr>
-        <p:spPr/>
-        <p:txBody>
-          <a:bodyPr/>
-          <a:lstStyle/>
-          <a:p>
-            <a:r>
-              <a:rPr lang="en-US" dirty="0" smtClean="0"/>
-              <a:t>Project Concerns</a:t>
-            </a:r>
-            <a:endParaRPr lang="en-US" dirty="0"/>
-          </a:p>
-        </p:txBody>
-      </p:sp>
-      <p:sp>
-        <p:nvSpPr>
-          <p:cNvPr id="3" name="Content Placeholder 2"/>
-          <p:cNvSpPr>
-            <a:spLocks noGrp="1"/>
-          </p:cNvSpPr>
-          <p:nvPr>
-            <p:ph idx="1"/>
-          </p:nvPr>
-        </p:nvSpPr>
-        <p:spPr/>
-        <p:txBody>
-          <a:bodyPr/>
-          <a:lstStyle/>
-          <a:p>
-            <a:r>
-              <a:rPr lang="en-US" dirty="0" smtClean="0"/>
-              <a:t>Am I trying to do too much?</a:t>
-            </a:r>
-            <a:endParaRPr lang="en-US" dirty="0"/>
-          </a:p>
-        </p:txBody>
-      </p:sp>
-    </p:spTree>
-    <p:extLst>
-      <p:ext uri="{BB962C8B-B14F-4D97-AF65-F5344CB8AC3E}">
-        <p14:creationId xmlns:p14="http://schemas.microsoft.com/office/powerpoint/2010/main" val="600425415"/>
-      </p:ext>
-    </p:extLst>
-  </p:cSld>
-  <p:clrMapOvr>
-    <a:masterClrMapping/>
-  </p:clrMapOvr>
-</p:sld>
-</file>
-
-<file path=ppt/slides/slide25.xml><?xml version="1.0" encoding="utf-8"?>
-<p:sld xmlns:a="http://schemas.openxmlformats.org/drawingml/2006/main" xmlns:r="http://schemas.openxmlformats.org/officeDocument/2006/relationships" xmlns:p="http://schemas.openxmlformats.org/presentationml/2006/main">
-  <p:cSld>
-    <p:spTree>
-      <p:nvGrpSpPr>
-        <p:cNvPr id="1" name=""/>
-        <p:cNvGrpSpPr/>
-        <p:nvPr/>
-      </p:nvGrpSpPr>
-      <p:grpSpPr>
-        <a:xfrm>
-          <a:off x="0" y="0"/>
-          <a:ext cx="0" cy="0"/>
-          <a:chOff x="0" y="0"/>
-          <a:chExt cx="0" cy="0"/>
-        </a:xfrm>
-      </p:grpSpPr>
-      <p:sp>
-        <p:nvSpPr>
-          <p:cNvPr id="2" name="Title 1"/>
-          <p:cNvSpPr>
-            <a:spLocks noGrp="1"/>
-          </p:cNvSpPr>
-          <p:nvPr>
-            <p:ph type="title"/>
-          </p:nvPr>
-        </p:nvSpPr>
-        <p:spPr/>
-        <p:txBody>
-          <a:bodyPr/>
-          <a:lstStyle/>
-          <a:p>
-            <a:r>
-              <a:rPr lang="en-US" dirty="0" smtClean="0"/>
-              <a:t>Questions and Comments</a:t>
-            </a:r>
-            <a:endParaRPr lang="en-US" dirty="0"/>
-          </a:p>
-        </p:txBody>
-      </p:sp>
-      <p:sp>
-        <p:nvSpPr>
-          <p:cNvPr id="3" name="Content Placeholder 2"/>
-          <p:cNvSpPr>
-            <a:spLocks noGrp="1"/>
-          </p:cNvSpPr>
-          <p:nvPr>
-            <p:ph idx="1"/>
-          </p:nvPr>
-        </p:nvSpPr>
-        <p:spPr/>
-        <p:txBody>
-          <a:bodyPr/>
-          <a:lstStyle/>
-          <a:p>
-            <a:endParaRPr lang="en-US"/>
-          </a:p>
-        </p:txBody>
-      </p:sp>
-    </p:spTree>
-    <p:extLst>
-      <p:ext uri="{BB962C8B-B14F-4D97-AF65-F5344CB8AC3E}">
-        <p14:creationId xmlns:p14="http://schemas.microsoft.com/office/powerpoint/2010/main" val="3976208202"/>
-      </p:ext>
-    </p:extLst>
-  </p:cSld>
-  <p:clrMapOvr>
-    <a:masterClrMapping/>
-  </p:clrMapOvr>
-  <p:timing>
-    <p:tnLst>
-      <p:par>
-        <p:cTn id="1" dur="indefinite" restart="never" nodeType="tmRoot"/>
-      </p:par>
-    </p:tnLst>
-  </p:timing>
-</p:sld>
-</file>
-
-<file path=ppt/slides/slide26.xml><?xml version="1.0" encoding="utf-8"?>
-<p:sld xmlns:a="http://schemas.openxmlformats.org/drawingml/2006/main" xmlns:r="http://schemas.openxmlformats.org/officeDocument/2006/relationships" xmlns:p="http://schemas.openxmlformats.org/presentationml/2006/main">
-  <p:cSld>
-    <p:spTree>
-      <p:nvGrpSpPr>
-        <p:cNvPr id="1" name=""/>
-        <p:cNvGrpSpPr/>
-        <p:nvPr/>
-      </p:nvGrpSpPr>
-      <p:grpSpPr>
-        <a:xfrm>
-          <a:off x="0" y="0"/>
-          <a:ext cx="0" cy="0"/>
-          <a:chOff x="0" y="0"/>
-          <a:chExt cx="0" cy="0"/>
-        </a:xfrm>
-      </p:grpSpPr>
-      <p:sp>
-        <p:nvSpPr>
-          <p:cNvPr id="2" name="Title 1"/>
-          <p:cNvSpPr>
-            <a:spLocks noGrp="1"/>
-          </p:cNvSpPr>
-          <p:nvPr>
-            <p:ph type="title"/>
-          </p:nvPr>
-        </p:nvSpPr>
-        <p:spPr/>
-        <p:txBody>
-          <a:bodyPr/>
-          <a:lstStyle/>
-          <a:p>
-            <a:r>
-              <a:rPr lang="en-US" dirty="0" smtClean="0"/>
-              <a:t>References</a:t>
-            </a:r>
-            <a:endParaRPr lang="en-US" dirty="0"/>
-          </a:p>
-        </p:txBody>
-      </p:sp>
-      <p:sp>
-        <p:nvSpPr>
-          <p:cNvPr id="3" name="Content Placeholder 2"/>
-          <p:cNvSpPr>
-            <a:spLocks noGrp="1"/>
-          </p:cNvSpPr>
-          <p:nvPr>
-            <p:ph idx="1"/>
-          </p:nvPr>
-        </p:nvSpPr>
-        <p:spPr/>
-        <p:txBody>
-          <a:bodyPr/>
-          <a:lstStyle/>
-          <a:p>
-            <a:endParaRPr lang="en-US"/>
-          </a:p>
-        </p:txBody>
-      </p:sp>
-    </p:spTree>
-    <p:extLst>
-      <p:ext uri="{BB962C8B-B14F-4D97-AF65-F5344CB8AC3E}">
-        <p14:creationId xmlns:p14="http://schemas.microsoft.com/office/powerpoint/2010/main" val="270877464"/>
+        <p14:creationId xmlns:p14="http://schemas.microsoft.com/office/powerpoint/2010/main" val="3156999136"/>
       </p:ext>
     </p:extLst>
   </p:cSld>
@@ -9782,7 +11155,11 @@
           <a:p>
             <a:r>
               <a:rPr lang="en-US" dirty="0" smtClean="0"/>
-              <a:t>Project Overview</a:t>
+              <a:t>Project </a:t>
+            </a:r>
+            <a:r>
+              <a:rPr lang="en-US" dirty="0" smtClean="0"/>
+              <a:t>Vision</a:t>
             </a:r>
             <a:endParaRPr lang="en-US" dirty="0"/>
           </a:p>
@@ -9816,19 +11193,7 @@
               <a:rPr lang="en-US" sz="2400" dirty="0">
                 <a:latin typeface="Garamond" pitchFamily="18" charset="0"/>
               </a:rPr>
-              <a:t>The goal of this project is to create a </a:t>
-            </a:r>
-            <a:r>
-              <a:rPr lang="en-US" sz="2400" dirty="0" err="1">
-                <a:latin typeface="Garamond" pitchFamily="18" charset="0"/>
-              </a:rPr>
-              <a:t>multiagent</a:t>
-            </a:r>
-            <a:r>
-              <a:rPr lang="en-US" sz="2400" dirty="0">
-                <a:latin typeface="Garamond" pitchFamily="18" charset="0"/>
-              </a:rPr>
-              <a:t> system that is capable of traffic light signal control which results in an improved travel experience.</a:t>
+              <a:t>The goal of this project is to create a multiagent system that is capable of traffic light signal control which results in an improved travel experience.</a:t>
             </a:r>
           </a:p>
           <a:p>
@@ -9916,35 +11281,80 @@
           <a:p>
             <a:r>
               <a:rPr lang="en-US" dirty="0" smtClean="0"/>
-              <a:t>Project Vision</a:t>
+              <a:t>System Context</a:t>
             </a:r>
             <a:endParaRPr lang="en-US" dirty="0"/>
           </a:p>
         </p:txBody>
       </p:sp>
-      <p:sp>
-        <p:nvSpPr>
-          <p:cNvPr id="3" name="Content Placeholder 2"/>
-          <p:cNvSpPr>
-            <a:spLocks noGrp="1"/>
-          </p:cNvSpPr>
-          <p:nvPr>
-            <p:ph idx="1"/>
-          </p:nvPr>
-        </p:nvSpPr>
-        <p:spPr/>
-        <p:txBody>
-          <a:bodyPr/>
-          <a:lstStyle/>
-          <a:p>
-            <a:endParaRPr lang="en-US"/>
-          </a:p>
-        </p:txBody>
-      </p:sp>
+      <p:pic>
+        <p:nvPicPr>
+          <p:cNvPr id="2050" name="Picture 2"/>
+          <p:cNvPicPr>
+            <a:picLocks noChangeAspect="1" noChangeArrowheads="1"/>
+          </p:cNvPicPr>
+          <p:nvPr/>
+        </p:nvPicPr>
+        <p:blipFill>
+          <a:blip r:embed="rId2">
+            <a:extLst>
+              <a:ext uri="{28A0092B-C50C-407E-A947-70E740481C1C}">
+                <a14:useLocalDpi xmlns:a14="http://schemas.microsoft.com/office/drawing/2010/main" val="0"/>
+              </a:ext>
+            </a:extLst>
+          </a:blip>
+          <a:srcRect/>
+          <a:stretch>
+            <a:fillRect/>
+          </a:stretch>
+        </p:blipFill>
+        <p:spPr bwMode="auto">
+          <a:xfrm>
+            <a:off x="304800" y="1819275"/>
+            <a:ext cx="8631365" cy="1257300"/>
+          </a:xfrm>
+          <a:prstGeom prst="rect">
+            <a:avLst/>
+          </a:prstGeom>
+          <a:noFill/>
+          <a:ln>
+            <a:noFill/>
+          </a:ln>
+          <a:effectLst/>
+          <a:extLst>
+            <a:ext uri="{909E8E84-426E-40DD-AFC4-6F175D3DCCD1}">
+              <a14:hiddenFill xmlns:a14="http://schemas.microsoft.com/office/drawing/2010/main">
+                <a:solidFill>
+                  <a:schemeClr val="accent1"/>
+                </a:solidFill>
+              </a14:hiddenFill>
+            </a:ext>
+            <a:ext uri="{91240B29-F687-4F45-9708-019B960494DF}">
+              <a14:hiddenLine xmlns:a14="http://schemas.microsoft.com/office/drawing/2010/main" w="9525">
+                <a:solidFill>
+                  <a:schemeClr val="tx1"/>
+                </a:solidFill>
+                <a:miter lim="800000"/>
+                <a:headEnd/>
+                <a:tailEnd/>
+              </a14:hiddenLine>
+            </a:ext>
+            <a:ext uri="{AF507438-7753-43E0-B8FC-AC1667EBCBE1}">
+              <a14:hiddenEffects xmlns:a14="http://schemas.microsoft.com/office/drawing/2010/main">
+                <a:effectLst>
+                  <a:outerShdw dist="35921" dir="2700000" algn="ctr" rotWithShape="0">
+                    <a:schemeClr val="bg2"/>
+                  </a:outerShdw>
+                </a:effectLst>
+              </a14:hiddenEffects>
+            </a:ext>
+          </a:extLst>
+        </p:spPr>
+      </p:pic>
     </p:spTree>
     <p:extLst>
       <p:ext uri="{BB962C8B-B14F-4D97-AF65-F5344CB8AC3E}">
-        <p14:creationId xmlns:p14="http://schemas.microsoft.com/office/powerpoint/2010/main" val="1510926725"/>
+        <p14:creationId xmlns:p14="http://schemas.microsoft.com/office/powerpoint/2010/main" val="1740387417"/>
       </p:ext>
     </p:extLst>
   </p:cSld>
@@ -9988,42 +11398,93 @@
             <p:ph type="title"/>
           </p:nvPr>
         </p:nvSpPr>
-        <p:spPr/>
-        <p:txBody>
-          <a:bodyPr/>
+        <p:spPr>
+          <a:xfrm>
+            <a:off x="152399" y="142875"/>
+            <a:ext cx="2619375" cy="1533525"/>
+          </a:xfrm>
+        </p:spPr>
+        <p:txBody>
+          <a:bodyPr anchor="t"/>
           <a:lstStyle/>
           <a:p>
-            <a:r>
-              <a:rPr lang="en-US" dirty="0" smtClean="0"/>
-              <a:t>System Context</a:t>
-            </a:r>
-            <a:endParaRPr lang="en-US" dirty="0"/>
-          </a:p>
-        </p:txBody>
-      </p:sp>
-      <p:sp>
-        <p:nvSpPr>
-          <p:cNvPr id="3" name="Content Placeholder 2"/>
-          <p:cNvSpPr>
-            <a:spLocks noGrp="1"/>
-          </p:cNvSpPr>
-          <p:nvPr>
-            <p:ph idx="1"/>
-          </p:nvPr>
-        </p:nvSpPr>
-        <p:spPr/>
-        <p:txBody>
-          <a:bodyPr/>
-          <a:lstStyle/>
-          <a:p>
-            <a:endParaRPr lang="en-US"/>
-          </a:p>
-        </p:txBody>
-      </p:sp>
+            <a:pPr algn="l"/>
+            <a:r>
+              <a:rPr lang="en-US" sz="2800" dirty="0" smtClean="0"/>
+              <a:t>Project Requirements</a:t>
+            </a:r>
+            <a:endParaRPr lang="en-US" sz="2800" dirty="0"/>
+          </a:p>
+        </p:txBody>
+      </p:sp>
+      <p:pic>
+        <p:nvPicPr>
+          <p:cNvPr id="3074" name="Picture 2"/>
+          <p:cNvPicPr>
+            <a:picLocks noChangeAspect="1" noChangeArrowheads="1"/>
+          </p:cNvPicPr>
+          <p:nvPr/>
+        </p:nvPicPr>
+        <p:blipFill>
+          <a:blip r:embed="rId3">
+            <a:extLst>
+              <a:ext uri="{28A0092B-C50C-407E-A947-70E740481C1C}">
+                <a14:useLocalDpi xmlns:a14="http://schemas.microsoft.com/office/drawing/2010/main" val="0"/>
+              </a:ext>
+            </a:extLst>
+          </a:blip>
+          <a:srcRect/>
+          <a:stretch>
+            <a:fillRect/>
+          </a:stretch>
+        </p:blipFill>
+        <p:spPr bwMode="auto">
+          <a:xfrm>
+            <a:off x="2667000" y="19050"/>
+            <a:ext cx="5867400" cy="6756641"/>
+          </a:xfrm>
+          <a:prstGeom prst="rect">
+            <a:avLst/>
+          </a:prstGeom>
+          <a:noFill/>
+          <a:ln>
+            <a:noFill/>
+          </a:ln>
+          <a:effectLst/>
+          <a:extLst>
+            <a:ext uri="{909E8E84-426E-40DD-AFC4-6F175D3DCCD1}">
+              <a14:hiddenFill xmlns:a14="http://schemas.microsoft.com/office/drawing/2010/main">
+                <a:solidFill>
+                  <a:schemeClr val="accent1"/>
+                </a:solidFill>
+              </a14:hiddenFill>
+            </a:ext>
+            <a:ext uri="{91240B29-F687-4F45-9708-019B960494DF}">
+              <a14:hiddenLine xmlns:a14="http://schemas.microsoft.com/office/drawing/2010/main" w="9525">
+                <a:solidFill>
+                  <a:schemeClr val="tx1"/>
+                </a:solidFill>
+                <a:miter lim="800000"/>
+                <a:headEnd/>
+                <a:tailEnd/>
+              </a14:hiddenLine>
+            </a:ext>
+            <a:ext uri="{AF507438-7753-43E0-B8FC-AC1667EBCBE1}">
+              <a14:hiddenEffects xmlns:a14="http://schemas.microsoft.com/office/drawing/2010/main">
+                <a:effectLst>
+                  <a:outerShdw dist="35921" dir="2700000" algn="ctr" rotWithShape="0">
+                    <a:schemeClr val="bg2"/>
+                  </a:outerShdw>
+                </a:effectLst>
+              </a14:hiddenEffects>
+            </a:ext>
+          </a:extLst>
+        </p:spPr>
+      </p:pic>
     </p:spTree>
     <p:extLst>
       <p:ext uri="{BB962C8B-B14F-4D97-AF65-F5344CB8AC3E}">
-        <p14:creationId xmlns:p14="http://schemas.microsoft.com/office/powerpoint/2010/main" val="1740387417"/>
+        <p14:creationId xmlns:p14="http://schemas.microsoft.com/office/powerpoint/2010/main" val="1257517681"/>
       </p:ext>
     </p:extLst>
   </p:cSld>
@@ -10069,40 +11530,85 @@
         </p:nvSpPr>
         <p:spPr/>
         <p:txBody>
-          <a:bodyPr/>
+          <a:bodyPr anchor="t"/>
           <a:lstStyle/>
           <a:p>
             <a:r>
               <a:rPr lang="en-US" dirty="0" smtClean="0"/>
-              <a:t>Project Requirements</a:t>
+              <a:t>Project Plan</a:t>
             </a:r>
             <a:endParaRPr lang="en-US" dirty="0"/>
           </a:p>
         </p:txBody>
       </p:sp>
-      <p:sp>
-        <p:nvSpPr>
-          <p:cNvPr id="3" name="Content Placeholder 2"/>
-          <p:cNvSpPr>
-            <a:spLocks noGrp="1"/>
-          </p:cNvSpPr>
-          <p:nvPr>
-            <p:ph idx="1"/>
-          </p:nvPr>
-        </p:nvSpPr>
-        <p:spPr/>
-        <p:txBody>
-          <a:bodyPr/>
-          <a:lstStyle/>
-          <a:p>
-            <a:endParaRPr lang="en-US"/>
-          </a:p>
-        </p:txBody>
-      </p:sp>
+      <p:pic>
+        <p:nvPicPr>
+          <p:cNvPr id="5123" name="Picture 3"/>
+          <p:cNvPicPr>
+            <a:picLocks noChangeAspect="1" noChangeArrowheads="1"/>
+          </p:cNvPicPr>
+          <p:nvPr/>
+        </p:nvPicPr>
+        <p:blipFill>
+          <a:blip r:embed="rId3">
+            <a:extLst>
+              <a:ext uri="{28A0092B-C50C-407E-A947-70E740481C1C}">
+                <a14:useLocalDpi xmlns:a14="http://schemas.microsoft.com/office/drawing/2010/main" val="0"/>
+              </a:ext>
+            </a:extLst>
+          </a:blip>
+          <a:srcRect/>
+          <a:stretch>
+            <a:fillRect/>
+          </a:stretch>
+        </p:blipFill>
+        <p:spPr bwMode="auto">
+          <a:xfrm>
+            <a:off x="381000" y="1143000"/>
+            <a:ext cx="8325091" cy="5219700"/>
+          </a:xfrm>
+          <a:prstGeom prst="rect">
+            <a:avLst/>
+          </a:prstGeom>
+          <a:noFill/>
+          <a:ln>
+            <a:noFill/>
+          </a:ln>
+          <a:effectLst/>
+          <a:extLst>
+            <a:ext uri="{909E8E84-426E-40DD-AFC4-6F175D3DCCD1}">
+              <a14:hiddenFill xmlns:a14="http://schemas.microsoft.com/office/drawing/2010/main">
+                <a:solidFill>
+                  <a:schemeClr val="accent1"/>
+                </a:solidFill>
+              </a14:hiddenFill>
+            </a:ext>
+            <a:ext uri="{91240B29-F687-4F45-9708-019B960494DF}">
+              <a14:hiddenLine xmlns:a14="http://schemas.microsoft.com/office/drawing/2010/main" w="9525">
+                <a:solidFill>
+                  <a:schemeClr val="tx1"/>
+                </a:solidFill>
+                <a:miter lim="800000"/>
+                <a:headEnd/>
+                <a:tailEnd/>
+              </a14:hiddenLine>
+            </a:ext>
+            <a:ext uri="{AF507438-7753-43E0-B8FC-AC1667EBCBE1}">
+              <a14:hiddenEffects xmlns:a14="http://schemas.microsoft.com/office/drawing/2010/main">
+                <a:effectLst>
+                  <a:outerShdw dist="35921" dir="2700000" algn="ctr" rotWithShape="0">
+                    <a:schemeClr val="bg2"/>
+                  </a:outerShdw>
+                </a:effectLst>
+              </a14:hiddenEffects>
+            </a:ext>
+          </a:extLst>
+        </p:spPr>
+      </p:pic>
     </p:spTree>
     <p:extLst>
       <p:ext uri="{BB962C8B-B14F-4D97-AF65-F5344CB8AC3E}">
-        <p14:creationId xmlns:p14="http://schemas.microsoft.com/office/powerpoint/2010/main" val="1257517681"/>
+        <p14:creationId xmlns:p14="http://schemas.microsoft.com/office/powerpoint/2010/main" val="3084825239"/>
       </p:ext>
     </p:extLst>
   </p:cSld>
@@ -10153,38 +11659,80 @@
           <a:p>
             <a:r>
               <a:rPr lang="en-US" dirty="0" smtClean="0"/>
-              <a:t>Project Plan</a:t>
+              <a:t>Cost Estimation</a:t>
             </a:r>
             <a:endParaRPr lang="en-US" dirty="0"/>
           </a:p>
         </p:txBody>
       </p:sp>
-      <p:sp>
-        <p:nvSpPr>
-          <p:cNvPr id="3" name="Content Placeholder 2"/>
-          <p:cNvSpPr>
-            <a:spLocks noGrp="1"/>
-          </p:cNvSpPr>
-          <p:nvPr>
-            <p:ph idx="1"/>
-          </p:nvPr>
-        </p:nvSpPr>
-        <p:spPr/>
-        <p:txBody>
-          <a:bodyPr/>
-          <a:lstStyle/>
-          <a:p>
-            <a:pPr marL="0" indent="0">
-              <a:buNone/>
-            </a:pPr>
-            <a:endParaRPr lang="en-US" dirty="0"/>
-          </a:p>
-        </p:txBody>
-      </p:sp>
+      <p:pic>
+        <p:nvPicPr>
+          <p:cNvPr id="6146" name="Picture 2"/>
+          <p:cNvPicPr>
+            <a:picLocks noChangeAspect="1" noChangeArrowheads="1"/>
+          </p:cNvPicPr>
+          <p:nvPr/>
+        </p:nvPicPr>
+        <p:blipFill>
+          <a:blip r:embed="rId3">
+            <a:extLst>
+              <a:ext uri="{28A0092B-C50C-407E-A947-70E740481C1C}">
+                <a14:useLocalDpi xmlns:a14="http://schemas.microsoft.com/office/drawing/2010/main" val="0"/>
+              </a:ext>
+            </a:extLst>
+          </a:blip>
+          <a:srcRect/>
+          <a:stretch>
+            <a:fillRect/>
+          </a:stretch>
+        </p:blipFill>
+        <p:spPr bwMode="auto">
+          <a:xfrm>
+            <a:off x="47625" y="1533525"/>
+            <a:ext cx="9048750" cy="3790950"/>
+          </a:xfrm>
+          <a:prstGeom prst="rect">
+            <a:avLst/>
+          </a:prstGeom>
+          <a:noFill/>
+          <a:ln>
+            <a:noFill/>
+          </a:ln>
+          <a:effectLst/>
+          <a:extLst>
+            <a:ext uri="{909E8E84-426E-40DD-AFC4-6F175D3DCCD1}">
+              <a14:hiddenFill xmlns:a14="http://schemas.microsoft.com/office/drawing/2010/main">
+                <a:solidFill>
+                  <a:schemeClr val="accent1"/>
+                </a:solidFill>
+              </a14:hiddenFill>
+            </a:ext>
+            <a:ext uri="{91240B29-F687-4F45-9708-019B960494DF}">
+              <a14:hiddenLine xmlns:a14="http://schemas.microsoft.com/office/drawing/2010/main" w="9525">
+                <a:solidFill>
+                  <a:schemeClr val="tx1"/>
+                </a:solidFill>
+                <a:miter lim="800000"/>
+                <a:headEnd/>
+                <a:tailEnd/>
+              </a14:hiddenLine>
+            </a:ext>
+            <a:ext uri="{AF507438-7753-43E0-B8FC-AC1667EBCBE1}">
+              <a14:hiddenEffects xmlns:a14="http://schemas.microsoft.com/office/drawing/2010/main">
+                <a:effectLst>
+                  <a:outerShdw dist="35921" dir="2700000" algn="ctr" rotWithShape="0">
+                    <a:schemeClr val="bg2"/>
+                  </a:outerShdw>
+                </a:effectLst>
+              </a14:hiddenEffects>
+            </a:ext>
+          </a:extLst>
+        </p:spPr>
+      </p:pic>
     </p:spTree>
     <p:extLst>
       <p:ext uri="{BB962C8B-B14F-4D97-AF65-F5344CB8AC3E}">
-        <p14:creationId xmlns:p14="http://schemas.microsoft.com/office/powerpoint/2010/main" val="3084825239"/>
+        <p14:creationId xmlns:p14="http://schemas.microsoft.com/office/powerpoint/2010/main" val="218531721"/>
       </p:ext>
     </p:extLst>
   </p:cSld>
@@ -10218,52 +11766,74 @@
           <a:chExt cx="0" cy="0"/>
         </a:xfrm>
       </p:grpSpPr>
-      <p:sp>
-        <p:nvSpPr>
-          <p:cNvPr id="2" name="Title 1"/>
-          <p:cNvSpPr>
-            <a:spLocks noGrp="1"/>
-          </p:cNvSpPr>
-          <p:nvPr>
-            <p:ph type="title"/>
-          </p:nvPr>
-        </p:nvSpPr>
-        <p:spPr/>
-        <p:txBody>
-          <a:bodyPr/>
-          <a:lstStyle/>
-          <a:p>
-            <a:r>
-              <a:rPr lang="en-US" dirty="0" smtClean="0"/>
-              <a:t>Cost Estimation</a:t>
-            </a:r>
-            <a:endParaRPr lang="en-US" dirty="0"/>
-          </a:p>
-        </p:txBody>
-      </p:sp>
-      <p:sp>
-        <p:nvSpPr>
-          <p:cNvPr id="3" name="Content Placeholder 2"/>
-          <p:cNvSpPr>
-            <a:spLocks noGrp="1"/>
-          </p:cNvSpPr>
-          <p:nvPr>
-            <p:ph idx="1"/>
-          </p:nvPr>
-        </p:nvSpPr>
-        <p:spPr/>
-        <p:txBody>
-          <a:bodyPr/>
-          <a:lstStyle/>
-          <a:p>
-            <a:endParaRPr lang="en-US"/>
-          </a:p>
-        </p:txBody>
-      </p:sp>
+      <p:pic>
+        <p:nvPicPr>
+          <p:cNvPr id="7170" name="Picture 2"/>
+          <p:cNvPicPr>
+            <a:picLocks noChangeAspect="1" noChangeArrowheads="1"/>
+          </p:cNvPicPr>
+          <p:nvPr/>
+        </p:nvPicPr>
+        <p:blipFill>
+          <a:blip r:embed="rId3">
+            <a:extLst>
+              <a:ext uri="{28A0092B-C50C-407E-A947-70E740481C1C}">
+                <a14:useLocalDpi xmlns:a14="http://schemas.microsoft.com/office/drawing/2010/main" val="0"/>
+              </a:ext>
+            </a:extLst>
+          </a:blip>
+          <a:srcRect/>
+          <a:stretch>
+            <a:fillRect/>
+          </a:stretch>
+        </p:blipFill>
+        <p:spPr bwMode="auto">
+          <a:xfrm>
+            <a:off x="533400" y="76200"/>
+            <a:ext cx="8153400" cy="6392532"/>
+          </a:xfrm>
+          <a:prstGeom prst="rect">
+            <a:avLst/>
+          </a:prstGeom>
+          <a:noFill/>
+          <a:ln>
+            <a:noFill/>
+          </a:ln>
+          <a:effectLst/>
+          <a:extLst>
+            <a:ext uri="{909E8E84-426E-40DD-AFC4-6F175D3DCCD1}">
+              <a14:hiddenFill xmlns:a14="http://schemas.microsoft.com/office/drawing/2010/main">
+                <a:solidFill>
+                  <a:schemeClr val="accent1"/>
+                </a:solidFill>
+              </a14:hiddenFill>
+            </a:ext>
+            <a:ext uri="{91240B29-F687-4F45-9708-019B960494DF}">
+              <a14:hiddenLine xmlns:a14="http://schemas.microsoft.com/office/drawing/2010/main" w="9525">
+                <a:solidFill>
+                  <a:schemeClr val="tx1"/>
+                </a:solidFill>
+                <a:miter lim="800000"/>
+                <a:headEnd/>
+                <a:tailEnd/>
+              </a14:hiddenLine>
+            </a:ext>
+            <a:ext uri="{AF507438-7753-43E0-B8FC-AC1667EBCBE1}">
+              <a14:hiddenEffects xmlns:a14="http://schemas.microsoft.com/office/drawing/2010/main">
+                <a:effectLst>
+                  <a:outerShdw dist="35921" dir="2700000" algn="ctr" rotWithShape="0">
+                    <a:schemeClr val="bg2"/>
+                  </a:outerShdw>
+                </a:effectLst>
+              </a14:hiddenEffects>
+            </a:ext>
+          </a:extLst>
+        </p:spPr>
+      </p:pic>
     </p:spTree>
     <p:extLst>
       <p:ext uri="{BB962C8B-B14F-4D97-AF65-F5344CB8AC3E}">
-        <p14:creationId xmlns:p14="http://schemas.microsoft.com/office/powerpoint/2010/main" val="218531721"/>
+        <p14:creationId xmlns:p14="http://schemas.microsoft.com/office/powerpoint/2010/main" val="974189692"/>
       </p:ext>
     </p:extLst>
   </p:cSld>
@@ -10314,35 +11884,88 @@
           <a:p>
             <a:r>
               <a:rPr lang="en-US" dirty="0" smtClean="0"/>
-              <a:t>Cost Estimation</a:t>
+              <a:t>Cost </a:t>
+            </a:r>
+            <a:r>
+              <a:rPr lang="en-US" dirty="0" smtClean="0"/>
+              <a:t>Estimation: Siz</a:t>
+            </a:r>
+            <a:r>
+              <a:rPr lang="en-US" dirty="0" smtClean="0"/>
+              <a:t>e Estimates</a:t>
             </a:r>
             <a:endParaRPr lang="en-US" dirty="0"/>
           </a:p>
         </p:txBody>
       </p:sp>
-      <p:sp>
-        <p:nvSpPr>
-          <p:cNvPr id="3" name="Content Placeholder 2"/>
-          <p:cNvSpPr>
-            <a:spLocks noGrp="1"/>
-          </p:cNvSpPr>
-          <p:nvPr>
-            <p:ph idx="1"/>
-          </p:nvPr>
-        </p:nvSpPr>
-        <p:spPr/>
-        <p:txBody>
-          <a:bodyPr/>
-          <a:lstStyle/>
-          <a:p>
-            <a:endParaRPr lang="en-US"/>
-          </a:p>
-        </p:txBody>
-      </p:sp>
+      <p:pic>
+        <p:nvPicPr>
+          <p:cNvPr id="8194" name="Picture 2"/>
+          <p:cNvPicPr>
+            <a:picLocks noChangeAspect="1" noChangeArrowheads="1"/>
+          </p:cNvPicPr>
+          <p:nvPr/>
+        </p:nvPicPr>
+        <p:blipFill>
+          <a:blip r:embed="rId3">
+            <a:extLst>
+              <a:ext uri="{28A0092B-C50C-407E-A947-70E740481C1C}">
+                <a14:useLocalDpi xmlns:a14="http://schemas.microsoft.com/office/drawing/2010/main" val="0"/>
+              </a:ext>
+            </a:extLst>
+          </a:blip>
+          <a:srcRect/>
+          <a:stretch>
+            <a:fillRect/>
+          </a:stretch>
+        </p:blipFill>
+        <p:spPr bwMode="auto">
+          <a:xfrm>
+            <a:off x="533400" y="1828800"/>
+            <a:ext cx="8153400" cy="3938719"/>
+          </a:xfrm>
+          <a:prstGeom prst="rect">
+            <a:avLst/>
+          </a:prstGeom>
+          <a:noFill/>
+          <a:ln>
+            <a:noFill/>
+          </a:ln>
+          <a:effectLst/>
+          <a:extLst>
+            <a:ext uri="{909E8E84-426E-40DD-AFC4-6F175D3DCCD1}">
+              <a14:hiddenFill xmlns:a14="http://schemas.microsoft.com/office/drawing/2010/main">
+                <a:solidFill>
+                  <a:schemeClr val="accent1"/>
+                </a:solidFill>
+              </a14:hiddenFill>
+            </a:ext>
+            <a:ext uri="{91240B29-F687-4F45-9708-019B960494DF}">
+              <a14:hiddenLine xmlns:a14="http://schemas.microsoft.com/office/drawing/2010/main" w="9525">
+                <a:solidFill>
+                  <a:schemeClr val="tx1"/>
+                </a:solidFill>
+                <a:miter lim="800000"/>
+                <a:headEnd/>
+                <a:tailEnd/>
+              </a14:hiddenLine>
+            </a:ext>
+            <a:ext uri="{AF507438-7753-43E0-B8FC-AC1667EBCBE1}">
+              <a14:hiddenEffects xmlns:a14="http://schemas.microsoft.com/office/drawing/2010/main">
+                <a:effectLst>
+                  <a:outerShdw dist="35921" dir="2700000" algn="ctr" rotWithShape="0">
+                    <a:schemeClr val="bg2"/>
+                  </a:outerShdw>
+                </a:effectLst>
+              </a14:hiddenEffects>
+            </a:ext>
+          </a:extLst>
+        </p:spPr>
+      </p:pic>
     </p:spTree>
     <p:extLst>
       <p:ext uri="{BB962C8B-B14F-4D97-AF65-F5344CB8AC3E}">
-        <p14:creationId xmlns:p14="http://schemas.microsoft.com/office/powerpoint/2010/main" val="974189692"/>
+        <p14:creationId xmlns:p14="http://schemas.microsoft.com/office/powerpoint/2010/main" val="2085443037"/>
       </p:ext>
     </p:extLst>
   </p:cSld>

</xml_diff>